<commit_message>
shot 2 image - ready to port, process to port
</commit_message>
<xml_diff>
--- a/doc/cuda_training_day1_pm(20141219Liu).pptx
+++ b/doc/cuda_training_day1_pm(20141219Liu).pptx
@@ -5,10 +5,10 @@
     <p:sldMasterId id="2147483784" r:id="rId4"/>
   </p:sldMasterIdLst>
   <p:notesMasterIdLst>
-    <p:notesMasterId r:id="rId15"/>
+    <p:notesMasterId r:id="rId16"/>
   </p:notesMasterIdLst>
   <p:handoutMasterIdLst>
-    <p:handoutMasterId r:id="rId16"/>
+    <p:handoutMasterId r:id="rId17"/>
   </p:handoutMasterIdLst>
   <p:sldIdLst>
     <p:sldId id="1017" r:id="rId5"/>
@@ -18,9 +18,10 @@
     <p:sldId id="1033" r:id="rId9"/>
     <p:sldId id="1034" r:id="rId10"/>
     <p:sldId id="1035" r:id="rId11"/>
-    <p:sldId id="1036" r:id="rId12"/>
-    <p:sldId id="1023" r:id="rId13"/>
-    <p:sldId id="1037" r:id="rId14"/>
+    <p:sldId id="1038" r:id="rId12"/>
+    <p:sldId id="1036" r:id="rId13"/>
+    <p:sldId id="1023" r:id="rId14"/>
+    <p:sldId id="1037" r:id="rId15"/>
   </p:sldIdLst>
   <p:sldSz cx="10972800" cy="6172200"/>
   <p:notesSz cx="7010400" cy="9296400"/>
@@ -933,11 +934,7 @@
             </a:r>
             <a:r>
               <a:rPr lang="zh-CN" altLang="en-US" dirty="0" smtClean="0"/>
-              <a:t>数组索引：</a:t>
-            </a:r>
-            <a:r>
-              <a:rPr lang="zh-CN" altLang="en-US" dirty="0" smtClean="0"/>
-              <a:t>线程</a:t>
+              <a:t>数组索引：线程</a:t>
             </a:r>
             <a:r>
               <a:rPr lang="en-US" altLang="zh-CN" dirty="0" smtClean="0"/>
@@ -1529,7 +1526,7 @@
               <a:pPr>
                 <a:defRPr/>
               </a:pPr>
-              <a:t>8</a:t>
+              <a:t>9</a:t>
             </a:fld>
             <a:endParaRPr lang="en-US" dirty="0"/>
           </a:p>
@@ -1619,7 +1616,7 @@
               <a:pPr>
                 <a:defRPr/>
               </a:pPr>
-              <a:t>9</a:t>
+              <a:t>10</a:t>
             </a:fld>
             <a:endParaRPr lang="en-US" dirty="0"/>
           </a:p>
@@ -1782,7 +1779,7 @@
               <a:pPr>
                 <a:defRPr/>
               </a:pPr>
-              <a:t>10</a:t>
+              <a:t>11</a:t>
             </a:fld>
             <a:endParaRPr lang="en-US" dirty="0"/>
           </a:p>
@@ -3428,8 +3425,12 @@
           <a:lstStyle/>
           <a:p>
             <a:r>
-              <a:rPr lang="zh-CN" altLang="en-US" dirty="0" smtClean="0"/>
-              <a:t>练习</a:t>
+              <a:rPr lang="zh-CN" altLang="zh-CN" dirty="0"/>
+              <a:t>技巧</a:t>
+            </a:r>
+            <a:r>
+              <a:rPr lang="en-US" altLang="zh-CN" dirty="0"/>
+              <a:t>Tips</a:t>
             </a:r>
             <a:endParaRPr lang="en-US" dirty="0"/>
           </a:p>
@@ -3457,15 +3458,7 @@
           <a:p>
             <a:r>
               <a:rPr lang="zh-CN" altLang="en-US" dirty="0" smtClean="0"/>
-              <a:t>例</a:t>
-            </a:r>
-            <a:r>
-              <a:rPr lang="en-US" altLang="zh-CN" dirty="0"/>
-              <a:t>1</a:t>
-            </a:r>
-            <a:r>
-              <a:rPr lang="zh-CN" altLang="zh-CN" dirty="0" smtClean="0"/>
-              <a:t>延伸</a:t>
+              <a:t>线程配置</a:t>
             </a:r>
             <a:endParaRPr lang="en-US" altLang="zh-CN" dirty="0" smtClean="0"/>
           </a:p>
@@ -3473,23 +3466,35 @@
             <a:pPr lvl="1"/>
             <a:r>
               <a:rPr lang="zh-CN" altLang="zh-CN" sz="2400" dirty="0"/>
-              <a:t>在例</a:t>
+              <a:t>线程数目不是</a:t>
             </a:r>
             <a:r>
               <a:rPr lang="en-US" altLang="zh-CN" sz="2400" dirty="0"/>
-              <a:t>1</a:t>
+              <a:t>32</a:t>
             </a:r>
             <a:r>
               <a:rPr lang="zh-CN" altLang="zh-CN" sz="2400" dirty="0"/>
-              <a:t>的基础上求最短距离（</a:t>
-            </a:r>
-            <a:r>
-              <a:rPr lang="en-US" altLang="zh-CN" sz="2400" dirty="0"/>
-              <a:t>reduction</a:t>
+              <a:t>的</a:t>
             </a:r>
             <a:r>
               <a:rPr lang="zh-CN" altLang="zh-CN" sz="2400" dirty="0" smtClean="0"/>
-              <a:t>）</a:t>
+              <a:t>倍数</a:t>
+            </a:r>
+            <a:endParaRPr lang="en-US" altLang="zh-CN" sz="2400" dirty="0" smtClean="0"/>
+          </a:p>
+          <a:p>
+            <a:pPr lvl="1"/>
+            <a:r>
+              <a:rPr lang="zh-CN" altLang="zh-CN" sz="2400" dirty="0" smtClean="0"/>
+              <a:t>线程</a:t>
+            </a:r>
+            <a:r>
+              <a:rPr lang="zh-CN" altLang="zh-CN" sz="2400" dirty="0"/>
+              <a:t>数目</a:t>
+            </a:r>
+            <a:r>
+              <a:rPr lang="zh-CN" altLang="zh-CN" sz="2400" dirty="0" smtClean="0"/>
+              <a:t>超过阈值</a:t>
             </a:r>
             <a:endParaRPr lang="en-US" altLang="zh-CN" sz="2400" dirty="0" smtClean="0"/>
           </a:p>
@@ -3500,31 +3505,79 @@
           <a:p>
             <a:r>
               <a:rPr lang="zh-CN" altLang="en-US" dirty="0" smtClean="0"/>
-              <a:t>公式</a:t>
+              <a:t>测时对比</a:t>
             </a:r>
             <a:endParaRPr lang="en-US" altLang="zh-CN" dirty="0" smtClean="0"/>
           </a:p>
           <a:p>
             <a:pPr lvl="1"/>
             <a:r>
+              <a:rPr lang="zh-CN" altLang="en-US" sz="2400" dirty="0" smtClean="0"/>
+              <a:t>调用</a:t>
+            </a:r>
+            <a:r>
+              <a:rPr lang="en-US" altLang="zh-CN" sz="2400" dirty="0" err="1" smtClean="0"/>
+              <a:t>helper_timer.h</a:t>
+            </a:r>
+            <a:r>
+              <a:rPr lang="en-US" altLang="zh-CN" sz="2400" dirty="0" smtClean="0"/>
+              <a:t> </a:t>
+            </a:r>
+            <a:endParaRPr lang="en-US" altLang="zh-CN" sz="2400" dirty="0"/>
+          </a:p>
+          <a:p>
+            <a:pPr lvl="1"/>
+            <a:r>
+              <a:rPr lang="zh-CN" altLang="en-US" sz="2400" dirty="0"/>
+              <a:t>注意</a:t>
+            </a:r>
+            <a:r>
+              <a:rPr lang="en-US" altLang="zh-CN" sz="2400" dirty="0" smtClean="0"/>
+              <a:t>Synchronize</a:t>
+            </a:r>
+            <a:r>
+              <a:rPr lang="zh-CN" altLang="en-US" sz="2400" dirty="0" smtClean="0"/>
+              <a:t> </a:t>
+            </a:r>
+            <a:endParaRPr lang="en-US" altLang="zh-CN" sz="2400" dirty="0" smtClean="0"/>
+          </a:p>
+          <a:p>
+            <a:pPr lvl="1"/>
+            <a:r>
+              <a:rPr lang="zh-CN" altLang="en-US" sz="2400" dirty="0"/>
+              <a:t>线程数目</a:t>
+            </a:r>
+            <a:r>
               <a:rPr lang="en-US" altLang="zh-CN" sz="2400" dirty="0"/>
-              <a:t>min</a:t>
-            </a:r>
-            <a:r>
-              <a:rPr lang="en-US" altLang="zh-CN" sz="2400" dirty="0" smtClean="0"/>
-              <a:t>( </a:t>
+              <a:t>(</a:t>
+            </a:r>
+            <a:r>
+              <a:rPr lang="zh-CN" altLang="en-US" sz="2400" dirty="0"/>
+              <a:t>问题规模</a:t>
             </a:r>
             <a:r>
               <a:rPr lang="en-US" altLang="zh-CN" sz="2400" dirty="0"/>
-              <a:t>d[</a:t>
-            </a:r>
-            <a:r>
-              <a:rPr lang="en-US" altLang="zh-CN" sz="2400" dirty="0" err="1"/>
-              <a:t>i</a:t>
-            </a:r>
-            <a:r>
-              <a:rPr lang="en-US" altLang="zh-CN" sz="2400" dirty="0" smtClean="0"/>
-              <a:t>] ) </a:t>
+              <a:t>)</a:t>
+            </a:r>
+            <a:r>
+              <a:rPr lang="zh-CN" altLang="en-US" sz="2400" dirty="0"/>
+              <a:t>多大时，</a:t>
+            </a:r>
+            <a:r>
+              <a:rPr lang="en-US" altLang="zh-CN" sz="2400" dirty="0"/>
+              <a:t>GPU</a:t>
+            </a:r>
+            <a:r>
+              <a:rPr lang="zh-CN" altLang="en-US" sz="2400" dirty="0"/>
+              <a:t>发挥的性能赶超</a:t>
+            </a:r>
+            <a:r>
+              <a:rPr lang="en-US" altLang="zh-CN" sz="2400" dirty="0"/>
+              <a:t>CPU</a:t>
+            </a:r>
+            <a:r>
+              <a:rPr lang="zh-CN" altLang="en-US" sz="2400" dirty="0" smtClean="0"/>
+              <a:t>？</a:t>
             </a:r>
             <a:endParaRPr lang="en-US" altLang="zh-CN" sz="2400" dirty="0" smtClean="0"/>
           </a:p>
@@ -3719,6 +3772,458 @@
           </a:lstStyle>
           <a:p>
             <a:r>
+              <a:rPr lang="zh-CN" altLang="en-US" dirty="0" smtClean="0"/>
+              <a:t>移植三部曲</a:t>
+            </a:r>
+            <a:endParaRPr lang="en-US" altLang="zh-CN" dirty="0" smtClean="0"/>
+          </a:p>
+          <a:p>
+            <a:pPr lvl="1"/>
+            <a:r>
+              <a:rPr lang="zh-CN" altLang="zh-CN" sz="2400" dirty="0" smtClean="0"/>
+              <a:t>循环变嵌套函数</a:t>
+            </a:r>
+            <a:endParaRPr lang="en-US" altLang="zh-CN" sz="2400" dirty="0" smtClean="0"/>
+          </a:p>
+          <a:p>
+            <a:pPr lvl="1"/>
+            <a:r>
+              <a:rPr lang="zh-CN" altLang="zh-CN" sz="2400" dirty="0"/>
+              <a:t>数组索引变量</a:t>
+            </a:r>
+            <a:r>
+              <a:rPr lang="zh-CN" altLang="zh-CN" sz="2400" dirty="0" smtClean="0"/>
+              <a:t>化</a:t>
+            </a:r>
+            <a:endParaRPr lang="en-US" altLang="zh-CN" sz="2400" dirty="0" smtClean="0"/>
+          </a:p>
+          <a:p>
+            <a:pPr lvl="1"/>
+            <a:r>
+              <a:rPr lang="zh-CN" altLang="zh-CN" sz="2400" dirty="0" smtClean="0"/>
+              <a:t>新</a:t>
+            </a:r>
+            <a:r>
+              <a:rPr lang="zh-CN" altLang="zh-CN" sz="2400" dirty="0"/>
+              <a:t>模型</a:t>
+            </a:r>
+            <a:r>
+              <a:rPr lang="zh-CN" altLang="zh-CN" sz="2400" dirty="0" smtClean="0"/>
+              <a:t>改写</a:t>
+            </a:r>
+            <a:endParaRPr lang="en-US" altLang="zh-CN" sz="2400" dirty="0" smtClean="0"/>
+          </a:p>
+          <a:p>
+            <a:pPr lvl="1"/>
+            <a:endParaRPr lang="en-US" altLang="zh-CN" sz="2400" dirty="0" smtClean="0"/>
+          </a:p>
+          <a:p>
+            <a:r>
+              <a:rPr lang="zh-CN" altLang="en-US" dirty="0" smtClean="0"/>
+              <a:t>其它</a:t>
+            </a:r>
+            <a:endParaRPr lang="en-US" altLang="zh-CN" dirty="0" smtClean="0"/>
+          </a:p>
+          <a:p>
+            <a:pPr lvl="1"/>
+            <a:r>
+              <a:rPr lang="zh-CN" altLang="zh-CN" sz="2400" dirty="0" smtClean="0"/>
+              <a:t>结果验证</a:t>
+            </a:r>
+            <a:endParaRPr lang="en-US" altLang="zh-CN" sz="2400" dirty="0" smtClean="0"/>
+          </a:p>
+          <a:p>
+            <a:pPr lvl="1"/>
+            <a:r>
+              <a:rPr lang="zh-CN" altLang="zh-CN" sz="2400" dirty="0" smtClean="0"/>
+              <a:t>错误定位</a:t>
+            </a:r>
+            <a:endParaRPr lang="en-US" altLang="zh-CN" sz="2400" dirty="0" smtClean="0"/>
+          </a:p>
+          <a:p>
+            <a:pPr lvl="1"/>
+            <a:r>
+              <a:rPr lang="en-US" altLang="zh-CN" sz="2400" dirty="0" smtClean="0"/>
+              <a:t>driver</a:t>
+            </a:r>
+            <a:r>
+              <a:rPr lang="zh-CN" altLang="zh-CN" sz="2400" dirty="0" smtClean="0"/>
+              <a:t>编写</a:t>
+            </a:r>
+            <a:endParaRPr lang="en-US" altLang="zh-CN" sz="2400" dirty="0" smtClean="0"/>
+          </a:p>
+          <a:p>
+            <a:pPr lvl="1"/>
+            <a:endParaRPr lang="en-US" altLang="zh-CN" sz="2400" dirty="0" smtClean="0"/>
+          </a:p>
+          <a:p>
+            <a:endParaRPr lang="en-US" altLang="zh-CN" dirty="0" smtClean="0"/>
+          </a:p>
+          <a:p>
+            <a:endParaRPr lang="en-US" dirty="0"/>
+          </a:p>
+        </p:txBody>
+      </p:sp>
+    </p:spTree>
+    <p:extLst>
+      <p:ext uri="{BB962C8B-B14F-4D97-AF65-F5344CB8AC3E}">
+        <p14:creationId xmlns:p14="http://schemas.microsoft.com/office/powerpoint/2010/main" val="4291639553"/>
+      </p:ext>
+    </p:extLst>
+  </p:cSld>
+  <p:clrMapOvr>
+    <a:masterClrMapping/>
+  </p:clrMapOvr>
+  <mc:AlternateContent xmlns:mc="http://schemas.openxmlformats.org/markup-compatibility/2006" xmlns:p14="http://schemas.microsoft.com/office/powerpoint/2010/main">
+    <mc:Choice Requires="p14">
+      <p:transition spd="med" p14:dur="700">
+        <p:fade/>
+      </p:transition>
+    </mc:Choice>
+    <mc:Fallback xmlns="">
+      <p:transition spd="med">
+        <p:fade/>
+      </p:transition>
+    </mc:Fallback>
+  </mc:AlternateContent>
+  <p:timing>
+    <p:tnLst>
+      <p:par>
+        <p:cTn id="1" dur="indefinite" restart="never" nodeType="tmRoot"/>
+      </p:par>
+    </p:tnLst>
+  </p:timing>
+</p:sld>
+</file>
+
+<file path=ppt/slides/slide11.xml><?xml version="1.0" encoding="utf-8"?>
+<p:sld xmlns:a="http://schemas.openxmlformats.org/drawingml/2006/main" xmlns:r="http://schemas.openxmlformats.org/officeDocument/2006/relationships" xmlns:p="http://schemas.openxmlformats.org/presentationml/2006/main">
+  <p:cSld>
+    <p:spTree>
+      <p:nvGrpSpPr>
+        <p:cNvPr id="1" name=""/>
+        <p:cNvGrpSpPr/>
+        <p:nvPr/>
+      </p:nvGrpSpPr>
+      <p:grpSpPr>
+        <a:xfrm>
+          <a:off x="0" y="0"/>
+          <a:ext cx="0" cy="0"/>
+          <a:chOff x="0" y="0"/>
+          <a:chExt cx="0" cy="0"/>
+        </a:xfrm>
+      </p:grpSpPr>
+      <p:sp>
+        <p:nvSpPr>
+          <p:cNvPr id="2" name="Title 1"/>
+          <p:cNvSpPr>
+            <a:spLocks noGrp="1"/>
+          </p:cNvSpPr>
+          <p:nvPr>
+            <p:ph type="title"/>
+          </p:nvPr>
+        </p:nvSpPr>
+        <p:spPr>
+          <a:xfrm>
+            <a:off x="884238" y="247650"/>
+            <a:ext cx="9204325" cy="590931"/>
+          </a:xfrm>
+        </p:spPr>
+        <p:txBody>
+          <a:bodyPr/>
+          <a:lstStyle/>
+          <a:p>
+            <a:r>
+              <a:rPr lang="zh-CN" altLang="en-US" dirty="0" smtClean="0"/>
+              <a:t>练习</a:t>
+            </a:r>
+            <a:endParaRPr lang="en-US" dirty="0"/>
+          </a:p>
+        </p:txBody>
+      </p:sp>
+      <p:sp>
+        <p:nvSpPr>
+          <p:cNvPr id="3" name="Content Placeholder 2"/>
+          <p:cNvSpPr>
+            <a:spLocks noGrp="1"/>
+          </p:cNvSpPr>
+          <p:nvPr>
+            <p:ph idx="1"/>
+          </p:nvPr>
+        </p:nvSpPr>
+        <p:spPr>
+          <a:xfrm>
+            <a:off x="884902" y="1504334"/>
+            <a:ext cx="4254657" cy="4612691"/>
+          </a:xfrm>
+        </p:spPr>
+        <p:txBody>
+          <a:bodyPr/>
+          <a:lstStyle/>
+          <a:p>
+            <a:r>
+              <a:rPr lang="zh-CN" altLang="en-US" dirty="0" smtClean="0"/>
+              <a:t>例</a:t>
+            </a:r>
+            <a:r>
+              <a:rPr lang="en-US" altLang="zh-CN" dirty="0"/>
+              <a:t>1</a:t>
+            </a:r>
+            <a:r>
+              <a:rPr lang="zh-CN" altLang="zh-CN" dirty="0" smtClean="0"/>
+              <a:t>延伸</a:t>
+            </a:r>
+            <a:endParaRPr lang="en-US" altLang="zh-CN" dirty="0" smtClean="0"/>
+          </a:p>
+          <a:p>
+            <a:pPr lvl="1"/>
+            <a:r>
+              <a:rPr lang="zh-CN" altLang="zh-CN" sz="2400" dirty="0"/>
+              <a:t>在例</a:t>
+            </a:r>
+            <a:r>
+              <a:rPr lang="en-US" altLang="zh-CN" sz="2400" dirty="0"/>
+              <a:t>1</a:t>
+            </a:r>
+            <a:r>
+              <a:rPr lang="zh-CN" altLang="zh-CN" sz="2400" dirty="0"/>
+              <a:t>的基础上求最短距离（</a:t>
+            </a:r>
+            <a:r>
+              <a:rPr lang="en-US" altLang="zh-CN" sz="2400" dirty="0"/>
+              <a:t>reduction</a:t>
+            </a:r>
+            <a:r>
+              <a:rPr lang="zh-CN" altLang="zh-CN" sz="2400" dirty="0" smtClean="0"/>
+              <a:t>）</a:t>
+            </a:r>
+            <a:endParaRPr lang="en-US" altLang="zh-CN" sz="2400" dirty="0" smtClean="0"/>
+          </a:p>
+          <a:p>
+            <a:pPr lvl="1"/>
+            <a:endParaRPr lang="en-US" altLang="zh-CN" sz="2400" dirty="0" smtClean="0"/>
+          </a:p>
+          <a:p>
+            <a:r>
+              <a:rPr lang="zh-CN" altLang="en-US" dirty="0" smtClean="0"/>
+              <a:t>公式</a:t>
+            </a:r>
+            <a:endParaRPr lang="en-US" altLang="zh-CN" dirty="0" smtClean="0"/>
+          </a:p>
+          <a:p>
+            <a:pPr lvl="1"/>
+            <a:r>
+              <a:rPr lang="en-US" altLang="zh-CN" sz="2400" dirty="0"/>
+              <a:t>min</a:t>
+            </a:r>
+            <a:r>
+              <a:rPr lang="en-US" altLang="zh-CN" sz="2400" dirty="0" smtClean="0"/>
+              <a:t>( </a:t>
+            </a:r>
+            <a:r>
+              <a:rPr lang="en-US" altLang="zh-CN" sz="2400" dirty="0"/>
+              <a:t>d[</a:t>
+            </a:r>
+            <a:r>
+              <a:rPr lang="en-US" altLang="zh-CN" sz="2400" dirty="0" err="1"/>
+              <a:t>i</a:t>
+            </a:r>
+            <a:r>
+              <a:rPr lang="en-US" altLang="zh-CN" sz="2400" dirty="0" smtClean="0"/>
+              <a:t>] ) </a:t>
+            </a:r>
+          </a:p>
+          <a:p>
+            <a:endParaRPr lang="en-US" altLang="zh-CN" dirty="0" smtClean="0"/>
+          </a:p>
+          <a:p>
+            <a:endParaRPr lang="en-US" dirty="0"/>
+          </a:p>
+        </p:txBody>
+      </p:sp>
+      <p:sp>
+        <p:nvSpPr>
+          <p:cNvPr id="4" name="Content Placeholder 2"/>
+          <p:cNvSpPr txBox="1">
+            <a:spLocks/>
+          </p:cNvSpPr>
+          <p:nvPr/>
+        </p:nvSpPr>
+        <p:spPr bwMode="auto">
+          <a:xfrm>
+            <a:off x="6179566" y="1460090"/>
+            <a:ext cx="4107657" cy="4667442"/>
+          </a:xfrm>
+          <a:prstGeom prst="rect">
+            <a:avLst/>
+          </a:prstGeom>
+          <a:noFill/>
+          <a:ln w="9525">
+            <a:noFill/>
+            <a:miter lim="800000"/>
+            <a:headEnd/>
+            <a:tailEnd/>
+          </a:ln>
+        </p:spPr>
+        <p:txBody>
+          <a:bodyPr vert="horz" wrap="square" lIns="91440" tIns="45720" rIns="91440" bIns="45720" numCol="1" anchor="t" anchorCtr="0" compatLnSpc="1">
+            <a:prstTxWarp prst="textNoShape">
+              <a:avLst/>
+            </a:prstTxWarp>
+          </a:bodyPr>
+          <a:lstStyle>
+            <a:lvl1pPr marL="342900" indent="-342900" algn="l" rtl="0" eaLnBrk="1" fontAlgn="base" hangingPunct="1">
+              <a:spcBef>
+                <a:spcPct val="20000"/>
+              </a:spcBef>
+              <a:spcAft>
+                <a:spcPct val="0"/>
+              </a:spcAft>
+              <a:buSzPct val="100000"/>
+              <a:buFontTx/>
+              <a:buBlip>
+                <a:blip r:embed="rId3"/>
+              </a:buBlip>
+              <a:defRPr sz="2400" b="0">
+                <a:solidFill>
+                  <a:schemeClr val="tx1"/>
+                </a:solidFill>
+                <a:latin typeface="Trebuchet MS" pitchFamily="34" charset="0"/>
+                <a:ea typeface="+mn-ea"/>
+                <a:cs typeface="+mn-cs"/>
+              </a:defRPr>
+            </a:lvl1pPr>
+            <a:lvl2pPr marL="914400" indent="-342900" algn="l" rtl="0" eaLnBrk="1" fontAlgn="base" hangingPunct="1">
+              <a:spcBef>
+                <a:spcPct val="20000"/>
+              </a:spcBef>
+              <a:spcAft>
+                <a:spcPct val="0"/>
+              </a:spcAft>
+              <a:buSzPct val="100000"/>
+              <a:buFontTx/>
+              <a:buBlip>
+                <a:blip r:embed="rId3"/>
+              </a:buBlip>
+              <a:defRPr sz="2000" b="0">
+                <a:solidFill>
+                  <a:schemeClr val="tx1"/>
+                </a:solidFill>
+                <a:latin typeface="Trebuchet MS" pitchFamily="34" charset="0"/>
+              </a:defRPr>
+            </a:lvl2pPr>
+            <a:lvl3pPr marL="1371600" indent="-282575" algn="l" rtl="0" eaLnBrk="1" fontAlgn="base" hangingPunct="1">
+              <a:spcBef>
+                <a:spcPct val="20000"/>
+              </a:spcBef>
+              <a:spcAft>
+                <a:spcPct val="0"/>
+              </a:spcAft>
+              <a:buSzPct val="100000"/>
+              <a:buFontTx/>
+              <a:buBlip>
+                <a:blip r:embed="rId3"/>
+              </a:buBlip>
+              <a:defRPr sz="1800" b="0">
+                <a:solidFill>
+                  <a:schemeClr val="tx1"/>
+                </a:solidFill>
+                <a:latin typeface="Trebuchet MS" pitchFamily="34" charset="0"/>
+              </a:defRPr>
+            </a:lvl3pPr>
+            <a:lvl4pPr marL="1774825" indent="-228600" algn="l" rtl="0" eaLnBrk="1" fontAlgn="base" hangingPunct="1">
+              <a:spcBef>
+                <a:spcPct val="20000"/>
+              </a:spcBef>
+              <a:spcAft>
+                <a:spcPct val="0"/>
+              </a:spcAft>
+              <a:buChar char="–"/>
+              <a:defRPr sz="2000">
+                <a:solidFill>
+                  <a:schemeClr val="tx1"/>
+                </a:solidFill>
+                <a:latin typeface="+mn-lt"/>
+              </a:defRPr>
+            </a:lvl4pPr>
+            <a:lvl5pPr marL="2117725" indent="-228600" algn="l" rtl="0" eaLnBrk="1" fontAlgn="base" hangingPunct="1">
+              <a:spcBef>
+                <a:spcPct val="20000"/>
+              </a:spcBef>
+              <a:spcAft>
+                <a:spcPct val="0"/>
+              </a:spcAft>
+              <a:buChar char="»"/>
+              <a:defRPr sz="2000">
+                <a:solidFill>
+                  <a:schemeClr val="tx1"/>
+                </a:solidFill>
+                <a:latin typeface="+mn-lt"/>
+              </a:defRPr>
+            </a:lvl5pPr>
+            <a:lvl6pPr marL="2574925" indent="-228600" algn="l" rtl="0" eaLnBrk="1" fontAlgn="base" hangingPunct="1">
+              <a:spcBef>
+                <a:spcPct val="20000"/>
+              </a:spcBef>
+              <a:spcAft>
+                <a:spcPct val="0"/>
+              </a:spcAft>
+              <a:buChar char="»"/>
+              <a:defRPr sz="2000">
+                <a:solidFill>
+                  <a:schemeClr val="bg1"/>
+                </a:solidFill>
+                <a:latin typeface="+mn-lt"/>
+              </a:defRPr>
+            </a:lvl6pPr>
+            <a:lvl7pPr marL="3032125" indent="-228600" algn="l" rtl="0" eaLnBrk="1" fontAlgn="base" hangingPunct="1">
+              <a:spcBef>
+                <a:spcPct val="20000"/>
+              </a:spcBef>
+              <a:spcAft>
+                <a:spcPct val="0"/>
+              </a:spcAft>
+              <a:buChar char="»"/>
+              <a:defRPr sz="2000">
+                <a:solidFill>
+                  <a:schemeClr val="bg1"/>
+                </a:solidFill>
+                <a:latin typeface="+mn-lt"/>
+              </a:defRPr>
+            </a:lvl7pPr>
+            <a:lvl8pPr marL="3489325" indent="-228600" algn="l" rtl="0" eaLnBrk="1" fontAlgn="base" hangingPunct="1">
+              <a:spcBef>
+                <a:spcPct val="20000"/>
+              </a:spcBef>
+              <a:spcAft>
+                <a:spcPct val="0"/>
+              </a:spcAft>
+              <a:buChar char="»"/>
+              <a:defRPr sz="2000">
+                <a:solidFill>
+                  <a:schemeClr val="bg1"/>
+                </a:solidFill>
+                <a:latin typeface="+mn-lt"/>
+              </a:defRPr>
+            </a:lvl8pPr>
+            <a:lvl9pPr marL="3946525" indent="-228600" algn="l" rtl="0" eaLnBrk="1" fontAlgn="base" hangingPunct="1">
+              <a:spcBef>
+                <a:spcPct val="20000"/>
+              </a:spcBef>
+              <a:spcAft>
+                <a:spcPct val="0"/>
+              </a:spcAft>
+              <a:buChar char="»"/>
+              <a:defRPr sz="2000">
+                <a:solidFill>
+                  <a:schemeClr val="bg1"/>
+                </a:solidFill>
+                <a:latin typeface="+mn-lt"/>
+              </a:defRPr>
+            </a:lvl9pPr>
+          </a:lstStyle>
+          <a:p>
+            <a:r>
               <a:rPr lang="zh-CN" altLang="zh-CN" dirty="0"/>
               <a:t>新例子——例</a:t>
             </a:r>
@@ -3800,7 +4305,6 @@
               <a:rPr lang="en-US" altLang="zh-CN" sz="2400" dirty="0" smtClean="0"/>
               <a:t>…</a:t>
             </a:r>
-            <a:endParaRPr lang="en-US" altLang="zh-CN" sz="2400" dirty="0" smtClean="0"/>
           </a:p>
           <a:p>
             <a:pPr lvl="1"/>
@@ -3808,7 +4312,6 @@
               <a:rPr lang="en-US" altLang="zh-CN" sz="2400" dirty="0" smtClean="0"/>
               <a:t>…</a:t>
             </a:r>
-            <a:endParaRPr lang="en-US" altLang="zh-CN" sz="2400" dirty="0" smtClean="0"/>
           </a:p>
           <a:p>
             <a:pPr lvl="1"/>
@@ -4090,7 +4593,6 @@
               <a:rPr lang="en-US" altLang="zh-CN" sz="3200" dirty="0" smtClean="0"/>
               <a:t>GLSL/CG</a:t>
             </a:r>
-            <a:endParaRPr lang="en-US" altLang="zh-CN" sz="3200" dirty="0" smtClean="0"/>
           </a:p>
           <a:p>
             <a:r>
@@ -4770,8 +5272,8 @@
           </a:p>
           <a:p>
             <a:r>
-              <a:rPr lang="zh-CN" altLang="en-US" sz="3200" dirty="0"/>
-              <a:t>变量存储</a:t>
+              <a:rPr lang="zh-CN" altLang="en-US" sz="3200" dirty="0" smtClean="0"/>
+              <a:t>数组存储</a:t>
             </a:r>
             <a:endParaRPr lang="en-US" altLang="zh-CN" sz="3200" dirty="0" smtClean="0"/>
           </a:p>
@@ -5532,16 +6034,84 @@
           <a:p>
             <a:r>
               <a:rPr lang="zh-CN" altLang="zh-CN" sz="3200" dirty="0" smtClean="0"/>
-              <a:t>索引</a:t>
+              <a:t>数组</a:t>
             </a:r>
             <a:r>
               <a:rPr lang="zh-CN" altLang="zh-CN" sz="3200" dirty="0"/>
-              <a:t>数组变量化</a:t>
+              <a:t>索引变量</a:t>
+            </a:r>
+            <a:r>
+              <a:rPr lang="zh-CN" altLang="zh-CN" sz="3200" dirty="0"/>
+              <a:t>化</a:t>
             </a:r>
             <a:endParaRPr lang="en-US" altLang="zh-CN" sz="3200" dirty="0" smtClean="0"/>
           </a:p>
         </p:txBody>
       </p:sp>
+      <p:pic>
+        <p:nvPicPr>
+          <p:cNvPr id="2050" name="Picture 2"/>
+          <p:cNvPicPr>
+            <a:picLocks noChangeAspect="1" noChangeArrowheads="1"/>
+          </p:cNvPicPr>
+          <p:nvPr/>
+        </p:nvPicPr>
+        <p:blipFill>
+          <a:blip r:embed="rId4">
+            <a:extLst>
+              <a:ext uri="{28A0092B-C50C-407E-A947-70E740481C1C}">
+                <a14:useLocalDpi xmlns:a14="http://schemas.microsoft.com/office/drawing/2010/main" val="0"/>
+              </a:ext>
+            </a:extLst>
+          </a:blip>
+          <a:srcRect/>
+          <a:stretch>
+            <a:fillRect/>
+          </a:stretch>
+        </p:blipFill>
+        <p:spPr bwMode="auto">
+          <a:xfrm>
+            <a:off x="1200150" y="2018547"/>
+            <a:ext cx="8572500" cy="4124325"/>
+          </a:xfrm>
+          <a:prstGeom prst="rect">
+            <a:avLst/>
+          </a:prstGeom>
+          <a:noFill/>
+          <a:ln>
+            <a:noFill/>
+          </a:ln>
+          <a:effectLst/>
+          <a:extLst>
+            <a:ext uri="{909E8E84-426E-40DD-AFC4-6F175D3DCCD1}">
+              <a14:hiddenFill xmlns:a14="http://schemas.microsoft.com/office/drawing/2010/main">
+                <a:solidFill>
+                  <a:schemeClr val="accent1"/>
+                </a:solidFill>
+              </a14:hiddenFill>
+            </a:ext>
+            <a:ext uri="{91240B29-F687-4F45-9708-019B960494DF}">
+              <a14:hiddenLine xmlns:a14="http://schemas.microsoft.com/office/drawing/2010/main" w="9525">
+                <a:solidFill>
+                  <a:schemeClr val="tx1"/>
+                </a:solidFill>
+                <a:miter lim="800000"/>
+                <a:headEnd/>
+                <a:tailEnd/>
+              </a14:hiddenLine>
+            </a:ext>
+            <a:ext uri="{AF507438-7753-43E0-B8FC-AC1667EBCBE1}">
+              <a14:hiddenEffects xmlns:a14="http://schemas.microsoft.com/office/drawing/2010/main">
+                <a:effectLst>
+                  <a:outerShdw dist="35921" dir="2700000" algn="ctr" rotWithShape="0">
+                    <a:schemeClr val="bg2"/>
+                  </a:outerShdw>
+                </a:effectLst>
+              </a14:hiddenEffects>
+            </a:ext>
+          </a:extLst>
+        </p:spPr>
+      </p:pic>
     </p:spTree>
     <p:extLst>
       <p:ext uri="{BB962C8B-B14F-4D97-AF65-F5344CB8AC3E}">
@@ -5630,7 +6200,6 @@
               <a:rPr lang="zh-CN" altLang="en-US" sz="2800" dirty="0"/>
               <a:t>新模型</a:t>
             </a:r>
-            <a:endParaRPr lang="zh-CN" altLang="en-US" sz="2800" dirty="0"/>
           </a:p>
         </p:txBody>
       </p:sp>
@@ -5664,210 +6233,6 @@
           </a:p>
         </p:txBody>
       </p:sp>
-      <p:sp>
-        <p:nvSpPr>
-          <p:cNvPr id="4" name="内容占位符 2"/>
-          <p:cNvSpPr txBox="1">
-            <a:spLocks/>
-          </p:cNvSpPr>
-          <p:nvPr/>
-        </p:nvSpPr>
-        <p:spPr bwMode="auto">
-          <a:xfrm>
-            <a:off x="6127598" y="1434603"/>
-            <a:ext cx="4816476" cy="4252912"/>
-          </a:xfrm>
-          <a:prstGeom prst="rect">
-            <a:avLst/>
-          </a:prstGeom>
-          <a:noFill/>
-          <a:ln w="9525">
-            <a:noFill/>
-            <a:miter lim="800000"/>
-            <a:headEnd/>
-            <a:tailEnd/>
-          </a:ln>
-        </p:spPr>
-        <p:txBody>
-          <a:bodyPr vert="horz" wrap="square" lIns="91440" tIns="45720" rIns="91440" bIns="45720" numCol="1" anchor="t" anchorCtr="0" compatLnSpc="1">
-            <a:prstTxWarp prst="textNoShape">
-              <a:avLst/>
-            </a:prstTxWarp>
-          </a:bodyPr>
-          <a:lstStyle>
-            <a:lvl1pPr marL="342900" indent="-342900" algn="l" rtl="0" eaLnBrk="1" fontAlgn="base" hangingPunct="1">
-              <a:spcBef>
-                <a:spcPct val="20000"/>
-              </a:spcBef>
-              <a:spcAft>
-                <a:spcPct val="0"/>
-              </a:spcAft>
-              <a:buSzPct val="100000"/>
-              <a:buFontTx/>
-              <a:buBlip>
-                <a:blip r:embed="rId3"/>
-              </a:buBlip>
-              <a:defRPr sz="2400" b="0">
-                <a:solidFill>
-                  <a:schemeClr val="tx1"/>
-                </a:solidFill>
-                <a:latin typeface="Trebuchet MS" pitchFamily="34" charset="0"/>
-                <a:ea typeface="+mn-ea"/>
-                <a:cs typeface="+mn-cs"/>
-              </a:defRPr>
-            </a:lvl1pPr>
-            <a:lvl2pPr marL="914400" indent="-342900" algn="l" rtl="0" eaLnBrk="1" fontAlgn="base" hangingPunct="1">
-              <a:spcBef>
-                <a:spcPct val="20000"/>
-              </a:spcBef>
-              <a:spcAft>
-                <a:spcPct val="0"/>
-              </a:spcAft>
-              <a:buSzPct val="100000"/>
-              <a:buFontTx/>
-              <a:buBlip>
-                <a:blip r:embed="rId3"/>
-              </a:buBlip>
-              <a:defRPr sz="2000" b="0">
-                <a:solidFill>
-                  <a:schemeClr val="tx1"/>
-                </a:solidFill>
-                <a:latin typeface="Trebuchet MS" pitchFamily="34" charset="0"/>
-              </a:defRPr>
-            </a:lvl2pPr>
-            <a:lvl3pPr marL="1371600" indent="-282575" algn="l" rtl="0" eaLnBrk="1" fontAlgn="base" hangingPunct="1">
-              <a:spcBef>
-                <a:spcPct val="20000"/>
-              </a:spcBef>
-              <a:spcAft>
-                <a:spcPct val="0"/>
-              </a:spcAft>
-              <a:buSzPct val="100000"/>
-              <a:buFontTx/>
-              <a:buBlip>
-                <a:blip r:embed="rId3"/>
-              </a:buBlip>
-              <a:defRPr sz="1800" b="0">
-                <a:solidFill>
-                  <a:schemeClr val="tx1"/>
-                </a:solidFill>
-                <a:latin typeface="Trebuchet MS" pitchFamily="34" charset="0"/>
-              </a:defRPr>
-            </a:lvl3pPr>
-            <a:lvl4pPr marL="1774825" indent="-228600" algn="l" rtl="0" eaLnBrk="1" fontAlgn="base" hangingPunct="1">
-              <a:spcBef>
-                <a:spcPct val="20000"/>
-              </a:spcBef>
-              <a:spcAft>
-                <a:spcPct val="0"/>
-              </a:spcAft>
-              <a:buChar char="–"/>
-              <a:defRPr sz="2000">
-                <a:solidFill>
-                  <a:schemeClr val="tx1"/>
-                </a:solidFill>
-                <a:latin typeface="+mn-lt"/>
-              </a:defRPr>
-            </a:lvl4pPr>
-            <a:lvl5pPr marL="2117725" indent="-228600" algn="l" rtl="0" eaLnBrk="1" fontAlgn="base" hangingPunct="1">
-              <a:spcBef>
-                <a:spcPct val="20000"/>
-              </a:spcBef>
-              <a:spcAft>
-                <a:spcPct val="0"/>
-              </a:spcAft>
-              <a:buChar char="»"/>
-              <a:defRPr sz="2000">
-                <a:solidFill>
-                  <a:schemeClr val="tx1"/>
-                </a:solidFill>
-                <a:latin typeface="+mn-lt"/>
-              </a:defRPr>
-            </a:lvl5pPr>
-            <a:lvl6pPr marL="2574925" indent="-228600" algn="l" rtl="0" eaLnBrk="1" fontAlgn="base" hangingPunct="1">
-              <a:spcBef>
-                <a:spcPct val="20000"/>
-              </a:spcBef>
-              <a:spcAft>
-                <a:spcPct val="0"/>
-              </a:spcAft>
-              <a:buChar char="»"/>
-              <a:defRPr sz="2000">
-                <a:solidFill>
-                  <a:schemeClr val="bg1"/>
-                </a:solidFill>
-                <a:latin typeface="+mn-lt"/>
-              </a:defRPr>
-            </a:lvl6pPr>
-            <a:lvl7pPr marL="3032125" indent="-228600" algn="l" rtl="0" eaLnBrk="1" fontAlgn="base" hangingPunct="1">
-              <a:spcBef>
-                <a:spcPct val="20000"/>
-              </a:spcBef>
-              <a:spcAft>
-                <a:spcPct val="0"/>
-              </a:spcAft>
-              <a:buChar char="»"/>
-              <a:defRPr sz="2000">
-                <a:solidFill>
-                  <a:schemeClr val="bg1"/>
-                </a:solidFill>
-                <a:latin typeface="+mn-lt"/>
-              </a:defRPr>
-            </a:lvl7pPr>
-            <a:lvl8pPr marL="3489325" indent="-228600" algn="l" rtl="0" eaLnBrk="1" fontAlgn="base" hangingPunct="1">
-              <a:spcBef>
-                <a:spcPct val="20000"/>
-              </a:spcBef>
-              <a:spcAft>
-                <a:spcPct val="0"/>
-              </a:spcAft>
-              <a:buChar char="»"/>
-              <a:defRPr sz="2000">
-                <a:solidFill>
-                  <a:schemeClr val="bg1"/>
-                </a:solidFill>
-                <a:latin typeface="+mn-lt"/>
-              </a:defRPr>
-            </a:lvl8pPr>
-            <a:lvl9pPr marL="3946525" indent="-228600" algn="l" rtl="0" eaLnBrk="1" fontAlgn="base" hangingPunct="1">
-              <a:spcBef>
-                <a:spcPct val="20000"/>
-              </a:spcBef>
-              <a:spcAft>
-                <a:spcPct val="0"/>
-              </a:spcAft>
-              <a:buChar char="»"/>
-              <a:defRPr sz="2000">
-                <a:solidFill>
-                  <a:schemeClr val="bg1"/>
-                </a:solidFill>
-                <a:latin typeface="+mn-lt"/>
-              </a:defRPr>
-            </a:lvl9pPr>
-          </a:lstStyle>
-          <a:p>
-            <a:r>
-              <a:rPr lang="zh-CN" altLang="en-US" sz="3200" dirty="0" smtClean="0"/>
-              <a:t>  </a:t>
-            </a:r>
-          </a:p>
-          <a:p>
-            <a:pPr lvl="1"/>
-            <a:r>
-              <a:rPr lang="en-US" altLang="zh-CN" sz="2400" dirty="0" smtClean="0"/>
-              <a:t>  </a:t>
-            </a:r>
-          </a:p>
-          <a:p>
-            <a:pPr lvl="1"/>
-            <a:r>
-              <a:rPr lang="en-US" altLang="zh-CN" sz="2400" dirty="0" smtClean="0"/>
-              <a:t>  </a:t>
-            </a:r>
-            <a:endParaRPr lang="en-US" altLang="zh-CN" sz="2400" dirty="0"/>
-          </a:p>
-        </p:txBody>
-      </p:sp>
       <p:graphicFrame>
         <p:nvGraphicFramePr>
           <p:cNvPr id="5" name="表格 4"/>
@@ -5877,7 +6242,7 @@
           <p:nvPr>
             <p:extLst>
               <p:ext uri="{D42A27DB-BD31-4B8C-83A1-F6EECF244321}">
-                <p14:modId xmlns:p14="http://schemas.microsoft.com/office/powerpoint/2010/main" val="3537350189"/>
+                <p14:modId xmlns:p14="http://schemas.microsoft.com/office/powerpoint/2010/main" val="3658980245"/>
               </p:ext>
             </p:extLst>
           </p:nvPr>
@@ -5979,7 +6344,317 @@
                     <a:bodyPr/>
                     <a:lstStyle/>
                     <a:p>
+                      <a:r>
+                        <a:rPr lang="en-US" altLang="zh-CN" sz="1800" dirty="0" smtClean="0">
+                          <a:solidFill>
+                            <a:srgbClr val="A000A0"/>
+                          </a:solidFill>
+                          <a:latin typeface="新宋体"/>
+                          <a:ea typeface="新宋体"/>
+                        </a:rPr>
+                        <a:t>__global__</a:t>
+                      </a:r>
+                    </a:p>
+                    <a:p>
                       <a:endParaRPr lang="zh-CN" altLang="en-US" dirty="0">
+                        <a:solidFill>
+                          <a:schemeClr val="bg1"/>
+                        </a:solidFill>
+                      </a:endParaRPr>
+                    </a:p>
+                  </a:txBody>
+                  <a:tcPr/>
+                </a:tc>
+              </a:tr>
+              <a:tr h="685132">
+                <a:tc>
+                  <a:txBody>
+                    <a:bodyPr/>
+                    <a:lstStyle/>
+                    <a:p>
+                      <a:pPr marL="0" marR="0" indent="0" algn="l" defTabSz="914400" rtl="0" eaLnBrk="1" fontAlgn="auto" latinLnBrk="0" hangingPunct="1">
+                        <a:lnSpc>
+                          <a:spcPct val="100000"/>
+                        </a:lnSpc>
+                        <a:spcBef>
+                          <a:spcPts val="0"/>
+                        </a:spcBef>
+                        <a:spcAft>
+                          <a:spcPts val="0"/>
+                        </a:spcAft>
+                        <a:buClrTx/>
+                        <a:buSzTx/>
+                        <a:buFontTx/>
+                        <a:buNone/>
+                        <a:tabLst/>
+                        <a:defRPr/>
+                      </a:pPr>
+                      <a:r>
+                        <a:rPr lang="zh-CN" altLang="en-US" sz="3200" dirty="0" smtClean="0">
+                          <a:solidFill>
+                            <a:schemeClr val="bg1"/>
+                          </a:solidFill>
+                        </a:rPr>
+                        <a:t>数组索引</a:t>
+                      </a:r>
+                    </a:p>
+                  </a:txBody>
+                  <a:tcPr/>
+                </a:tc>
+                <a:tc>
+                  <a:txBody>
+                    <a:bodyPr/>
+                    <a:lstStyle/>
+                    <a:p>
+                      <a:pPr marL="0" marR="0" indent="0" algn="l" defTabSz="914400" rtl="0" eaLnBrk="1" fontAlgn="auto" latinLnBrk="0" hangingPunct="1">
+                        <a:lnSpc>
+                          <a:spcPct val="100000"/>
+                        </a:lnSpc>
+                        <a:spcBef>
+                          <a:spcPts val="0"/>
+                        </a:spcBef>
+                        <a:spcAft>
+                          <a:spcPts val="0"/>
+                        </a:spcAft>
+                        <a:buClrTx/>
+                        <a:buSzTx/>
+                        <a:buFontTx/>
+                        <a:buNone/>
+                        <a:tabLst/>
+                        <a:defRPr/>
+                      </a:pPr>
+                      <a:r>
+                        <a:rPr lang="en-US" altLang="zh-CN" sz="1800" dirty="0" smtClean="0">
+                          <a:solidFill>
+                            <a:srgbClr val="008000"/>
+                          </a:solidFill>
+                          <a:latin typeface="新宋体"/>
+                          <a:ea typeface="新宋体"/>
+                        </a:rPr>
+                        <a:t>for (</a:t>
+                      </a:r>
+                      <a:r>
+                        <a:rPr lang="en-US" altLang="zh-CN" sz="1800" dirty="0" err="1" smtClean="0">
+                          <a:solidFill>
+                            <a:srgbClr val="008000"/>
+                          </a:solidFill>
+                          <a:latin typeface="新宋体"/>
+                          <a:ea typeface="新宋体"/>
+                        </a:rPr>
+                        <a:t>i</a:t>
+                      </a:r>
+                      <a:r>
+                        <a:rPr lang="en-US" altLang="zh-CN" sz="1800" dirty="0" smtClean="0">
+                          <a:solidFill>
+                            <a:srgbClr val="008000"/>
+                          </a:solidFill>
+                          <a:latin typeface="新宋体"/>
+                          <a:ea typeface="新宋体"/>
+                        </a:rPr>
+                        <a:t>)</a:t>
+                      </a:r>
+                    </a:p>
+                    <a:p>
+                      <a:endParaRPr lang="zh-CN" altLang="en-US" dirty="0">
+                        <a:solidFill>
+                          <a:schemeClr val="bg1"/>
+                        </a:solidFill>
+                      </a:endParaRPr>
+                    </a:p>
+                  </a:txBody>
+                  <a:tcPr/>
+                </a:tc>
+                <a:tc>
+                  <a:txBody>
+                    <a:bodyPr/>
+                    <a:lstStyle/>
+                    <a:p>
+                      <a:r>
+                        <a:rPr lang="en-US" altLang="zh-CN" sz="1800" dirty="0" err="1" smtClean="0">
+                          <a:solidFill>
+                            <a:srgbClr val="000080"/>
+                          </a:solidFill>
+                          <a:latin typeface="新宋体"/>
+                          <a:ea typeface="新宋体"/>
+                        </a:rPr>
+                        <a:t>threadIdx</a:t>
+                      </a:r>
+                      <a:r>
+                        <a:rPr lang="en-US" altLang="zh-CN" sz="1800" dirty="0" err="1" smtClean="0">
+                          <a:solidFill>
+                            <a:prstClr val="black"/>
+                          </a:solidFill>
+                          <a:latin typeface="新宋体"/>
+                          <a:ea typeface="新宋体"/>
+                        </a:rPr>
+                        <a:t>.</a:t>
+                      </a:r>
+                      <a:r>
+                        <a:rPr lang="en-US" altLang="zh-CN" sz="1800" dirty="0" err="1" smtClean="0">
+                          <a:solidFill>
+                            <a:srgbClr val="000080"/>
+                          </a:solidFill>
+                          <a:latin typeface="新宋体"/>
+                          <a:ea typeface="新宋体"/>
+                        </a:rPr>
+                        <a:t>x</a:t>
+                      </a:r>
+                      <a:endParaRPr lang="en-US" altLang="zh-CN" sz="1800" dirty="0" smtClean="0">
+                        <a:solidFill>
+                          <a:srgbClr val="000080"/>
+                        </a:solidFill>
+                        <a:latin typeface="新宋体"/>
+                        <a:ea typeface="新宋体"/>
+                      </a:endParaRPr>
+                    </a:p>
+                    <a:p>
+                      <a:endParaRPr lang="zh-CN" altLang="en-US" dirty="0"/>
+                    </a:p>
+                  </a:txBody>
+                  <a:tcPr/>
+                </a:tc>
+              </a:tr>
+              <a:tr h="685132">
+                <a:tc>
+                  <a:txBody>
+                    <a:bodyPr/>
+                    <a:lstStyle/>
+                    <a:p>
+                      <a:r>
+                        <a:rPr lang="zh-CN" altLang="en-US" sz="3200" dirty="0" smtClean="0">
+                          <a:solidFill>
+                            <a:schemeClr val="bg1"/>
+                          </a:solidFill>
+                        </a:rPr>
+                        <a:t>函数调用</a:t>
+                      </a:r>
+                      <a:endParaRPr lang="zh-CN" altLang="en-US" sz="3200" dirty="0">
+                        <a:solidFill>
+                          <a:schemeClr val="bg1"/>
+                        </a:solidFill>
+                      </a:endParaRPr>
+                    </a:p>
+                  </a:txBody>
+                  <a:tcPr/>
+                </a:tc>
+                <a:tc>
+                  <a:txBody>
+                    <a:bodyPr/>
+                    <a:lstStyle/>
+                    <a:p>
+                      <a:pPr marL="0" marR="0" indent="0" algn="l" defTabSz="914400" rtl="0" eaLnBrk="1" fontAlgn="auto" latinLnBrk="0" hangingPunct="1">
+                        <a:lnSpc>
+                          <a:spcPct val="100000"/>
+                        </a:lnSpc>
+                        <a:spcBef>
+                          <a:spcPts val="0"/>
+                        </a:spcBef>
+                        <a:spcAft>
+                          <a:spcPts val="0"/>
+                        </a:spcAft>
+                        <a:buClrTx/>
+                        <a:buSzTx/>
+                        <a:buFontTx/>
+                        <a:buNone/>
+                        <a:tabLst/>
+                        <a:defRPr/>
+                      </a:pPr>
+                      <a:r>
+                        <a:rPr lang="en-US" altLang="zh-CN" sz="1800" dirty="0" err="1" smtClean="0">
+                          <a:solidFill>
+                            <a:srgbClr val="880000"/>
+                          </a:solidFill>
+                          <a:latin typeface="新宋体"/>
+                          <a:ea typeface="新宋体"/>
+                        </a:rPr>
+                        <a:t>func</a:t>
+                      </a:r>
+                      <a:r>
+                        <a:rPr lang="en-US" altLang="zh-CN" sz="1800" dirty="0" smtClean="0">
+                          <a:solidFill>
+                            <a:srgbClr val="880000"/>
+                          </a:solidFill>
+                          <a:latin typeface="新宋体"/>
+                          <a:ea typeface="新宋体"/>
+                        </a:rPr>
+                        <a:t> </a:t>
+                      </a:r>
+                      <a:r>
+                        <a:rPr lang="en-US" altLang="zh-CN" sz="1800" dirty="0" smtClean="0">
+                          <a:solidFill>
+                            <a:prstClr val="black"/>
+                          </a:solidFill>
+                          <a:latin typeface="新宋体"/>
+                          <a:ea typeface="新宋体"/>
+                        </a:rPr>
+                        <a:t>( )</a:t>
+                      </a:r>
+                    </a:p>
+                    <a:p>
+                      <a:endParaRPr lang="zh-CN" altLang="en-US" dirty="0">
+                        <a:solidFill>
+                          <a:schemeClr val="bg1"/>
+                        </a:solidFill>
+                      </a:endParaRPr>
+                    </a:p>
+                  </a:txBody>
+                  <a:tcPr/>
+                </a:tc>
+                <a:tc>
+                  <a:txBody>
+                    <a:bodyPr/>
+                    <a:lstStyle/>
+                    <a:p>
+                      <a:r>
+                        <a:rPr lang="en-US" altLang="zh-CN" sz="1800" dirty="0" err="1" smtClean="0">
+                          <a:solidFill>
+                            <a:srgbClr val="880000"/>
+                          </a:solidFill>
+                          <a:latin typeface="新宋体"/>
+                          <a:ea typeface="新宋体"/>
+                        </a:rPr>
+                        <a:t>func</a:t>
+                      </a:r>
+                      <a:r>
+                        <a:rPr lang="en-US" altLang="zh-CN" sz="1800" dirty="0" smtClean="0">
+                          <a:solidFill>
+                            <a:srgbClr val="880000"/>
+                          </a:solidFill>
+                          <a:latin typeface="新宋体"/>
+                          <a:ea typeface="新宋体"/>
+                        </a:rPr>
+                        <a:t> </a:t>
+                      </a:r>
+                      <a:r>
+                        <a:rPr lang="en-US" altLang="zh-CN" sz="1800" dirty="0" smtClean="0">
+                          <a:latin typeface="新宋体"/>
+                          <a:ea typeface="新宋体"/>
+                        </a:rPr>
+                        <a:t>&lt;&lt;&lt;1,</a:t>
+                      </a:r>
+                      <a:r>
+                        <a:rPr lang="en-US" altLang="zh-CN" sz="1800" dirty="0" smtClean="0">
+                          <a:solidFill>
+                            <a:srgbClr val="000080"/>
+                          </a:solidFill>
+                          <a:latin typeface="新宋体"/>
+                          <a:ea typeface="新宋体"/>
+                        </a:rPr>
+                        <a:t>n</a:t>
+                      </a:r>
+                      <a:r>
+                        <a:rPr lang="en-US" altLang="zh-CN" sz="1800" dirty="0" smtClean="0">
+                          <a:solidFill>
+                            <a:prstClr val="black"/>
+                          </a:solidFill>
+                          <a:latin typeface="新宋体"/>
+                          <a:ea typeface="新宋体"/>
+                        </a:rPr>
+                        <a:t>&gt;&gt;&gt; ( )</a:t>
+                      </a:r>
+                    </a:p>
+                    <a:p>
+                      <a:endParaRPr lang="zh-CN" altLang="en-US" dirty="0" smtClean="0">
                         <a:solidFill>
                           <a:schemeClr val="bg1"/>
                         </a:solidFill>
@@ -6001,7 +6676,7 @@
                             <a:schemeClr val="bg1"/>
                           </a:solidFill>
                         </a:rPr>
-                        <a:t>变量</a:t>
+                        <a:t>数组存储</a:t>
                       </a:r>
                       <a:endParaRPr lang="zh-CN" altLang="en-US" sz="3200" dirty="0">
                         <a:solidFill>
@@ -6017,57 +6692,24 @@
                     <a:bodyPr/>
                     <a:lstStyle/>
                     <a:p>
-                      <a:endParaRPr lang="zh-CN" altLang="en-US">
+                      <a:r>
+                        <a:rPr lang="en-US" altLang="zh-CN" sz="1800" dirty="0" err="1" smtClean="0">
+                          <a:solidFill>
+                            <a:srgbClr val="A000A0"/>
+                          </a:solidFill>
+                          <a:latin typeface="新宋体"/>
+                          <a:ea typeface="新宋体"/>
+                        </a:rPr>
+                        <a:t>malloc</a:t>
+                      </a:r>
+                      <a:endParaRPr lang="en-US" altLang="zh-CN" sz="1800" dirty="0" smtClean="0">
                         <a:solidFill>
-                          <a:schemeClr val="bg1"/>
+                          <a:srgbClr val="A000A0"/>
                         </a:solidFill>
+                        <a:latin typeface="新宋体"/>
+                        <a:ea typeface="新宋体"/>
                       </a:endParaRPr>
                     </a:p>
-                  </a:txBody>
-                  <a:tcPr/>
-                </a:tc>
-                <a:tc>
-                  <a:txBody>
-                    <a:bodyPr/>
-                    <a:lstStyle/>
-                    <a:p>
-                      <a:endParaRPr lang="zh-CN" altLang="en-US">
-                        <a:solidFill>
-                          <a:schemeClr val="bg1"/>
-                        </a:solidFill>
-                      </a:endParaRPr>
-                    </a:p>
-                  </a:txBody>
-                  <a:tcPr/>
-                </a:tc>
-              </a:tr>
-              <a:tr h="685132">
-                <a:tc>
-                  <a:txBody>
-                    <a:bodyPr/>
-                    <a:lstStyle/>
-                    <a:p>
-                      <a:r>
-                        <a:rPr lang="zh-CN" altLang="en-US" sz="3200" dirty="0" smtClean="0">
-                          <a:solidFill>
-                            <a:schemeClr val="bg1"/>
-                          </a:solidFill>
-                        </a:rPr>
-                        <a:t>数组</a:t>
-                      </a:r>
-                      <a:endParaRPr lang="zh-CN" altLang="en-US" sz="3200" dirty="0">
-                        <a:solidFill>
-                          <a:schemeClr val="bg1"/>
-                        </a:solidFill>
-                      </a:endParaRPr>
-                    </a:p>
-                  </a:txBody>
-                  <a:tcPr/>
-                </a:tc>
-                <a:tc>
-                  <a:txBody>
-                    <a:bodyPr/>
-                    <a:lstStyle/>
                     <a:p>
                       <a:endParaRPr lang="zh-CN" altLang="en-US" dirty="0">
                         <a:solidFill>
@@ -6083,62 +6725,41 @@
                     <a:bodyPr/>
                     <a:lstStyle/>
                     <a:p>
-                      <a:endParaRPr lang="zh-CN" altLang="en-US">
+                      <a:r>
+                        <a:rPr lang="en-US" altLang="zh-CN" sz="1800" dirty="0" err="1" smtClean="0">
+                          <a:solidFill>
+                            <a:srgbClr val="880000"/>
+                          </a:solidFill>
+                          <a:latin typeface="新宋体"/>
+                          <a:ea typeface="新宋体"/>
+                        </a:rPr>
+                        <a:t>cudaMalloc</a:t>
+                      </a:r>
+                      <a:endParaRPr lang="en-US" altLang="zh-CN" sz="1800" dirty="0" smtClean="0">
                         <a:solidFill>
-                          <a:schemeClr val="bg1"/>
+                          <a:srgbClr val="880000"/>
                         </a:solidFill>
+                        <a:latin typeface="新宋体"/>
+                        <a:ea typeface="新宋体"/>
                       </a:endParaRPr>
                     </a:p>
-                  </a:txBody>
-                  <a:tcPr/>
-                </a:tc>
-              </a:tr>
-              <a:tr h="685132">
-                <a:tc>
-                  <a:txBody>
-                    <a:bodyPr/>
-                    <a:lstStyle/>
                     <a:p>
                       <a:r>
-                        <a:rPr lang="zh-CN" altLang="en-US" sz="3200" dirty="0" smtClean="0">
+                        <a:rPr lang="en-US" altLang="zh-CN" sz="1800" dirty="0" err="1" smtClean="0">
                           <a:solidFill>
-                            <a:schemeClr val="bg1"/>
+                            <a:srgbClr val="880000"/>
                           </a:solidFill>
+                          <a:latin typeface="新宋体"/>
+                          <a:ea typeface="新宋体"/>
                         </a:rPr>
-                        <a:t>函数</a:t>
+                        <a:t>cudaMemcpy</a:t>
                       </a:r>
-                      <a:endParaRPr lang="zh-CN" altLang="en-US" sz="3200" dirty="0">
+                      <a:endParaRPr lang="en-US" altLang="zh-CN" sz="1800" dirty="0" smtClean="0">
                         <a:solidFill>
-                          <a:schemeClr val="bg1"/>
+                          <a:srgbClr val="880000"/>
                         </a:solidFill>
-                      </a:endParaRPr>
-                    </a:p>
-                  </a:txBody>
-                  <a:tcPr/>
-                </a:tc>
-                <a:tc>
-                  <a:txBody>
-                    <a:bodyPr/>
-                    <a:lstStyle/>
-                    <a:p>
-                      <a:endParaRPr lang="zh-CN" altLang="en-US" dirty="0">
-                        <a:solidFill>
-                          <a:schemeClr val="bg1"/>
-                        </a:solidFill>
-                      </a:endParaRPr>
-                    </a:p>
-                  </a:txBody>
-                  <a:tcPr/>
-                </a:tc>
-                <a:tc>
-                  <a:txBody>
-                    <a:bodyPr/>
-                    <a:lstStyle/>
-                    <a:p>
-                      <a:endParaRPr lang="zh-CN" altLang="en-US" dirty="0">
-                        <a:solidFill>
-                          <a:schemeClr val="bg1"/>
-                        </a:solidFill>
+                        <a:latin typeface="新宋体"/>
+                        <a:ea typeface="新宋体"/>
                       </a:endParaRPr>
                     </a:p>
                   </a:txBody>
@@ -6198,330 +6819,74 @@
           <a:chExt cx="0" cy="0"/>
         </a:xfrm>
       </p:grpSpPr>
-      <p:sp>
-        <p:nvSpPr>
-          <p:cNvPr id="2" name="标题 1"/>
-          <p:cNvSpPr>
-            <a:spLocks noGrp="1"/>
-          </p:cNvSpPr>
-          <p:nvPr>
-            <p:ph type="title"/>
-          </p:nvPr>
-        </p:nvSpPr>
-        <p:spPr>
-          <a:xfrm>
-            <a:off x="884238" y="247650"/>
-            <a:ext cx="9204325" cy="978729"/>
-          </a:xfrm>
-        </p:spPr>
-        <p:txBody>
-          <a:bodyPr/>
-          <a:lstStyle/>
-          <a:p>
-            <a:r>
-              <a:rPr lang="zh-CN" altLang="en-US" dirty="0" smtClean="0"/>
-              <a:t>存储模型</a:t>
-            </a:r>
-            <a:r>
-              <a:rPr lang="en-US" altLang="zh-CN" dirty="0"/>
-              <a:t/>
-            </a:r>
-            <a:br>
-              <a:rPr lang="en-US" altLang="zh-CN" dirty="0"/>
-            </a:br>
-            <a:r>
-              <a:rPr lang="zh-CN" altLang="en-US" sz="2800" dirty="0" smtClean="0"/>
-              <a:t>示例</a:t>
-            </a:r>
-            <a:endParaRPr lang="zh-CN" altLang="en-US" sz="2800" dirty="0"/>
-          </a:p>
-        </p:txBody>
-      </p:sp>
-      <p:sp>
-        <p:nvSpPr>
-          <p:cNvPr id="3" name="内容占位符 2"/>
-          <p:cNvSpPr>
-            <a:spLocks noGrp="1"/>
-          </p:cNvSpPr>
-          <p:nvPr>
-            <p:ph idx="1"/>
-          </p:nvPr>
-        </p:nvSpPr>
-        <p:spPr>
-          <a:xfrm>
-            <a:off x="882779" y="1439863"/>
-            <a:ext cx="4928085" cy="4252912"/>
-          </a:xfrm>
-        </p:spPr>
-        <p:txBody>
-          <a:bodyPr/>
-          <a:lstStyle/>
-          <a:p>
-            <a:r>
-              <a:rPr lang="zh-CN" altLang="en-US" sz="3200" dirty="0" smtClean="0"/>
-              <a:t>例</a:t>
-            </a:r>
-            <a:r>
-              <a:rPr lang="en-US" altLang="zh-CN" sz="3200" dirty="0" smtClean="0"/>
-              <a:t>1</a:t>
-            </a:r>
-            <a:r>
-              <a:rPr lang="zh-CN" altLang="en-US" sz="3200" dirty="0" smtClean="0"/>
-              <a:t>用</a:t>
-            </a:r>
-            <a:r>
-              <a:rPr lang="zh-CN" altLang="en-US" sz="3200" dirty="0"/>
-              <a:t>到： </a:t>
-            </a:r>
-            <a:r>
-              <a:rPr lang="en-US" altLang="zh-CN" sz="3200" dirty="0"/>
-              <a:t>register </a:t>
-            </a:r>
-            <a:r>
-              <a:rPr lang="en-US" altLang="zh-CN" sz="3200" dirty="0" smtClean="0"/>
-              <a:t>memory</a:t>
-            </a:r>
-          </a:p>
-          <a:p>
-            <a:endParaRPr lang="en-US" altLang="zh-CN" sz="3200" dirty="0" smtClean="0"/>
-          </a:p>
-          <a:p>
-            <a:r>
-              <a:rPr lang="zh-CN" altLang="en-US" sz="3200" dirty="0" smtClean="0"/>
-              <a:t>常用</a:t>
-            </a:r>
-            <a:r>
-              <a:rPr lang="zh-CN" altLang="en-US" sz="3200" dirty="0"/>
-              <a:t>的</a:t>
-            </a:r>
-            <a:r>
-              <a:rPr lang="zh-CN" altLang="en-US" sz="3200" dirty="0" smtClean="0"/>
-              <a:t>还有</a:t>
-            </a:r>
-            <a:r>
-              <a:rPr lang="en-US" altLang="zh-CN" sz="3200" dirty="0" smtClean="0"/>
-              <a:t>global/constant/shared memory</a:t>
-            </a:r>
-            <a:r>
-              <a:rPr lang="zh-CN" altLang="en-US" sz="3200" dirty="0" smtClean="0"/>
-              <a:t>，</a:t>
-            </a:r>
-            <a:r>
-              <a:rPr lang="zh-CN" altLang="en-US" sz="3200" dirty="0"/>
-              <a:t>下面延伸介绍后面三种存储器的用法。</a:t>
-            </a:r>
-            <a:endParaRPr lang="en-US" altLang="zh-CN" sz="3200" dirty="0"/>
-          </a:p>
-          <a:p>
-            <a:endParaRPr lang="en-US" altLang="zh-CN" sz="3200" dirty="0" smtClean="0"/>
-          </a:p>
-        </p:txBody>
-      </p:sp>
-      <p:sp>
-        <p:nvSpPr>
-          <p:cNvPr id="4" name="内容占位符 2"/>
-          <p:cNvSpPr txBox="1">
-            <a:spLocks/>
-          </p:cNvSpPr>
+      <p:pic>
+        <p:nvPicPr>
+          <p:cNvPr id="1027" name="Picture 3"/>
+          <p:cNvPicPr>
+            <a:picLocks noChangeAspect="1" noChangeArrowheads="1"/>
+          </p:cNvPicPr>
           <p:nvPr/>
-        </p:nvSpPr>
+        </p:nvPicPr>
+        <p:blipFill>
+          <a:blip r:embed="rId2">
+            <a:extLst>
+              <a:ext uri="{28A0092B-C50C-407E-A947-70E740481C1C}">
+                <a14:useLocalDpi xmlns:a14="http://schemas.microsoft.com/office/drawing/2010/main" val="0"/>
+              </a:ext>
+            </a:extLst>
+          </a:blip>
+          <a:srcRect/>
+          <a:stretch>
+            <a:fillRect/>
+          </a:stretch>
+        </p:blipFill>
         <p:spPr bwMode="auto">
           <a:xfrm>
-            <a:off x="6127598" y="1434603"/>
-            <a:ext cx="4816476" cy="4252912"/>
+            <a:off x="2638425" y="419100"/>
+            <a:ext cx="5695950" cy="5334000"/>
           </a:xfrm>
           <a:prstGeom prst="rect">
             <a:avLst/>
           </a:prstGeom>
           <a:noFill/>
-          <a:ln w="9525">
+          <a:ln>
             <a:noFill/>
-            <a:miter lim="800000"/>
-            <a:headEnd/>
-            <a:tailEnd/>
           </a:ln>
+          <a:effectLst/>
+          <a:extLst>
+            <a:ext uri="{909E8E84-426E-40DD-AFC4-6F175D3DCCD1}">
+              <a14:hiddenFill xmlns:a14="http://schemas.microsoft.com/office/drawing/2010/main">
+                <a:solidFill>
+                  <a:schemeClr val="accent1"/>
+                </a:solidFill>
+              </a14:hiddenFill>
+            </a:ext>
+            <a:ext uri="{91240B29-F687-4F45-9708-019B960494DF}">
+              <a14:hiddenLine xmlns:a14="http://schemas.microsoft.com/office/drawing/2010/main" w="9525">
+                <a:solidFill>
+                  <a:schemeClr val="tx1"/>
+                </a:solidFill>
+                <a:miter lim="800000"/>
+                <a:headEnd/>
+                <a:tailEnd/>
+              </a14:hiddenLine>
+            </a:ext>
+            <a:ext uri="{AF507438-7753-43E0-B8FC-AC1667EBCBE1}">
+              <a14:hiddenEffects xmlns:a14="http://schemas.microsoft.com/office/drawing/2010/main">
+                <a:effectLst>
+                  <a:outerShdw dist="35921" dir="2700000" algn="ctr" rotWithShape="0">
+                    <a:schemeClr val="bg2"/>
+                  </a:outerShdw>
+                </a:effectLst>
+              </a14:hiddenEffects>
+            </a:ext>
+          </a:extLst>
         </p:spPr>
-        <p:txBody>
-          <a:bodyPr vert="horz" wrap="square" lIns="91440" tIns="45720" rIns="91440" bIns="45720" numCol="1" anchor="t" anchorCtr="0" compatLnSpc="1">
-            <a:prstTxWarp prst="textNoShape">
-              <a:avLst/>
-            </a:prstTxWarp>
-          </a:bodyPr>
-          <a:lstStyle>
-            <a:lvl1pPr marL="342900" indent="-342900" algn="l" rtl="0" eaLnBrk="1" fontAlgn="base" hangingPunct="1">
-              <a:spcBef>
-                <a:spcPct val="20000"/>
-              </a:spcBef>
-              <a:spcAft>
-                <a:spcPct val="0"/>
-              </a:spcAft>
-              <a:buSzPct val="100000"/>
-              <a:buFontTx/>
-              <a:buBlip>
-                <a:blip r:embed="rId3"/>
-              </a:buBlip>
-              <a:defRPr sz="2400" b="0">
-                <a:solidFill>
-                  <a:schemeClr val="tx1"/>
-                </a:solidFill>
-                <a:latin typeface="Trebuchet MS" pitchFamily="34" charset="0"/>
-                <a:ea typeface="+mn-ea"/>
-                <a:cs typeface="+mn-cs"/>
-              </a:defRPr>
-            </a:lvl1pPr>
-            <a:lvl2pPr marL="914400" indent="-342900" algn="l" rtl="0" eaLnBrk="1" fontAlgn="base" hangingPunct="1">
-              <a:spcBef>
-                <a:spcPct val="20000"/>
-              </a:spcBef>
-              <a:spcAft>
-                <a:spcPct val="0"/>
-              </a:spcAft>
-              <a:buSzPct val="100000"/>
-              <a:buFontTx/>
-              <a:buBlip>
-                <a:blip r:embed="rId3"/>
-              </a:buBlip>
-              <a:defRPr sz="2000" b="0">
-                <a:solidFill>
-                  <a:schemeClr val="tx1"/>
-                </a:solidFill>
-                <a:latin typeface="Trebuchet MS" pitchFamily="34" charset="0"/>
-              </a:defRPr>
-            </a:lvl2pPr>
-            <a:lvl3pPr marL="1371600" indent="-282575" algn="l" rtl="0" eaLnBrk="1" fontAlgn="base" hangingPunct="1">
-              <a:spcBef>
-                <a:spcPct val="20000"/>
-              </a:spcBef>
-              <a:spcAft>
-                <a:spcPct val="0"/>
-              </a:spcAft>
-              <a:buSzPct val="100000"/>
-              <a:buFontTx/>
-              <a:buBlip>
-                <a:blip r:embed="rId3"/>
-              </a:buBlip>
-              <a:defRPr sz="1800" b="0">
-                <a:solidFill>
-                  <a:schemeClr val="tx1"/>
-                </a:solidFill>
-                <a:latin typeface="Trebuchet MS" pitchFamily="34" charset="0"/>
-              </a:defRPr>
-            </a:lvl3pPr>
-            <a:lvl4pPr marL="1774825" indent="-228600" algn="l" rtl="0" eaLnBrk="1" fontAlgn="base" hangingPunct="1">
-              <a:spcBef>
-                <a:spcPct val="20000"/>
-              </a:spcBef>
-              <a:spcAft>
-                <a:spcPct val="0"/>
-              </a:spcAft>
-              <a:buChar char="–"/>
-              <a:defRPr sz="2000">
-                <a:solidFill>
-                  <a:schemeClr val="tx1"/>
-                </a:solidFill>
-                <a:latin typeface="+mn-lt"/>
-              </a:defRPr>
-            </a:lvl4pPr>
-            <a:lvl5pPr marL="2117725" indent="-228600" algn="l" rtl="0" eaLnBrk="1" fontAlgn="base" hangingPunct="1">
-              <a:spcBef>
-                <a:spcPct val="20000"/>
-              </a:spcBef>
-              <a:spcAft>
-                <a:spcPct val="0"/>
-              </a:spcAft>
-              <a:buChar char="»"/>
-              <a:defRPr sz="2000">
-                <a:solidFill>
-                  <a:schemeClr val="tx1"/>
-                </a:solidFill>
-                <a:latin typeface="+mn-lt"/>
-              </a:defRPr>
-            </a:lvl5pPr>
-            <a:lvl6pPr marL="2574925" indent="-228600" algn="l" rtl="0" eaLnBrk="1" fontAlgn="base" hangingPunct="1">
-              <a:spcBef>
-                <a:spcPct val="20000"/>
-              </a:spcBef>
-              <a:spcAft>
-                <a:spcPct val="0"/>
-              </a:spcAft>
-              <a:buChar char="»"/>
-              <a:defRPr sz="2000">
-                <a:solidFill>
-                  <a:schemeClr val="bg1"/>
-                </a:solidFill>
-                <a:latin typeface="+mn-lt"/>
-              </a:defRPr>
-            </a:lvl6pPr>
-            <a:lvl7pPr marL="3032125" indent="-228600" algn="l" rtl="0" eaLnBrk="1" fontAlgn="base" hangingPunct="1">
-              <a:spcBef>
-                <a:spcPct val="20000"/>
-              </a:spcBef>
-              <a:spcAft>
-                <a:spcPct val="0"/>
-              </a:spcAft>
-              <a:buChar char="»"/>
-              <a:defRPr sz="2000">
-                <a:solidFill>
-                  <a:schemeClr val="bg1"/>
-                </a:solidFill>
-                <a:latin typeface="+mn-lt"/>
-              </a:defRPr>
-            </a:lvl7pPr>
-            <a:lvl8pPr marL="3489325" indent="-228600" algn="l" rtl="0" eaLnBrk="1" fontAlgn="base" hangingPunct="1">
-              <a:spcBef>
-                <a:spcPct val="20000"/>
-              </a:spcBef>
-              <a:spcAft>
-                <a:spcPct val="0"/>
-              </a:spcAft>
-              <a:buChar char="»"/>
-              <a:defRPr sz="2000">
-                <a:solidFill>
-                  <a:schemeClr val="bg1"/>
-                </a:solidFill>
-                <a:latin typeface="+mn-lt"/>
-              </a:defRPr>
-            </a:lvl8pPr>
-            <a:lvl9pPr marL="3946525" indent="-228600" algn="l" rtl="0" eaLnBrk="1" fontAlgn="base" hangingPunct="1">
-              <a:spcBef>
-                <a:spcPct val="20000"/>
-              </a:spcBef>
-              <a:spcAft>
-                <a:spcPct val="0"/>
-              </a:spcAft>
-              <a:buChar char="»"/>
-              <a:defRPr sz="2000">
-                <a:solidFill>
-                  <a:schemeClr val="bg1"/>
-                </a:solidFill>
-                <a:latin typeface="+mn-lt"/>
-              </a:defRPr>
-            </a:lvl9pPr>
-          </a:lstStyle>
-          <a:p>
-            <a:r>
-              <a:rPr lang="zh-CN" altLang="en-US" sz="3200" dirty="0"/>
-              <a:t>例</a:t>
-            </a:r>
-            <a:r>
-              <a:rPr lang="en-US" altLang="zh-CN" sz="3200" dirty="0"/>
-              <a:t>1</a:t>
-            </a:r>
-            <a:r>
-              <a:rPr lang="zh-CN" altLang="en-US" sz="3200" dirty="0"/>
-              <a:t>升级：共享点坐标</a:t>
-            </a:r>
-            <a:endParaRPr lang="en-US" altLang="zh-CN" sz="3200" dirty="0"/>
-          </a:p>
-          <a:p>
-            <a:endParaRPr lang="en-US" altLang="zh-CN" sz="3200" dirty="0" smtClean="0"/>
-          </a:p>
-        </p:txBody>
-      </p:sp>
+      </p:pic>
     </p:spTree>
     <p:extLst>
       <p:ext uri="{BB962C8B-B14F-4D97-AF65-F5344CB8AC3E}">
-        <p14:creationId xmlns:p14="http://schemas.microsoft.com/office/powerpoint/2010/main" val="533833279"/>
+        <p14:creationId xmlns:p14="http://schemas.microsoft.com/office/powerpoint/2010/main" val="506965390"/>
       </p:ext>
     </p:extLst>
   </p:cSld>
@@ -6569,7 +6934,7 @@
       </p:grpSpPr>
       <p:sp>
         <p:nvSpPr>
-          <p:cNvPr id="2" name="Title 1"/>
+          <p:cNvPr id="2" name="标题 1"/>
           <p:cNvSpPr>
             <a:spLocks noGrp="1"/>
           </p:cNvSpPr>
@@ -6580,7 +6945,7 @@
         <p:spPr>
           <a:xfrm>
             <a:off x="884238" y="247650"/>
-            <a:ext cx="9204325" cy="590931"/>
+            <a:ext cx="9204325" cy="978729"/>
           </a:xfrm>
         </p:spPr>
         <p:txBody>
@@ -6588,20 +6953,27 @@
           <a:lstStyle/>
           <a:p>
             <a:r>
-              <a:rPr lang="zh-CN" altLang="zh-CN" dirty="0"/>
-              <a:t>技巧</a:t>
+              <a:rPr lang="zh-CN" altLang="en-US" dirty="0" smtClean="0"/>
+              <a:t>存储模型</a:t>
             </a:r>
             <a:r>
               <a:rPr lang="en-US" altLang="zh-CN" dirty="0"/>
-              <a:t>Tips</a:t>
-            </a:r>
-            <a:endParaRPr lang="en-US" dirty="0"/>
+              <a:t/>
+            </a:r>
+            <a:br>
+              <a:rPr lang="en-US" altLang="zh-CN" dirty="0"/>
+            </a:br>
+            <a:r>
+              <a:rPr lang="zh-CN" altLang="en-US" sz="2800" dirty="0" smtClean="0"/>
+              <a:t>示例</a:t>
+            </a:r>
+            <a:endParaRPr lang="zh-CN" altLang="en-US" sz="2800" dirty="0"/>
           </a:p>
         </p:txBody>
       </p:sp>
       <p:sp>
         <p:nvSpPr>
-          <p:cNvPr id="3" name="Content Placeholder 2"/>
+          <p:cNvPr id="3" name="内容占位符 2"/>
           <p:cNvSpPr>
             <a:spLocks noGrp="1"/>
           </p:cNvSpPr>
@@ -6611,8 +6983,8 @@
         </p:nvSpPr>
         <p:spPr>
           <a:xfrm>
-            <a:off x="884902" y="1504334"/>
-            <a:ext cx="4254657" cy="4612691"/>
+            <a:off x="882779" y="1439863"/>
+            <a:ext cx="4928085" cy="4252912"/>
           </a:xfrm>
         </p:spPr>
         <p:txBody>
@@ -6620,145 +6992,68 @@
           <a:lstStyle/>
           <a:p>
             <a:r>
-              <a:rPr lang="zh-CN" altLang="en-US" dirty="0" smtClean="0"/>
-              <a:t>线程配置</a:t>
-            </a:r>
-            <a:endParaRPr lang="en-US" altLang="zh-CN" dirty="0" smtClean="0"/>
-          </a:p>
-          <a:p>
-            <a:pPr lvl="1"/>
-            <a:r>
-              <a:rPr lang="zh-CN" altLang="zh-CN" sz="2400" dirty="0"/>
-              <a:t>线程数目不是</a:t>
-            </a:r>
-            <a:r>
-              <a:rPr lang="en-US" altLang="zh-CN" sz="2400" dirty="0"/>
-              <a:t>32</a:t>
-            </a:r>
-            <a:r>
-              <a:rPr lang="zh-CN" altLang="zh-CN" sz="2400" dirty="0"/>
+              <a:rPr lang="zh-CN" altLang="en-US" sz="3200" dirty="0" smtClean="0"/>
+              <a:t>例</a:t>
+            </a:r>
+            <a:r>
+              <a:rPr lang="en-US" altLang="zh-CN" sz="3200" dirty="0" smtClean="0"/>
+              <a:t>1</a:t>
+            </a:r>
+            <a:r>
+              <a:rPr lang="zh-CN" altLang="en-US" sz="3200" dirty="0" smtClean="0"/>
+              <a:t>用</a:t>
+            </a:r>
+            <a:r>
+              <a:rPr lang="zh-CN" altLang="en-US" sz="3200" dirty="0"/>
+              <a:t>到： </a:t>
+            </a:r>
+            <a:r>
+              <a:rPr lang="en-US" altLang="zh-CN" sz="3200" dirty="0"/>
+              <a:t>register </a:t>
+            </a:r>
+            <a:r>
+              <a:rPr lang="en-US" altLang="zh-CN" sz="3200" dirty="0" smtClean="0"/>
+              <a:t>memory</a:t>
+            </a:r>
+          </a:p>
+          <a:p>
+            <a:endParaRPr lang="en-US" altLang="zh-CN" sz="3200" dirty="0" smtClean="0"/>
+          </a:p>
+          <a:p>
+            <a:r>
+              <a:rPr lang="zh-CN" altLang="en-US" sz="3200" dirty="0" smtClean="0"/>
+              <a:t>常用</a:t>
+            </a:r>
+            <a:r>
+              <a:rPr lang="zh-CN" altLang="en-US" sz="3200" dirty="0"/>
               <a:t>的</a:t>
             </a:r>
             <a:r>
-              <a:rPr lang="zh-CN" altLang="zh-CN" sz="2400" dirty="0" smtClean="0"/>
-              <a:t>倍数</a:t>
-            </a:r>
-            <a:endParaRPr lang="en-US" altLang="zh-CN" sz="2400" dirty="0" smtClean="0"/>
-          </a:p>
-          <a:p>
-            <a:pPr lvl="1"/>
-            <a:r>
-              <a:rPr lang="zh-CN" altLang="zh-CN" sz="2400" dirty="0" smtClean="0"/>
-              <a:t>线程</a:t>
-            </a:r>
-            <a:r>
-              <a:rPr lang="zh-CN" altLang="zh-CN" sz="2400" dirty="0"/>
-              <a:t>数目</a:t>
-            </a:r>
-            <a:r>
-              <a:rPr lang="zh-CN" altLang="zh-CN" sz="2400" dirty="0" smtClean="0"/>
-              <a:t>超过</a:t>
-            </a:r>
-            <a:r>
-              <a:rPr lang="zh-CN" altLang="zh-CN" sz="2400" dirty="0" smtClean="0"/>
-              <a:t>阈值</a:t>
-            </a:r>
-            <a:endParaRPr lang="en-US" altLang="zh-CN" sz="2400" dirty="0" smtClean="0"/>
-          </a:p>
-          <a:p>
-            <a:pPr lvl="1"/>
-            <a:endParaRPr lang="en-US" altLang="zh-CN" sz="2400" dirty="0" smtClean="0"/>
-          </a:p>
-          <a:p>
-            <a:r>
-              <a:rPr lang="zh-CN" altLang="en-US" dirty="0" smtClean="0"/>
-              <a:t>测时对比</a:t>
-            </a:r>
-            <a:endParaRPr lang="en-US" altLang="zh-CN" dirty="0" smtClean="0"/>
-          </a:p>
-          <a:p>
-            <a:pPr lvl="1"/>
-            <a:r>
-              <a:rPr lang="zh-CN" altLang="en-US" sz="2400" dirty="0" smtClean="0"/>
-              <a:t>调用</a:t>
-            </a:r>
-            <a:r>
-              <a:rPr lang="en-US" altLang="zh-CN" sz="2400" dirty="0" err="1" smtClean="0"/>
-              <a:t>helper_timer.h</a:t>
-            </a:r>
-            <a:r>
-              <a:rPr lang="en-US" altLang="zh-CN" sz="2400" dirty="0" smtClean="0"/>
-              <a:t> </a:t>
-            </a:r>
-            <a:endParaRPr lang="en-US" altLang="zh-CN" sz="2400" dirty="0"/>
-          </a:p>
-          <a:p>
-            <a:pPr lvl="1"/>
-            <a:r>
-              <a:rPr lang="zh-CN" altLang="en-US" sz="2400" dirty="0"/>
-              <a:t>注意</a:t>
-            </a:r>
-            <a:r>
-              <a:rPr lang="en-US" altLang="zh-CN" sz="2400" dirty="0" smtClean="0"/>
-              <a:t>Synchronize</a:t>
-            </a:r>
-            <a:r>
-              <a:rPr lang="zh-CN" altLang="en-US" sz="2400" dirty="0" smtClean="0"/>
-              <a:t> </a:t>
-            </a:r>
-            <a:endParaRPr lang="en-US" altLang="zh-CN" sz="2400" dirty="0" smtClean="0"/>
-          </a:p>
-          <a:p>
-            <a:pPr lvl="1"/>
-            <a:r>
-              <a:rPr lang="zh-CN" altLang="en-US" sz="2400" dirty="0"/>
-              <a:t>线程数目</a:t>
-            </a:r>
-            <a:r>
-              <a:rPr lang="en-US" altLang="zh-CN" sz="2400" dirty="0"/>
-              <a:t>(</a:t>
-            </a:r>
-            <a:r>
-              <a:rPr lang="zh-CN" altLang="en-US" sz="2400" dirty="0"/>
-              <a:t>问题规模</a:t>
-            </a:r>
-            <a:r>
-              <a:rPr lang="en-US" altLang="zh-CN" sz="2400" dirty="0"/>
-              <a:t>)</a:t>
-            </a:r>
-            <a:r>
-              <a:rPr lang="zh-CN" altLang="en-US" sz="2400" dirty="0"/>
-              <a:t>多大时，</a:t>
-            </a:r>
-            <a:r>
-              <a:rPr lang="en-US" altLang="zh-CN" sz="2400" dirty="0"/>
-              <a:t>GPU</a:t>
-            </a:r>
-            <a:r>
-              <a:rPr lang="zh-CN" altLang="en-US" sz="2400" dirty="0"/>
-              <a:t>发挥的性能赶超</a:t>
-            </a:r>
-            <a:r>
-              <a:rPr lang="en-US" altLang="zh-CN" sz="2400" dirty="0"/>
-              <a:t>CPU</a:t>
-            </a:r>
-            <a:r>
-              <a:rPr lang="zh-CN" altLang="en-US" sz="2400" dirty="0" smtClean="0"/>
-              <a:t>？</a:t>
-            </a:r>
-            <a:endParaRPr lang="en-US" altLang="zh-CN" sz="2400" dirty="0" smtClean="0"/>
-          </a:p>
-          <a:p>
-            <a:endParaRPr lang="en-US" altLang="zh-CN" dirty="0" smtClean="0"/>
-          </a:p>
-          <a:p>
-            <a:endParaRPr lang="en-US" dirty="0"/>
+              <a:rPr lang="zh-CN" altLang="en-US" sz="3200" dirty="0" smtClean="0"/>
+              <a:t>还有</a:t>
+            </a:r>
+            <a:r>
+              <a:rPr lang="en-US" altLang="zh-CN" sz="3200" dirty="0" smtClean="0"/>
+              <a:t>global/constant/shared memory</a:t>
+            </a:r>
+            <a:r>
+              <a:rPr lang="zh-CN" altLang="en-US" sz="3200" dirty="0" smtClean="0"/>
+              <a:t>，</a:t>
+            </a:r>
+            <a:r>
+              <a:rPr lang="zh-CN" altLang="en-US" sz="3200" dirty="0"/>
+              <a:t>下面延伸介绍后面三种存储器的用法。</a:t>
+            </a:r>
+            <a:endParaRPr lang="en-US" altLang="zh-CN" sz="3200" dirty="0"/>
+          </a:p>
+          <a:p>
+            <a:endParaRPr lang="en-US" altLang="zh-CN" sz="3200" dirty="0" smtClean="0"/>
           </a:p>
         </p:txBody>
       </p:sp>
       <p:sp>
         <p:nvSpPr>
-          <p:cNvPr id="4" name="Content Placeholder 2"/>
+          <p:cNvPr id="4" name="内容占位符 2"/>
           <p:cNvSpPr txBox="1">
             <a:spLocks/>
           </p:cNvSpPr>
@@ -6766,8 +7061,8 @@
         </p:nvSpPr>
         <p:spPr bwMode="auto">
           <a:xfrm>
-            <a:off x="6179566" y="1460090"/>
-            <a:ext cx="4107657" cy="4667442"/>
+            <a:off x="6127598" y="1434603"/>
+            <a:ext cx="4816476" cy="4252912"/>
           </a:xfrm>
           <a:prstGeom prst="rect">
             <a:avLst/>
@@ -6939,102 +7234,28 @@
           </a:lstStyle>
           <a:p>
             <a:r>
-              <a:rPr lang="zh-CN" altLang="en-US" dirty="0" smtClean="0"/>
-              <a:t>移植三部曲</a:t>
-            </a:r>
-            <a:endParaRPr lang="en-US" altLang="zh-CN" dirty="0" smtClean="0"/>
-          </a:p>
-          <a:p>
-            <a:pPr lvl="1"/>
-            <a:r>
-              <a:rPr lang="zh-CN" altLang="zh-CN" sz="2400" dirty="0" smtClean="0"/>
-              <a:t>循环变嵌套函数</a:t>
-            </a:r>
-            <a:endParaRPr lang="en-US" altLang="zh-CN" sz="2400" dirty="0" smtClean="0"/>
-          </a:p>
-          <a:p>
-            <a:pPr lvl="1"/>
-            <a:r>
-              <a:rPr lang="zh-CN" altLang="zh-CN" sz="2400" dirty="0"/>
-              <a:t>索引数组变量</a:t>
-            </a:r>
-            <a:r>
-              <a:rPr lang="zh-CN" altLang="zh-CN" sz="2400" dirty="0" smtClean="0"/>
-              <a:t>化</a:t>
-            </a:r>
-            <a:endParaRPr lang="en-US" altLang="zh-CN" sz="2400" dirty="0" smtClean="0"/>
-          </a:p>
-          <a:p>
-            <a:pPr lvl="1"/>
-            <a:r>
-              <a:rPr lang="zh-CN" altLang="zh-CN" sz="2400" dirty="0" smtClean="0"/>
-              <a:t>新</a:t>
-            </a:r>
-            <a:r>
-              <a:rPr lang="zh-CN" altLang="zh-CN" sz="2400" dirty="0"/>
-              <a:t>模型</a:t>
-            </a:r>
-            <a:r>
-              <a:rPr lang="zh-CN" altLang="zh-CN" sz="2400" dirty="0" smtClean="0"/>
-              <a:t>改写</a:t>
-            </a:r>
-            <a:endParaRPr lang="en-US" altLang="zh-CN" sz="2400" dirty="0" smtClean="0"/>
-          </a:p>
-          <a:p>
-            <a:pPr lvl="1"/>
-            <a:endParaRPr lang="en-US" altLang="zh-CN" sz="2400" dirty="0" smtClean="0"/>
-          </a:p>
-          <a:p>
-            <a:r>
-              <a:rPr lang="zh-CN" altLang="en-US" dirty="0" smtClean="0"/>
-              <a:t>其它</a:t>
-            </a:r>
-            <a:endParaRPr lang="en-US" altLang="zh-CN" dirty="0" smtClean="0"/>
-          </a:p>
-          <a:p>
-            <a:pPr lvl="1"/>
-            <a:r>
-              <a:rPr lang="zh-CN" altLang="zh-CN" sz="2400" dirty="0" smtClean="0"/>
-              <a:t>结果验证</a:t>
-            </a:r>
-            <a:endParaRPr lang="en-US" altLang="zh-CN" sz="2400" dirty="0" smtClean="0"/>
-          </a:p>
-          <a:p>
-            <a:pPr lvl="1"/>
-            <a:r>
-              <a:rPr lang="zh-CN" altLang="zh-CN" sz="2400" dirty="0" smtClean="0"/>
-              <a:t>错误定位</a:t>
-            </a:r>
-            <a:endParaRPr lang="en-US" altLang="zh-CN" sz="2400" dirty="0" smtClean="0"/>
-          </a:p>
-          <a:p>
-            <a:pPr lvl="1"/>
-            <a:r>
-              <a:rPr lang="en-US" altLang="zh-CN" sz="2400" dirty="0" smtClean="0"/>
-              <a:t>driver</a:t>
-            </a:r>
-            <a:r>
-              <a:rPr lang="zh-CN" altLang="zh-CN" sz="2400" dirty="0" smtClean="0"/>
-              <a:t>编写</a:t>
-            </a:r>
-            <a:endParaRPr lang="en-US" altLang="zh-CN" sz="2400" dirty="0" smtClean="0"/>
-          </a:p>
-          <a:p>
-            <a:pPr lvl="1"/>
-            <a:endParaRPr lang="en-US" altLang="zh-CN" sz="2400" dirty="0" smtClean="0"/>
-          </a:p>
-          <a:p>
-            <a:endParaRPr lang="en-US" altLang="zh-CN" dirty="0" smtClean="0"/>
-          </a:p>
-          <a:p>
-            <a:endParaRPr lang="en-US" dirty="0"/>
+              <a:rPr lang="zh-CN" altLang="en-US" sz="3200" dirty="0"/>
+              <a:t>例</a:t>
+            </a:r>
+            <a:r>
+              <a:rPr lang="en-US" altLang="zh-CN" sz="3200" dirty="0"/>
+              <a:t>1</a:t>
+            </a:r>
+            <a:r>
+              <a:rPr lang="zh-CN" altLang="en-US" sz="3200" dirty="0"/>
+              <a:t>升级：共享点坐标</a:t>
+            </a:r>
+            <a:endParaRPr lang="en-US" altLang="zh-CN" sz="3200" dirty="0"/>
+          </a:p>
+          <a:p>
+            <a:endParaRPr lang="en-US" altLang="zh-CN" sz="3200" dirty="0" smtClean="0"/>
           </a:p>
         </p:txBody>
       </p:sp>
     </p:spTree>
     <p:extLst>
       <p:ext uri="{BB962C8B-B14F-4D97-AF65-F5344CB8AC3E}">
-        <p14:creationId xmlns:p14="http://schemas.microsoft.com/office/powerpoint/2010/main" val="4291639553"/>
+        <p14:creationId xmlns:p14="http://schemas.microsoft.com/office/powerpoint/2010/main" val="533833279"/>
       </p:ext>
     </p:extLst>
   </p:cSld>
@@ -7957,6 +8178,21 @@
 </file>
 
 <file path=customXml/item1.xml><?xml version="1.0" encoding="utf-8"?>
+<p:properties xmlns:p="http://schemas.microsoft.com/office/2006/metadata/properties" xmlns:xsi="http://www.w3.org/2001/XMLSchema-instance">
+  <documentManagement/>
+</p:properties>
+</file>
+
+<file path=customXml/item2.xml><?xml version="1.0" encoding="utf-8"?>
+<?mso-contentType ?>
+<FormTemplates xmlns="http://schemas.microsoft.com/sharepoint/v3/contenttype/forms">
+  <Display>DocumentLibraryForm</Display>
+  <Edit>DocumentLibraryForm</Edit>
+  <New>DocumentLibraryForm</New>
+</FormTemplates>
+</file>
+
+<file path=customXml/item3.xml><?xml version="1.0" encoding="utf-8"?>
 <ct:contentTypeSchema xmlns:ct="http://schemas.microsoft.com/office/2006/metadata/contentType" xmlns:ma="http://schemas.microsoft.com/office/2006/metadata/properties/metaAttributes" ct:_="" ma:_="" ma:contentTypeName="Document" ma:contentTypeID="0x010100FB38B0B4E3072D428564024F6E85BC07" ma:contentTypeVersion="0" ma:contentTypeDescription="Create a new document." ma:contentTypeScope="" ma:versionID="a559b02ab7d86624fa1c6ada0e69e3cd">
   <xsd:schema xmlns:xsd="http://www.w3.org/2001/XMLSchema" xmlns:p="http://schemas.microsoft.com/office/2006/metadata/properties" targetNamespace="http://schemas.microsoft.com/office/2006/metadata/properties" ma:root="true" ma:fieldsID="4aeb20c0e3442673af7ee10786458764">
     <xsd:element name="properties">
@@ -8005,32 +8241,16 @@
 </ct:contentTypeSchema>
 </file>
 
-<file path=customXml/item2.xml><?xml version="1.0" encoding="utf-8"?>
-<?mso-contentType ?>
-<FormTemplates xmlns="http://schemas.microsoft.com/sharepoint/v3/contenttype/forms">
-  <Display>DocumentLibraryForm</Display>
-  <Edit>DocumentLibraryForm</Edit>
-  <New>DocumentLibraryForm</New>
-</FormTemplates>
-</file>
-
-<file path=customXml/item3.xml><?xml version="1.0" encoding="utf-8"?>
-<p:properties xmlns:p="http://schemas.microsoft.com/office/2006/metadata/properties" xmlns:xsi="http://www.w3.org/2001/XMLSchema-instance">
-  <documentManagement/>
-</p:properties>
-</file>
-
 <file path=customXml/itemProps1.xml><?xml version="1.0" encoding="utf-8"?>
-<ds:datastoreItem xmlns:ds="http://schemas.openxmlformats.org/officeDocument/2006/customXml" ds:itemID="{C9F27BF2-F9EF-4D34-87AA-F1894485F5C8}">
+<ds:datastoreItem xmlns:ds="http://schemas.openxmlformats.org/officeDocument/2006/customXml" ds:itemID="{DF88E22E-2A4B-4FB1-9848-BF16E7DBE74B}">
   <ds:schemaRefs>
-    <ds:schemaRef ds:uri="http://schemas.microsoft.com/office/2006/metadata/contentType"/>
-    <ds:schemaRef ds:uri="http://schemas.microsoft.com/office/2006/metadata/properties/metaAttributes"/>
-    <ds:schemaRef ds:uri="http://www.w3.org/2001/XMLSchema"/>
+    <ds:schemaRef ds:uri="http://schemas.microsoft.com/office/2006/documentManagement/types"/>
+    <ds:schemaRef ds:uri="http://purl.org/dc/dcmitype/"/>
     <ds:schemaRef ds:uri="http://schemas.microsoft.com/office/2006/metadata/properties"/>
+    <ds:schemaRef ds:uri="http://purl.org/dc/terms/"/>
     <ds:schemaRef ds:uri="http://schemas.openxmlformats.org/package/2006/metadata/core-properties"/>
+    <ds:schemaRef ds:uri="http://www.w3.org/XML/1998/namespace"/>
     <ds:schemaRef ds:uri="http://purl.org/dc/elements/1.1/"/>
-    <ds:schemaRef ds:uri="http://purl.org/dc/terms/"/>
-    <ds:schemaRef ds:uri="http://schemas.microsoft.com/office/internal/2005/internalDocumentation"/>
   </ds:schemaRefs>
 </ds:datastoreItem>
 </file>
@@ -8044,15 +8264,16 @@
 </file>
 
 <file path=customXml/itemProps3.xml><?xml version="1.0" encoding="utf-8"?>
-<ds:datastoreItem xmlns:ds="http://schemas.openxmlformats.org/officeDocument/2006/customXml" ds:itemID="{DF88E22E-2A4B-4FB1-9848-BF16E7DBE74B}">
+<ds:datastoreItem xmlns:ds="http://schemas.openxmlformats.org/officeDocument/2006/customXml" ds:itemID="{C9F27BF2-F9EF-4D34-87AA-F1894485F5C8}">
   <ds:schemaRefs>
-    <ds:schemaRef ds:uri="http://schemas.microsoft.com/office/2006/documentManagement/types"/>
-    <ds:schemaRef ds:uri="http://purl.org/dc/dcmitype/"/>
+    <ds:schemaRef ds:uri="http://schemas.microsoft.com/office/2006/metadata/contentType"/>
+    <ds:schemaRef ds:uri="http://schemas.microsoft.com/office/2006/metadata/properties/metaAttributes"/>
+    <ds:schemaRef ds:uri="http://www.w3.org/2001/XMLSchema"/>
     <ds:schemaRef ds:uri="http://schemas.microsoft.com/office/2006/metadata/properties"/>
+    <ds:schemaRef ds:uri="http://schemas.openxmlformats.org/package/2006/metadata/core-properties"/>
+    <ds:schemaRef ds:uri="http://purl.org/dc/elements/1.1/"/>
     <ds:schemaRef ds:uri="http://purl.org/dc/terms/"/>
-    <ds:schemaRef ds:uri="http://schemas.openxmlformats.org/package/2006/metadata/core-properties"/>
-    <ds:schemaRef ds:uri="http://www.w3.org/XML/1998/namespace"/>
-    <ds:schemaRef ds:uri="http://purl.org/dc/elements/1.1/"/>
+    <ds:schemaRef ds:uri="http://schemas.microsoft.com/office/internal/2005/internalDocumentation"/>
   </ds:schemaRefs>
 </ds:datastoreItem>
 </file>
</xml_diff>

<commit_message>
ppt full version v1
</commit_message>
<xml_diff>
--- a/doc/cuda_training_day1_pm(20141219Liu).pptx
+++ b/doc/cuda_training_day1_pm(20141219Liu).pptx
@@ -5,10 +5,10 @@
     <p:sldMasterId id="2147483784" r:id="rId4"/>
   </p:sldMasterIdLst>
   <p:notesMasterIdLst>
-    <p:notesMasterId r:id="rId16"/>
+    <p:notesMasterId r:id="rId22"/>
   </p:notesMasterIdLst>
   <p:handoutMasterIdLst>
-    <p:handoutMasterId r:id="rId17"/>
+    <p:handoutMasterId r:id="rId23"/>
   </p:handoutMasterIdLst>
   <p:sldIdLst>
     <p:sldId id="1017" r:id="rId5"/>
@@ -20,8 +20,14 @@
     <p:sldId id="1035" r:id="rId11"/>
     <p:sldId id="1038" r:id="rId12"/>
     <p:sldId id="1036" r:id="rId13"/>
-    <p:sldId id="1023" r:id="rId14"/>
-    <p:sldId id="1037" r:id="rId15"/>
+    <p:sldId id="1039" r:id="rId14"/>
+    <p:sldId id="1040" r:id="rId15"/>
+    <p:sldId id="1023" r:id="rId16"/>
+    <p:sldId id="1041" r:id="rId17"/>
+    <p:sldId id="1043" r:id="rId18"/>
+    <p:sldId id="1042" r:id="rId19"/>
+    <p:sldId id="1044" r:id="rId20"/>
+    <p:sldId id="1037" r:id="rId21"/>
   </p:sldIdLst>
   <p:sldSz cx="10972800" cy="6172200"/>
   <p:notesSz cx="7010400" cy="9296400"/>
@@ -726,6 +732,602 @@
 </p:notes>
 </file>
 
+<file path=ppt/notesSlides/notesSlide10.xml><?xml version="1.0" encoding="utf-8"?>
+<p:notes xmlns:a="http://schemas.openxmlformats.org/drawingml/2006/main" xmlns:r="http://schemas.openxmlformats.org/officeDocument/2006/relationships" xmlns:p="http://schemas.openxmlformats.org/presentationml/2006/main">
+  <p:cSld>
+    <p:spTree>
+      <p:nvGrpSpPr>
+        <p:cNvPr id="1" name=""/>
+        <p:cNvGrpSpPr/>
+        <p:nvPr/>
+      </p:nvGrpSpPr>
+      <p:grpSpPr>
+        <a:xfrm>
+          <a:off x="0" y="0"/>
+          <a:ext cx="0" cy="0"/>
+          <a:chOff x="0" y="0"/>
+          <a:chExt cx="0" cy="0"/>
+        </a:xfrm>
+      </p:grpSpPr>
+      <p:sp>
+        <p:nvSpPr>
+          <p:cNvPr id="2" name="幻灯片图像占位符 1"/>
+          <p:cNvSpPr>
+            <a:spLocks noGrp="1" noRot="1" noChangeAspect="1"/>
+          </p:cNvSpPr>
+          <p:nvPr>
+            <p:ph type="sldImg"/>
+          </p:nvPr>
+        </p:nvSpPr>
+        <p:spPr/>
+      </p:sp>
+      <p:sp>
+        <p:nvSpPr>
+          <p:cNvPr id="3" name="备注占位符 2"/>
+          <p:cNvSpPr>
+            <a:spLocks noGrp="1"/>
+          </p:cNvSpPr>
+          <p:nvPr>
+            <p:ph type="body" idx="1"/>
+          </p:nvPr>
+        </p:nvSpPr>
+        <p:spPr/>
+        <p:txBody>
+          <a:bodyPr/>
+          <a:lstStyle/>
+          <a:p>
+            <a:endParaRPr lang="zh-CN" altLang="en-US" dirty="0"/>
+          </a:p>
+        </p:txBody>
+      </p:sp>
+      <p:sp>
+        <p:nvSpPr>
+          <p:cNvPr id="4" name="灯片编号占位符 3"/>
+          <p:cNvSpPr>
+            <a:spLocks noGrp="1"/>
+          </p:cNvSpPr>
+          <p:nvPr>
+            <p:ph type="sldNum" sz="quarter" idx="10"/>
+          </p:nvPr>
+        </p:nvSpPr>
+        <p:spPr/>
+        <p:txBody>
+          <a:bodyPr/>
+          <a:lstStyle/>
+          <a:p>
+            <a:pPr>
+              <a:defRPr/>
+            </a:pPr>
+            <a:fld id="{E02D639A-AF38-4D9A-897E-57859A70BDEB}" type="slidenum">
+              <a:rPr lang="en-US" smtClean="0"/>
+              <a:pPr>
+                <a:defRPr/>
+              </a:pPr>
+              <a:t>13</a:t>
+            </a:fld>
+            <a:endParaRPr lang="en-US" dirty="0"/>
+          </a:p>
+        </p:txBody>
+      </p:sp>
+    </p:spTree>
+    <p:extLst>
+      <p:ext uri="{BB962C8B-B14F-4D97-AF65-F5344CB8AC3E}">
+        <p14:creationId xmlns:p14="http://schemas.microsoft.com/office/powerpoint/2010/main" val="3436033865"/>
+      </p:ext>
+    </p:extLst>
+  </p:cSld>
+  <p:clrMapOvr>
+    <a:masterClrMapping/>
+  </p:clrMapOvr>
+</p:notes>
+</file>
+
+<file path=ppt/notesSlides/notesSlide11.xml><?xml version="1.0" encoding="utf-8"?>
+<p:notes xmlns:a="http://schemas.openxmlformats.org/drawingml/2006/main" xmlns:r="http://schemas.openxmlformats.org/officeDocument/2006/relationships" xmlns:p="http://schemas.openxmlformats.org/presentationml/2006/main">
+  <p:cSld>
+    <p:spTree>
+      <p:nvGrpSpPr>
+        <p:cNvPr id="1" name=""/>
+        <p:cNvGrpSpPr/>
+        <p:nvPr/>
+      </p:nvGrpSpPr>
+      <p:grpSpPr>
+        <a:xfrm>
+          <a:off x="0" y="0"/>
+          <a:ext cx="0" cy="0"/>
+          <a:chOff x="0" y="0"/>
+          <a:chExt cx="0" cy="0"/>
+        </a:xfrm>
+      </p:grpSpPr>
+      <p:sp>
+        <p:nvSpPr>
+          <p:cNvPr id="2" name="幻灯片图像占位符 1"/>
+          <p:cNvSpPr>
+            <a:spLocks noGrp="1" noRot="1" noChangeAspect="1"/>
+          </p:cNvSpPr>
+          <p:nvPr>
+            <p:ph type="sldImg"/>
+          </p:nvPr>
+        </p:nvSpPr>
+        <p:spPr/>
+      </p:sp>
+      <p:sp>
+        <p:nvSpPr>
+          <p:cNvPr id="3" name="备注占位符 2"/>
+          <p:cNvSpPr>
+            <a:spLocks noGrp="1"/>
+          </p:cNvSpPr>
+          <p:nvPr>
+            <p:ph type="body" idx="1"/>
+          </p:nvPr>
+        </p:nvSpPr>
+        <p:spPr/>
+        <p:txBody>
+          <a:bodyPr/>
+          <a:lstStyle/>
+          <a:p>
+            <a:endParaRPr lang="zh-CN" altLang="en-US" dirty="0"/>
+          </a:p>
+        </p:txBody>
+      </p:sp>
+      <p:sp>
+        <p:nvSpPr>
+          <p:cNvPr id="4" name="灯片编号占位符 3"/>
+          <p:cNvSpPr>
+            <a:spLocks noGrp="1"/>
+          </p:cNvSpPr>
+          <p:nvPr>
+            <p:ph type="sldNum" sz="quarter" idx="10"/>
+          </p:nvPr>
+        </p:nvSpPr>
+        <p:spPr/>
+        <p:txBody>
+          <a:bodyPr/>
+          <a:lstStyle/>
+          <a:p>
+            <a:pPr>
+              <a:defRPr/>
+            </a:pPr>
+            <a:fld id="{E02D639A-AF38-4D9A-897E-57859A70BDEB}" type="slidenum">
+              <a:rPr lang="en-US" smtClean="0"/>
+              <a:pPr>
+                <a:defRPr/>
+              </a:pPr>
+              <a:t>14</a:t>
+            </a:fld>
+            <a:endParaRPr lang="en-US" dirty="0"/>
+          </a:p>
+        </p:txBody>
+      </p:sp>
+    </p:spTree>
+    <p:extLst>
+      <p:ext uri="{BB962C8B-B14F-4D97-AF65-F5344CB8AC3E}">
+        <p14:creationId xmlns:p14="http://schemas.microsoft.com/office/powerpoint/2010/main" val="3436033865"/>
+      </p:ext>
+    </p:extLst>
+  </p:cSld>
+  <p:clrMapOvr>
+    <a:masterClrMapping/>
+  </p:clrMapOvr>
+</p:notes>
+</file>
+
+<file path=ppt/notesSlides/notesSlide12.xml><?xml version="1.0" encoding="utf-8"?>
+<p:notes xmlns:a="http://schemas.openxmlformats.org/drawingml/2006/main" xmlns:r="http://schemas.openxmlformats.org/officeDocument/2006/relationships" xmlns:p="http://schemas.openxmlformats.org/presentationml/2006/main">
+  <p:cSld>
+    <p:spTree>
+      <p:nvGrpSpPr>
+        <p:cNvPr id="1" name=""/>
+        <p:cNvGrpSpPr/>
+        <p:nvPr/>
+      </p:nvGrpSpPr>
+      <p:grpSpPr>
+        <a:xfrm>
+          <a:off x="0" y="0"/>
+          <a:ext cx="0" cy="0"/>
+          <a:chOff x="0" y="0"/>
+          <a:chExt cx="0" cy="0"/>
+        </a:xfrm>
+      </p:grpSpPr>
+      <p:sp>
+        <p:nvSpPr>
+          <p:cNvPr id="2" name="幻灯片图像占位符 1"/>
+          <p:cNvSpPr>
+            <a:spLocks noGrp="1" noRot="1" noChangeAspect="1"/>
+          </p:cNvSpPr>
+          <p:nvPr>
+            <p:ph type="sldImg"/>
+          </p:nvPr>
+        </p:nvSpPr>
+        <p:spPr/>
+      </p:sp>
+      <p:sp>
+        <p:nvSpPr>
+          <p:cNvPr id="3" name="备注占位符 2"/>
+          <p:cNvSpPr>
+            <a:spLocks noGrp="1"/>
+          </p:cNvSpPr>
+          <p:nvPr>
+            <p:ph type="body" idx="1"/>
+          </p:nvPr>
+        </p:nvSpPr>
+        <p:spPr/>
+        <p:txBody>
+          <a:bodyPr/>
+          <a:lstStyle/>
+          <a:p>
+            <a:r>
+              <a:rPr lang="zh-CN" altLang="en-US" sz="1100" dirty="0" smtClean="0"/>
+              <a:t>例</a:t>
+            </a:r>
+            <a:r>
+              <a:rPr lang="en-US" altLang="zh-CN" sz="1100" dirty="0" smtClean="0"/>
+              <a:t>1</a:t>
+            </a:r>
+            <a:r>
+              <a:rPr lang="zh-CN" altLang="en-US" sz="1100" dirty="0" smtClean="0"/>
+              <a:t>用到： </a:t>
+            </a:r>
+            <a:r>
+              <a:rPr lang="en-US" altLang="zh-CN" sz="1100" dirty="0" smtClean="0"/>
+              <a:t>register memory</a:t>
+            </a:r>
+            <a:r>
+              <a:rPr lang="zh-CN" altLang="en-US" sz="1100" dirty="0" smtClean="0"/>
+              <a:t>，常用的还有</a:t>
+            </a:r>
+            <a:r>
+              <a:rPr lang="en-US" altLang="zh-CN" sz="1100" dirty="0" smtClean="0"/>
+              <a:t>global/constant/shared memory</a:t>
+            </a:r>
+            <a:r>
+              <a:rPr lang="zh-CN" altLang="en-US" sz="1100" dirty="0" smtClean="0"/>
+              <a:t>，下面延伸介绍后面三种存储器的用法。</a:t>
+            </a:r>
+            <a:endParaRPr lang="en-US" altLang="zh-CN" sz="1100" dirty="0" smtClean="0"/>
+          </a:p>
+          <a:p>
+            <a:endParaRPr lang="zh-CN" altLang="en-US" sz="1100" dirty="0" smtClean="0"/>
+          </a:p>
+          <a:p>
+            <a:r>
+              <a:rPr lang="zh-CN" altLang="en-US" sz="1100" dirty="0" smtClean="0"/>
+              <a:t>例</a:t>
+            </a:r>
+            <a:r>
+              <a:rPr lang="en-US" altLang="zh-CN" sz="1100" dirty="0" smtClean="0"/>
+              <a:t>1</a:t>
+            </a:r>
+            <a:r>
+              <a:rPr lang="zh-CN" altLang="en-US" sz="1100" dirty="0" smtClean="0"/>
+              <a:t>升级：共享点坐标</a:t>
+            </a:r>
+            <a:endParaRPr lang="en-US" altLang="zh-CN" sz="1100" dirty="0" smtClean="0"/>
+          </a:p>
+          <a:p>
+            <a:r>
+              <a:rPr lang="en-US" altLang="zh-CN" sz="1100" dirty="0" smtClean="0"/>
+              <a:t>global memory</a:t>
+            </a:r>
+            <a:r>
+              <a:rPr lang="zh-CN" altLang="en-US" sz="1100" dirty="0" smtClean="0"/>
+              <a:t>、</a:t>
+            </a:r>
+            <a:r>
+              <a:rPr lang="en-US" altLang="zh-CN" sz="1100" dirty="0" smtClean="0"/>
+              <a:t>constant memory</a:t>
+            </a:r>
+            <a:r>
+              <a:rPr lang="zh-CN" altLang="en-US" sz="1100" dirty="0" smtClean="0"/>
+              <a:t>、</a:t>
+            </a:r>
+            <a:r>
+              <a:rPr lang="en-US" altLang="zh-CN" sz="1100" dirty="0" smtClean="0"/>
+              <a:t>shared memory</a:t>
+            </a:r>
+            <a:r>
+              <a:rPr lang="zh-CN" altLang="en-US" sz="1100" dirty="0" smtClean="0"/>
+              <a:t>。</a:t>
+            </a:r>
+            <a:endParaRPr lang="zh-CN" altLang="en-US" sz="1100" dirty="0"/>
+          </a:p>
+        </p:txBody>
+      </p:sp>
+      <p:sp>
+        <p:nvSpPr>
+          <p:cNvPr id="4" name="灯片编号占位符 3"/>
+          <p:cNvSpPr>
+            <a:spLocks noGrp="1"/>
+          </p:cNvSpPr>
+          <p:nvPr>
+            <p:ph type="sldNum" sz="quarter" idx="10"/>
+          </p:nvPr>
+        </p:nvSpPr>
+        <p:spPr/>
+        <p:txBody>
+          <a:bodyPr/>
+          <a:lstStyle/>
+          <a:p>
+            <a:pPr>
+              <a:defRPr/>
+            </a:pPr>
+            <a:fld id="{E02D639A-AF38-4D9A-897E-57859A70BDEB}" type="slidenum">
+              <a:rPr lang="en-US" smtClean="0"/>
+              <a:pPr>
+                <a:defRPr/>
+              </a:pPr>
+              <a:t>15</a:t>
+            </a:fld>
+            <a:endParaRPr lang="en-US" dirty="0"/>
+          </a:p>
+        </p:txBody>
+      </p:sp>
+    </p:spTree>
+    <p:extLst>
+      <p:ext uri="{BB962C8B-B14F-4D97-AF65-F5344CB8AC3E}">
+        <p14:creationId xmlns:p14="http://schemas.microsoft.com/office/powerpoint/2010/main" val="3862762694"/>
+      </p:ext>
+    </p:extLst>
+  </p:cSld>
+  <p:clrMapOvr>
+    <a:masterClrMapping/>
+  </p:clrMapOvr>
+</p:notes>
+</file>
+
+<file path=ppt/notesSlides/notesSlide13.xml><?xml version="1.0" encoding="utf-8"?>
+<p:notes xmlns:a="http://schemas.openxmlformats.org/drawingml/2006/main" xmlns:r="http://schemas.openxmlformats.org/officeDocument/2006/relationships" xmlns:p="http://schemas.openxmlformats.org/presentationml/2006/main">
+  <p:cSld>
+    <p:spTree>
+      <p:nvGrpSpPr>
+        <p:cNvPr id="1" name=""/>
+        <p:cNvGrpSpPr/>
+        <p:nvPr/>
+      </p:nvGrpSpPr>
+      <p:grpSpPr>
+        <a:xfrm>
+          <a:off x="0" y="0"/>
+          <a:ext cx="0" cy="0"/>
+          <a:chOff x="0" y="0"/>
+          <a:chExt cx="0" cy="0"/>
+        </a:xfrm>
+      </p:grpSpPr>
+      <p:sp>
+        <p:nvSpPr>
+          <p:cNvPr id="2" name="幻灯片图像占位符 1"/>
+          <p:cNvSpPr>
+            <a:spLocks noGrp="1" noRot="1" noChangeAspect="1"/>
+          </p:cNvSpPr>
+          <p:nvPr>
+            <p:ph type="sldImg"/>
+          </p:nvPr>
+        </p:nvSpPr>
+        <p:spPr/>
+      </p:sp>
+      <p:sp>
+        <p:nvSpPr>
+          <p:cNvPr id="3" name="备注占位符 2"/>
+          <p:cNvSpPr>
+            <a:spLocks noGrp="1"/>
+          </p:cNvSpPr>
+          <p:nvPr>
+            <p:ph type="body" idx="1"/>
+          </p:nvPr>
+        </p:nvSpPr>
+        <p:spPr/>
+        <p:txBody>
+          <a:bodyPr/>
+          <a:lstStyle/>
+          <a:p>
+            <a:endParaRPr lang="zh-CN" altLang="en-US" dirty="0"/>
+          </a:p>
+        </p:txBody>
+      </p:sp>
+      <p:sp>
+        <p:nvSpPr>
+          <p:cNvPr id="4" name="灯片编号占位符 3"/>
+          <p:cNvSpPr>
+            <a:spLocks noGrp="1"/>
+          </p:cNvSpPr>
+          <p:nvPr>
+            <p:ph type="sldNum" sz="quarter" idx="10"/>
+          </p:nvPr>
+        </p:nvSpPr>
+        <p:spPr/>
+        <p:txBody>
+          <a:bodyPr/>
+          <a:lstStyle/>
+          <a:p>
+            <a:pPr>
+              <a:defRPr/>
+            </a:pPr>
+            <a:fld id="{E02D639A-AF38-4D9A-897E-57859A70BDEB}" type="slidenum">
+              <a:rPr lang="en-US" smtClean="0"/>
+              <a:pPr>
+                <a:defRPr/>
+              </a:pPr>
+              <a:t>16</a:t>
+            </a:fld>
+            <a:endParaRPr lang="en-US" dirty="0"/>
+          </a:p>
+        </p:txBody>
+      </p:sp>
+    </p:spTree>
+    <p:extLst>
+      <p:ext uri="{BB962C8B-B14F-4D97-AF65-F5344CB8AC3E}">
+        <p14:creationId xmlns:p14="http://schemas.microsoft.com/office/powerpoint/2010/main" val="3436033865"/>
+      </p:ext>
+    </p:extLst>
+  </p:cSld>
+  <p:clrMapOvr>
+    <a:masterClrMapping/>
+  </p:clrMapOvr>
+</p:notes>
+</file>
+
+<file path=ppt/notesSlides/notesSlide14.xml><?xml version="1.0" encoding="utf-8"?>
+<p:notes xmlns:a="http://schemas.openxmlformats.org/drawingml/2006/main" xmlns:r="http://schemas.openxmlformats.org/officeDocument/2006/relationships" xmlns:p="http://schemas.openxmlformats.org/presentationml/2006/main">
+  <p:cSld>
+    <p:spTree>
+      <p:nvGrpSpPr>
+        <p:cNvPr id="1" name=""/>
+        <p:cNvGrpSpPr/>
+        <p:nvPr/>
+      </p:nvGrpSpPr>
+      <p:grpSpPr>
+        <a:xfrm>
+          <a:off x="0" y="0"/>
+          <a:ext cx="0" cy="0"/>
+          <a:chOff x="0" y="0"/>
+          <a:chExt cx="0" cy="0"/>
+        </a:xfrm>
+      </p:grpSpPr>
+      <p:sp>
+        <p:nvSpPr>
+          <p:cNvPr id="2" name="幻灯片图像占位符 1"/>
+          <p:cNvSpPr>
+            <a:spLocks noGrp="1" noRot="1" noChangeAspect="1"/>
+          </p:cNvSpPr>
+          <p:nvPr>
+            <p:ph type="sldImg"/>
+          </p:nvPr>
+        </p:nvSpPr>
+        <p:spPr/>
+      </p:sp>
+      <p:sp>
+        <p:nvSpPr>
+          <p:cNvPr id="3" name="备注占位符 2"/>
+          <p:cNvSpPr>
+            <a:spLocks noGrp="1"/>
+          </p:cNvSpPr>
+          <p:nvPr>
+            <p:ph type="body" idx="1"/>
+          </p:nvPr>
+        </p:nvSpPr>
+        <p:spPr/>
+        <p:txBody>
+          <a:bodyPr/>
+          <a:lstStyle/>
+          <a:p>
+            <a:r>
+              <a:rPr lang="zh-CN" altLang="zh-CN" dirty="0" smtClean="0"/>
+              <a:t>新例子——例</a:t>
+            </a:r>
+            <a:r>
+              <a:rPr lang="en-US" altLang="zh-CN" dirty="0" smtClean="0"/>
+              <a:t>2</a:t>
+            </a:r>
+            <a:r>
+              <a:rPr lang="zh-CN" altLang="zh-CN" dirty="0" smtClean="0"/>
+              <a:t>，矩阵相乘</a:t>
+            </a:r>
+            <a:endParaRPr lang="en-US" altLang="zh-CN" dirty="0" smtClean="0"/>
+          </a:p>
+          <a:p>
+            <a:pPr lvl="1"/>
+            <a:r>
+              <a:rPr lang="en-US" altLang="zh-CN" sz="2400" dirty="0" smtClean="0"/>
+              <a:t>C</a:t>
+            </a:r>
+            <a:r>
+              <a:rPr lang="zh-CN" altLang="zh-CN" sz="2400" dirty="0" smtClean="0"/>
+              <a:t>算法</a:t>
+            </a:r>
+            <a:endParaRPr lang="en-US" altLang="zh-CN" sz="2400" dirty="0" smtClean="0"/>
+          </a:p>
+          <a:p>
+            <a:pPr lvl="1"/>
+            <a:r>
+              <a:rPr lang="en-US" altLang="zh-CN" sz="2400" dirty="0" smtClean="0"/>
+              <a:t>CUDA</a:t>
+            </a:r>
+            <a:r>
+              <a:rPr lang="zh-CN" altLang="zh-CN" sz="2400" dirty="0" smtClean="0"/>
+              <a:t>算法</a:t>
+            </a:r>
+            <a:endParaRPr lang="en-US" altLang="zh-CN" sz="2400" dirty="0" smtClean="0"/>
+          </a:p>
+          <a:p>
+            <a:pPr lvl="1"/>
+            <a:r>
+              <a:rPr lang="en-US" altLang="zh-CN" sz="2400" dirty="0" smtClean="0"/>
+              <a:t>C</a:t>
+            </a:r>
+            <a:r>
+              <a:rPr lang="zh-CN" altLang="en-US" sz="2400" dirty="0" smtClean="0"/>
+              <a:t>优化</a:t>
+            </a:r>
+            <a:r>
+              <a:rPr lang="en-US" altLang="zh-CN" sz="2400" dirty="0" smtClean="0"/>
+              <a:t>-block</a:t>
+            </a:r>
+          </a:p>
+          <a:p>
+            <a:pPr lvl="1"/>
+            <a:endParaRPr lang="en-US" altLang="zh-CN" sz="2400" dirty="0" smtClean="0"/>
+          </a:p>
+          <a:p>
+            <a:pPr marL="342900" lvl="1"/>
+            <a:r>
+              <a:rPr lang="en-US" altLang="zh-CN" sz="2400" dirty="0" smtClean="0"/>
+              <a:t>CUDA</a:t>
+            </a:r>
+            <a:r>
+              <a:rPr lang="zh-CN" altLang="en-US" sz="2400" dirty="0" smtClean="0"/>
+              <a:t>优化 </a:t>
+            </a:r>
+            <a:r>
+              <a:rPr lang="en-US" altLang="zh-CN" sz="2400" dirty="0" smtClean="0"/>
+              <a:t>… …</a:t>
+            </a:r>
+          </a:p>
+          <a:p>
+            <a:endParaRPr lang="zh-CN" altLang="en-US" dirty="0"/>
+          </a:p>
+        </p:txBody>
+      </p:sp>
+      <p:sp>
+        <p:nvSpPr>
+          <p:cNvPr id="4" name="灯片编号占位符 3"/>
+          <p:cNvSpPr>
+            <a:spLocks noGrp="1"/>
+          </p:cNvSpPr>
+          <p:nvPr>
+            <p:ph type="sldNum" sz="quarter" idx="10"/>
+          </p:nvPr>
+        </p:nvSpPr>
+        <p:spPr/>
+        <p:txBody>
+          <a:bodyPr/>
+          <a:lstStyle/>
+          <a:p>
+            <a:pPr>
+              <a:defRPr/>
+            </a:pPr>
+            <a:fld id="{E02D639A-AF38-4D9A-897E-57859A70BDEB}" type="slidenum">
+              <a:rPr lang="en-US" smtClean="0"/>
+              <a:pPr>
+                <a:defRPr/>
+              </a:pPr>
+              <a:t>17</a:t>
+            </a:fld>
+            <a:endParaRPr lang="en-US" dirty="0"/>
+          </a:p>
+        </p:txBody>
+      </p:sp>
+    </p:spTree>
+    <p:extLst>
+      <p:ext uri="{BB962C8B-B14F-4D97-AF65-F5344CB8AC3E}">
+        <p14:creationId xmlns:p14="http://schemas.microsoft.com/office/powerpoint/2010/main" val="2943062953"/>
+      </p:ext>
+    </p:extLst>
+  </p:cSld>
+  <p:clrMapOvr>
+    <a:masterClrMapping/>
+  </p:clrMapOvr>
+</p:notes>
+</file>
+
 <file path=ppt/notesSlides/notesSlide2.xml><?xml version="1.0" encoding="utf-8"?>
 <p:notes xmlns:a="http://schemas.openxmlformats.org/drawingml/2006/main" xmlns:r="http://schemas.openxmlformats.org/officeDocument/2006/relationships" xmlns:p="http://schemas.openxmlformats.org/presentationml/2006/main">
   <p:cSld>
@@ -1427,79 +2029,45 @@
           <a:lstStyle/>
           <a:p>
             <a:r>
+              <a:rPr lang="en-US" altLang="zh-CN" sz="1100" dirty="0" smtClean="0"/>
+              <a:t>C</a:t>
+            </a:r>
+            <a:r>
               <a:rPr lang="zh-CN" altLang="en-US" sz="1100" dirty="0" smtClean="0"/>
-              <a:t>例</a:t>
-            </a:r>
-            <a:r>
-              <a:rPr lang="en-US" altLang="zh-CN" sz="1100" dirty="0" smtClean="0"/>
-              <a:t>1</a:t>
-            </a:r>
+              <a:t>编程模型</a:t>
+            </a:r>
+            <a:endParaRPr lang="en-US" altLang="zh-CN" sz="1100" dirty="0" smtClean="0"/>
+          </a:p>
+          <a:p>
             <a:r>
               <a:rPr lang="zh-CN" altLang="en-US" sz="1100" dirty="0" smtClean="0"/>
-              <a:t>用到： </a:t>
-            </a:r>
-            <a:r>
-              <a:rPr lang="en-US" altLang="zh-CN" sz="1100" dirty="0" smtClean="0"/>
-              <a:t>register memory</a:t>
-            </a:r>
+              <a:t>关键字</a:t>
+            </a:r>
+            <a:endParaRPr lang="en-US" altLang="zh-CN" sz="1100" dirty="0" smtClean="0"/>
+          </a:p>
+          <a:p>
             <a:r>
               <a:rPr lang="zh-CN" altLang="en-US" sz="1100" dirty="0" smtClean="0"/>
-              <a:t>，常用的还有</a:t>
-            </a:r>
-            <a:r>
-              <a:rPr lang="en-US" altLang="zh-CN" sz="1100" dirty="0" smtClean="0"/>
-              <a:t>global/constant/shared memory</a:t>
-            </a:r>
+              <a:t>变量存储</a:t>
+            </a:r>
+            <a:endParaRPr lang="en-US" altLang="zh-CN" sz="1100" dirty="0" smtClean="0"/>
+          </a:p>
+          <a:p>
             <a:r>
               <a:rPr lang="zh-CN" altLang="en-US" sz="1100" dirty="0" smtClean="0"/>
-              <a:t>，下面延伸介绍后面三种存储器的用法。</a:t>
+              <a:t>数组索引</a:t>
             </a:r>
             <a:endParaRPr lang="en-US" altLang="zh-CN" sz="1100" dirty="0" smtClean="0"/>
           </a:p>
           <a:p>
-            <a:endParaRPr lang="zh-CN" altLang="en-US" sz="1100" dirty="0" smtClean="0"/>
-          </a:p>
-          <a:p>
             <a:r>
               <a:rPr lang="zh-CN" altLang="en-US" sz="1100" dirty="0" smtClean="0"/>
-              <a:t>例</a:t>
-            </a:r>
-            <a:r>
-              <a:rPr lang="en-US" altLang="zh-CN" sz="1100" dirty="0" smtClean="0"/>
-              <a:t>1</a:t>
-            </a:r>
-            <a:r>
-              <a:rPr lang="zh-CN" altLang="en-US" sz="1100" dirty="0" smtClean="0"/>
-              <a:t>升级：共享点坐标</a:t>
+              <a:t>函数声明与调用</a:t>
             </a:r>
             <a:endParaRPr lang="en-US" altLang="zh-CN" sz="1100" dirty="0" smtClean="0"/>
           </a:p>
           <a:p>
-            <a:r>
-              <a:rPr lang="en-US" altLang="zh-CN" sz="1100" dirty="0" smtClean="0"/>
-              <a:t>global memory</a:t>
-            </a:r>
-            <a:r>
-              <a:rPr lang="zh-CN" altLang="en-US" sz="1100" dirty="0" smtClean="0"/>
-              <a:t>、</a:t>
-            </a:r>
-            <a:r>
-              <a:rPr lang="en-US" altLang="zh-CN" sz="1100" dirty="0" smtClean="0"/>
-              <a:t>constant memory</a:t>
-            </a:r>
-            <a:r>
-              <a:rPr lang="zh-CN" altLang="en-US" sz="1100" dirty="0" smtClean="0"/>
-              <a:t>、</a:t>
-            </a:r>
-            <a:r>
-              <a:rPr lang="en-US" altLang="zh-CN" sz="1100" dirty="0" smtClean="0"/>
-              <a:t>shared memory</a:t>
-            </a:r>
-            <a:r>
-              <a:rPr lang="zh-CN" altLang="en-US" sz="1100" dirty="0" smtClean="0"/>
-              <a:t>。</a:t>
-            </a:r>
-            <a:endParaRPr lang="zh-CN" altLang="en-US" sz="1100" dirty="0"/>
+            <a:endParaRPr lang="en-US" altLang="zh-CN" sz="1100" dirty="0" smtClean="0"/>
           </a:p>
         </p:txBody>
       </p:sp>
@@ -1526,7 +2094,7 @@
               <a:pPr>
                 <a:defRPr/>
               </a:pPr>
-              <a:t>9</a:t>
+              <a:t>8</a:t>
             </a:fld>
             <a:endParaRPr lang="en-US" dirty="0"/>
           </a:p>
@@ -1589,7 +2157,80 @@
           <a:bodyPr/>
           <a:lstStyle/>
           <a:p>
-            <a:endParaRPr lang="zh-CN" altLang="en-US" dirty="0"/>
+            <a:r>
+              <a:rPr lang="zh-CN" altLang="en-US" sz="1100" dirty="0" smtClean="0"/>
+              <a:t>例</a:t>
+            </a:r>
+            <a:r>
+              <a:rPr lang="en-US" altLang="zh-CN" sz="1100" dirty="0" smtClean="0"/>
+              <a:t>1</a:t>
+            </a:r>
+            <a:r>
+              <a:rPr lang="zh-CN" altLang="en-US" sz="1100" dirty="0" smtClean="0"/>
+              <a:t>用到： </a:t>
+            </a:r>
+            <a:r>
+              <a:rPr lang="en-US" altLang="zh-CN" sz="1100" dirty="0" smtClean="0"/>
+              <a:t>register memory</a:t>
+            </a:r>
+            <a:r>
+              <a:rPr lang="zh-CN" altLang="en-US" sz="1100" dirty="0" smtClean="0"/>
+              <a:t>，常用的还有</a:t>
+            </a:r>
+            <a:r>
+              <a:rPr lang="en-US" altLang="zh-CN" sz="1100" dirty="0" smtClean="0"/>
+              <a:t>global/constant/shared memory</a:t>
+            </a:r>
+            <a:r>
+              <a:rPr lang="zh-CN" altLang="en-US" sz="1100" dirty="0" smtClean="0"/>
+              <a:t>，下面延伸介绍后面三种存储器的用法。</a:t>
+            </a:r>
+            <a:endParaRPr lang="en-US" altLang="zh-CN" sz="1100" dirty="0" smtClean="0"/>
+          </a:p>
+          <a:p>
+            <a:endParaRPr lang="zh-CN" altLang="en-US" sz="1100" dirty="0" smtClean="0"/>
+          </a:p>
+          <a:p>
+            <a:r>
+              <a:rPr lang="zh-CN" altLang="en-US" sz="1100" dirty="0" smtClean="0"/>
+              <a:t>例</a:t>
+            </a:r>
+            <a:r>
+              <a:rPr lang="en-US" altLang="zh-CN" sz="1100" dirty="0" smtClean="0"/>
+              <a:t>1</a:t>
+            </a:r>
+            <a:r>
+              <a:rPr lang="zh-CN" altLang="en-US" sz="1100" dirty="0" smtClean="0"/>
+              <a:t>升级：共享点坐标</a:t>
+            </a:r>
+            <a:endParaRPr lang="en-US" altLang="zh-CN" sz="1100" dirty="0" smtClean="0"/>
+          </a:p>
+          <a:p>
+            <a:r>
+              <a:rPr lang="en-US" altLang="zh-CN" sz="1100" dirty="0" smtClean="0"/>
+              <a:t>global memory</a:t>
+            </a:r>
+            <a:r>
+              <a:rPr lang="zh-CN" altLang="en-US" sz="1100" dirty="0" smtClean="0"/>
+              <a:t>、</a:t>
+            </a:r>
+            <a:r>
+              <a:rPr lang="en-US" altLang="zh-CN" sz="1100" dirty="0" smtClean="0"/>
+              <a:t>constant memory</a:t>
+            </a:r>
+            <a:r>
+              <a:rPr lang="zh-CN" altLang="en-US" sz="1100" dirty="0" smtClean="0"/>
+              <a:t>、</a:t>
+            </a:r>
+            <a:r>
+              <a:rPr lang="en-US" altLang="zh-CN" sz="1100" dirty="0" smtClean="0"/>
+              <a:t>shared memory</a:t>
+            </a:r>
+            <a:r>
+              <a:rPr lang="zh-CN" altLang="en-US" sz="1100" dirty="0" smtClean="0"/>
+              <a:t>。</a:t>
+            </a:r>
+            <a:endParaRPr lang="zh-CN" altLang="en-US" sz="1100" dirty="0"/>
           </a:p>
         </p:txBody>
       </p:sp>
@@ -1616,7 +2257,7 @@
               <a:pPr>
                 <a:defRPr/>
               </a:pPr>
-              <a:t>10</a:t>
+              <a:t>9</a:t>
             </a:fld>
             <a:endParaRPr lang="en-US" dirty="0"/>
           </a:p>
@@ -1625,7 +2266,7 @@
     </p:spTree>
     <p:extLst>
       <p:ext uri="{BB962C8B-B14F-4D97-AF65-F5344CB8AC3E}">
-        <p14:creationId xmlns:p14="http://schemas.microsoft.com/office/powerpoint/2010/main" val="2943062953"/>
+        <p14:creationId xmlns:p14="http://schemas.microsoft.com/office/powerpoint/2010/main" val="3862762694"/>
       </p:ext>
     </p:extLst>
   </p:cSld>
@@ -1680,79 +2321,45 @@
           <a:lstStyle/>
           <a:p>
             <a:r>
-              <a:rPr lang="zh-CN" altLang="zh-CN" dirty="0" smtClean="0"/>
-              <a:t>新例子——例</a:t>
-            </a:r>
-            <a:r>
-              <a:rPr lang="en-US" altLang="zh-CN" dirty="0" smtClean="0"/>
-              <a:t>2</a:t>
-            </a:r>
-            <a:r>
-              <a:rPr lang="zh-CN" altLang="zh-CN" dirty="0" smtClean="0"/>
-              <a:t>，矩阵相乘</a:t>
-            </a:r>
-            <a:endParaRPr lang="en-US" altLang="zh-CN" dirty="0" smtClean="0"/>
-          </a:p>
-          <a:p>
-            <a:pPr lvl="1"/>
-            <a:r>
-              <a:rPr lang="en-US" altLang="zh-CN" sz="2400" dirty="0" smtClean="0"/>
+              <a:rPr lang="en-US" altLang="zh-CN" sz="1100" dirty="0" smtClean="0"/>
               <a:t>C</a:t>
             </a:r>
             <a:r>
-              <a:rPr lang="zh-CN" altLang="zh-CN" sz="2400" dirty="0" smtClean="0"/>
-              <a:t>算法</a:t>
-            </a:r>
-            <a:endParaRPr lang="en-US" altLang="zh-CN" sz="2400" dirty="0" smtClean="0"/>
-          </a:p>
-          <a:p>
-            <a:pPr lvl="1"/>
-            <a:r>
-              <a:rPr lang="en-US" altLang="zh-CN" sz="2400" dirty="0" smtClean="0"/>
-              <a:t>CUDA</a:t>
-            </a:r>
-            <a:r>
-              <a:rPr lang="zh-CN" altLang="zh-CN" sz="2400" dirty="0" smtClean="0"/>
-              <a:t>算法</a:t>
-            </a:r>
-            <a:endParaRPr lang="en-US" altLang="zh-CN" sz="2400" dirty="0" smtClean="0"/>
-          </a:p>
-          <a:p>
-            <a:pPr lvl="1"/>
-            <a:r>
-              <a:rPr lang="en-US" altLang="zh-CN" sz="2400" dirty="0" smtClean="0"/>
-              <a:t>C</a:t>
-            </a:r>
-            <a:r>
-              <a:rPr lang="zh-CN" altLang="en-US" sz="2400" dirty="0" smtClean="0"/>
-              <a:t>优化</a:t>
-            </a:r>
-            <a:r>
-              <a:rPr lang="en-US" altLang="zh-CN" sz="2400" dirty="0" smtClean="0"/>
-              <a:t>-block</a:t>
-            </a:r>
-          </a:p>
-          <a:p>
-            <a:pPr lvl="1"/>
-            <a:endParaRPr lang="en-US" altLang="zh-CN" sz="2400" dirty="0" smtClean="0"/>
-          </a:p>
-          <a:p>
-            <a:pPr marL="342900" lvl="1"/>
-            <a:r>
-              <a:rPr lang="en-US" altLang="zh-CN" sz="2400" dirty="0" smtClean="0"/>
-              <a:t>CUDA</a:t>
-            </a:r>
-            <a:r>
-              <a:rPr lang="zh-CN" altLang="en-US" sz="2400" dirty="0" smtClean="0"/>
-              <a:t>优化 </a:t>
-            </a:r>
-            <a:r>
-              <a:rPr lang="en-US" altLang="zh-CN" sz="2400" dirty="0" smtClean="0"/>
-              <a:t>… …</a:t>
-            </a:r>
-          </a:p>
-          <a:p>
-            <a:endParaRPr lang="zh-CN" altLang="en-US" dirty="0"/>
+              <a:rPr lang="zh-CN" altLang="en-US" sz="1100" dirty="0" smtClean="0"/>
+              <a:t>编程模型</a:t>
+            </a:r>
+            <a:endParaRPr lang="en-US" altLang="zh-CN" sz="1100" dirty="0" smtClean="0"/>
+          </a:p>
+          <a:p>
+            <a:r>
+              <a:rPr lang="zh-CN" altLang="en-US" sz="1100" dirty="0" smtClean="0"/>
+              <a:t>关键字</a:t>
+            </a:r>
+            <a:endParaRPr lang="en-US" altLang="zh-CN" sz="1100" dirty="0" smtClean="0"/>
+          </a:p>
+          <a:p>
+            <a:r>
+              <a:rPr lang="zh-CN" altLang="en-US" sz="1100" dirty="0" smtClean="0"/>
+              <a:t>变量存储</a:t>
+            </a:r>
+            <a:endParaRPr lang="en-US" altLang="zh-CN" sz="1100" dirty="0" smtClean="0"/>
+          </a:p>
+          <a:p>
+            <a:r>
+              <a:rPr lang="zh-CN" altLang="en-US" sz="1100" dirty="0" smtClean="0"/>
+              <a:t>数组索引</a:t>
+            </a:r>
+            <a:endParaRPr lang="en-US" altLang="zh-CN" sz="1100" dirty="0" smtClean="0"/>
+          </a:p>
+          <a:p>
+            <a:r>
+              <a:rPr lang="zh-CN" altLang="en-US" sz="1100" dirty="0" smtClean="0"/>
+              <a:t>函数声明与调用</a:t>
+            </a:r>
+            <a:endParaRPr lang="en-US" altLang="zh-CN" sz="1100" dirty="0" smtClean="0"/>
+          </a:p>
+          <a:p>
+            <a:endParaRPr lang="en-US" altLang="zh-CN" sz="1100" dirty="0" smtClean="0"/>
           </a:p>
         </p:txBody>
       </p:sp>
@@ -1780,6 +2387,119 @@
                 <a:defRPr/>
               </a:pPr>
               <a:t>11</a:t>
+            </a:fld>
+            <a:endParaRPr lang="en-US" dirty="0"/>
+          </a:p>
+        </p:txBody>
+      </p:sp>
+    </p:spTree>
+    <p:extLst>
+      <p:ext uri="{BB962C8B-B14F-4D97-AF65-F5344CB8AC3E}">
+        <p14:creationId xmlns:p14="http://schemas.microsoft.com/office/powerpoint/2010/main" val="3862762694"/>
+      </p:ext>
+    </p:extLst>
+  </p:cSld>
+  <p:clrMapOvr>
+    <a:masterClrMapping/>
+  </p:clrMapOvr>
+</p:notes>
+</file>
+
+<file path=ppt/notesSlides/notesSlide9.xml><?xml version="1.0" encoding="utf-8"?>
+<p:notes xmlns:a="http://schemas.openxmlformats.org/drawingml/2006/main" xmlns:r="http://schemas.openxmlformats.org/officeDocument/2006/relationships" xmlns:p="http://schemas.openxmlformats.org/presentationml/2006/main">
+  <p:cSld>
+    <p:spTree>
+      <p:nvGrpSpPr>
+        <p:cNvPr id="1" name=""/>
+        <p:cNvGrpSpPr/>
+        <p:nvPr/>
+      </p:nvGrpSpPr>
+      <p:grpSpPr>
+        <a:xfrm>
+          <a:off x="0" y="0"/>
+          <a:ext cx="0" cy="0"/>
+          <a:chOff x="0" y="0"/>
+          <a:chExt cx="0" cy="0"/>
+        </a:xfrm>
+      </p:grpSpPr>
+      <p:sp>
+        <p:nvSpPr>
+          <p:cNvPr id="2" name="幻灯片图像占位符 1"/>
+          <p:cNvSpPr>
+            <a:spLocks noGrp="1" noRot="1" noChangeAspect="1"/>
+          </p:cNvSpPr>
+          <p:nvPr>
+            <p:ph type="sldImg"/>
+          </p:nvPr>
+        </p:nvSpPr>
+        <p:spPr/>
+      </p:sp>
+      <p:sp>
+        <p:nvSpPr>
+          <p:cNvPr id="3" name="备注占位符 2"/>
+          <p:cNvSpPr>
+            <a:spLocks noGrp="1"/>
+          </p:cNvSpPr>
+          <p:nvPr>
+            <p:ph type="body" idx="1"/>
+          </p:nvPr>
+        </p:nvSpPr>
+        <p:spPr/>
+        <p:txBody>
+          <a:bodyPr/>
+          <a:lstStyle/>
+          <a:p>
+            <a:r>
+              <a:rPr lang="zh-CN" altLang="en-US" dirty="0" smtClean="0"/>
+              <a:t>结果验证， </a:t>
+            </a:r>
+            <a:r>
+              <a:rPr lang="en-US" altLang="zh-CN" dirty="0" smtClean="0"/>
+              <a:t>C</a:t>
+            </a:r>
+            <a:r>
+              <a:rPr lang="zh-CN" altLang="en-US" dirty="0" smtClean="0"/>
+              <a:t>和</a:t>
+            </a:r>
+            <a:r>
+              <a:rPr lang="en-US" altLang="zh-CN" dirty="0" smtClean="0"/>
+              <a:t>CUDA</a:t>
+            </a:r>
+            <a:r>
+              <a:rPr lang="zh-CN" altLang="en-US" dirty="0" smtClean="0"/>
+              <a:t>各执行一遍，对比结果；</a:t>
+            </a:r>
+            <a:endParaRPr lang="en-US" altLang="zh-CN" dirty="0" smtClean="0"/>
+          </a:p>
+          <a:p>
+            <a:endParaRPr lang="zh-CN" altLang="en-US" dirty="0"/>
+          </a:p>
+        </p:txBody>
+      </p:sp>
+      <p:sp>
+        <p:nvSpPr>
+          <p:cNvPr id="4" name="灯片编号占位符 3"/>
+          <p:cNvSpPr>
+            <a:spLocks noGrp="1"/>
+          </p:cNvSpPr>
+          <p:nvPr>
+            <p:ph type="sldNum" sz="quarter" idx="10"/>
+          </p:nvPr>
+        </p:nvSpPr>
+        <p:spPr/>
+        <p:txBody>
+          <a:bodyPr/>
+          <a:lstStyle/>
+          <a:p>
+            <a:pPr>
+              <a:defRPr/>
+            </a:pPr>
+            <a:fld id="{E02D639A-AF38-4D9A-897E-57859A70BDEB}" type="slidenum">
+              <a:rPr lang="en-US" smtClean="0"/>
+              <a:pPr>
+                <a:defRPr/>
+              </a:pPr>
+              <a:t>12</a:t>
             </a:fld>
             <a:endParaRPr lang="en-US" dirty="0"/>
           </a:p>
@@ -3406,7 +4126,7 @@
       </p:grpSpPr>
       <p:sp>
         <p:nvSpPr>
-          <p:cNvPr id="2" name="Title 1"/>
+          <p:cNvPr id="2" name="标题 1"/>
           <p:cNvSpPr>
             <a:spLocks noGrp="1"/>
           </p:cNvSpPr>
@@ -3417,7 +4137,7 @@
         <p:spPr>
           <a:xfrm>
             <a:off x="884238" y="247650"/>
-            <a:ext cx="9204325" cy="590931"/>
+            <a:ext cx="9204325" cy="978729"/>
           </a:xfrm>
         </p:spPr>
         <p:txBody>
@@ -3425,449 +4145,186 @@
           <a:lstStyle/>
           <a:p>
             <a:r>
-              <a:rPr lang="zh-CN" altLang="zh-CN" dirty="0"/>
-              <a:t>技巧</a:t>
+              <a:rPr lang="zh-CN" altLang="en-US" dirty="0"/>
+              <a:t>存储模型</a:t>
             </a:r>
             <a:r>
               <a:rPr lang="en-US" altLang="zh-CN" dirty="0"/>
-              <a:t>Tips</a:t>
-            </a:r>
-            <a:endParaRPr lang="en-US" dirty="0"/>
+              <a:t/>
+            </a:r>
+            <a:br>
+              <a:rPr lang="en-US" altLang="zh-CN" dirty="0"/>
+            </a:br>
+            <a:r>
+              <a:rPr lang="zh-CN" altLang="en-US" sz="2800" dirty="0"/>
+              <a:t>示例</a:t>
+            </a:r>
+            <a:endParaRPr lang="zh-CN" altLang="en-US" dirty="0"/>
           </a:p>
         </p:txBody>
       </p:sp>
-      <p:sp>
-        <p:nvSpPr>
-          <p:cNvPr id="3" name="Content Placeholder 2"/>
-          <p:cNvSpPr>
-            <a:spLocks noGrp="1"/>
-          </p:cNvSpPr>
-          <p:nvPr>
-            <p:ph idx="1"/>
-          </p:nvPr>
-        </p:nvSpPr>
+      <p:pic>
+        <p:nvPicPr>
+          <p:cNvPr id="5" name="图片 4"/>
+          <p:cNvPicPr>
+            <a:picLocks noChangeAspect="1"/>
+          </p:cNvPicPr>
+          <p:nvPr/>
+        </p:nvPicPr>
+        <p:blipFill>
+          <a:blip r:embed="rId2">
+            <a:extLst>
+              <a:ext uri="{28A0092B-C50C-407E-A947-70E740481C1C}">
+                <a14:useLocalDpi xmlns:a14="http://schemas.microsoft.com/office/drawing/2010/main" val="0"/>
+              </a:ext>
+            </a:extLst>
+          </a:blip>
+          <a:stretch>
+            <a:fillRect/>
+          </a:stretch>
+        </p:blipFill>
         <p:spPr>
           <a:xfrm>
-            <a:off x="884902" y="1504334"/>
-            <a:ext cx="4254657" cy="4612691"/>
+            <a:off x="128337" y="692686"/>
+            <a:ext cx="4489698" cy="5303049"/>
           </a:xfrm>
+          <a:prstGeom prst="rect">
+            <a:avLst/>
+          </a:prstGeom>
         </p:spPr>
-        <p:txBody>
-          <a:bodyPr/>
-          <a:lstStyle/>
-          <a:p>
-            <a:r>
-              <a:rPr lang="zh-CN" altLang="en-US" dirty="0" smtClean="0"/>
-              <a:t>线程配置</a:t>
-            </a:r>
-            <a:endParaRPr lang="en-US" altLang="zh-CN" dirty="0" smtClean="0"/>
-          </a:p>
-          <a:p>
-            <a:pPr lvl="1"/>
-            <a:r>
-              <a:rPr lang="zh-CN" altLang="zh-CN" sz="2400" dirty="0"/>
-              <a:t>线程数目不是</a:t>
-            </a:r>
-            <a:r>
-              <a:rPr lang="en-US" altLang="zh-CN" sz="2400" dirty="0"/>
-              <a:t>32</a:t>
-            </a:r>
-            <a:r>
-              <a:rPr lang="zh-CN" altLang="zh-CN" sz="2400" dirty="0"/>
-              <a:t>的</a:t>
-            </a:r>
-            <a:r>
-              <a:rPr lang="zh-CN" altLang="zh-CN" sz="2400" dirty="0" smtClean="0"/>
-              <a:t>倍数</a:t>
-            </a:r>
-            <a:endParaRPr lang="en-US" altLang="zh-CN" sz="2400" dirty="0" smtClean="0"/>
-          </a:p>
-          <a:p>
-            <a:pPr lvl="1"/>
-            <a:r>
-              <a:rPr lang="zh-CN" altLang="zh-CN" sz="2400" dirty="0" smtClean="0"/>
-              <a:t>线程</a:t>
-            </a:r>
-            <a:r>
-              <a:rPr lang="zh-CN" altLang="zh-CN" sz="2400" dirty="0"/>
-              <a:t>数目</a:t>
-            </a:r>
-            <a:r>
-              <a:rPr lang="zh-CN" altLang="zh-CN" sz="2400" dirty="0" smtClean="0"/>
-              <a:t>超过阈值</a:t>
-            </a:r>
-            <a:endParaRPr lang="en-US" altLang="zh-CN" sz="2400" dirty="0" smtClean="0"/>
-          </a:p>
-          <a:p>
-            <a:pPr lvl="1"/>
-            <a:endParaRPr lang="en-US" altLang="zh-CN" sz="2400" dirty="0" smtClean="0"/>
-          </a:p>
-          <a:p>
-            <a:r>
-              <a:rPr lang="zh-CN" altLang="en-US" dirty="0" smtClean="0"/>
-              <a:t>测时对比</a:t>
-            </a:r>
-            <a:endParaRPr lang="en-US" altLang="zh-CN" dirty="0" smtClean="0"/>
-          </a:p>
-          <a:p>
-            <a:pPr lvl="1"/>
-            <a:r>
-              <a:rPr lang="zh-CN" altLang="en-US" sz="2400" dirty="0" smtClean="0"/>
-              <a:t>调用</a:t>
-            </a:r>
-            <a:r>
-              <a:rPr lang="en-US" altLang="zh-CN" sz="2400" dirty="0" err="1" smtClean="0"/>
-              <a:t>helper_timer.h</a:t>
-            </a:r>
-            <a:r>
-              <a:rPr lang="en-US" altLang="zh-CN" sz="2400" dirty="0" smtClean="0"/>
-              <a:t> </a:t>
-            </a:r>
-            <a:endParaRPr lang="en-US" altLang="zh-CN" sz="2400" dirty="0"/>
-          </a:p>
-          <a:p>
-            <a:pPr lvl="1"/>
-            <a:r>
-              <a:rPr lang="zh-CN" altLang="en-US" sz="2400" dirty="0"/>
-              <a:t>注意</a:t>
-            </a:r>
-            <a:r>
-              <a:rPr lang="en-US" altLang="zh-CN" sz="2400" dirty="0" smtClean="0"/>
-              <a:t>Synchronize</a:t>
-            </a:r>
-            <a:r>
-              <a:rPr lang="zh-CN" altLang="en-US" sz="2400" dirty="0" smtClean="0"/>
-              <a:t> </a:t>
-            </a:r>
-            <a:endParaRPr lang="en-US" altLang="zh-CN" sz="2400" dirty="0" smtClean="0"/>
-          </a:p>
-          <a:p>
-            <a:pPr lvl="1"/>
-            <a:r>
-              <a:rPr lang="zh-CN" altLang="en-US" sz="2400" dirty="0"/>
-              <a:t>线程数目</a:t>
-            </a:r>
-            <a:r>
-              <a:rPr lang="en-US" altLang="zh-CN" sz="2400" dirty="0"/>
-              <a:t>(</a:t>
-            </a:r>
-            <a:r>
-              <a:rPr lang="zh-CN" altLang="en-US" sz="2400" dirty="0"/>
-              <a:t>问题规模</a:t>
-            </a:r>
-            <a:r>
-              <a:rPr lang="en-US" altLang="zh-CN" sz="2400" dirty="0"/>
-              <a:t>)</a:t>
-            </a:r>
-            <a:r>
-              <a:rPr lang="zh-CN" altLang="en-US" sz="2400" dirty="0"/>
-              <a:t>多大时，</a:t>
-            </a:r>
-            <a:r>
-              <a:rPr lang="en-US" altLang="zh-CN" sz="2400" dirty="0"/>
-              <a:t>GPU</a:t>
-            </a:r>
-            <a:r>
-              <a:rPr lang="zh-CN" altLang="en-US" sz="2400" dirty="0"/>
-              <a:t>发挥的性能赶超</a:t>
-            </a:r>
-            <a:r>
-              <a:rPr lang="en-US" altLang="zh-CN" sz="2400" dirty="0"/>
-              <a:t>CPU</a:t>
-            </a:r>
-            <a:r>
-              <a:rPr lang="zh-CN" altLang="en-US" sz="2400" dirty="0" smtClean="0"/>
-              <a:t>？</a:t>
-            </a:r>
-            <a:endParaRPr lang="en-US" altLang="zh-CN" sz="2400" dirty="0" smtClean="0"/>
-          </a:p>
-          <a:p>
-            <a:endParaRPr lang="en-US" altLang="zh-CN" dirty="0" smtClean="0"/>
-          </a:p>
-          <a:p>
-            <a:endParaRPr lang="en-US" dirty="0"/>
-          </a:p>
-        </p:txBody>
-      </p:sp>
-      <p:sp>
-        <p:nvSpPr>
-          <p:cNvPr id="4" name="Content Placeholder 2"/>
-          <p:cNvSpPr txBox="1">
-            <a:spLocks/>
-          </p:cNvSpPr>
+      </p:pic>
+      <p:pic>
+        <p:nvPicPr>
+          <p:cNvPr id="1027" name="Picture 3"/>
+          <p:cNvPicPr>
+            <a:picLocks noChangeAspect="1" noChangeArrowheads="1"/>
+          </p:cNvPicPr>
           <p:nvPr/>
-        </p:nvSpPr>
+        </p:nvPicPr>
+        <p:blipFill>
+          <a:blip r:embed="rId3">
+            <a:extLst>
+              <a:ext uri="{28A0092B-C50C-407E-A947-70E740481C1C}">
+                <a14:useLocalDpi xmlns:a14="http://schemas.microsoft.com/office/drawing/2010/main" val="0"/>
+              </a:ext>
+            </a:extLst>
+          </a:blip>
+          <a:srcRect/>
+          <a:stretch>
+            <a:fillRect/>
+          </a:stretch>
+        </p:blipFill>
         <p:spPr bwMode="auto">
           <a:xfrm>
-            <a:off x="6179566" y="1460090"/>
-            <a:ext cx="4107657" cy="4667442"/>
+            <a:off x="6513075" y="707420"/>
+            <a:ext cx="4279806" cy="5288315"/>
           </a:xfrm>
           <a:prstGeom prst="rect">
             <a:avLst/>
           </a:prstGeom>
           <a:noFill/>
-          <a:ln w="9525">
+          <a:ln>
             <a:noFill/>
-            <a:miter lim="800000"/>
-            <a:headEnd/>
-            <a:tailEnd/>
           </a:ln>
+          <a:effectLst/>
+          <a:extLst>
+            <a:ext uri="{909E8E84-426E-40DD-AFC4-6F175D3DCCD1}">
+              <a14:hiddenFill xmlns:a14="http://schemas.microsoft.com/office/drawing/2010/main">
+                <a:solidFill>
+                  <a:schemeClr val="accent1"/>
+                </a:solidFill>
+              </a14:hiddenFill>
+            </a:ext>
+            <a:ext uri="{91240B29-F687-4F45-9708-019B960494DF}">
+              <a14:hiddenLine xmlns:a14="http://schemas.microsoft.com/office/drawing/2010/main" w="9525">
+                <a:solidFill>
+                  <a:schemeClr val="tx1"/>
+                </a:solidFill>
+                <a:miter lim="800000"/>
+                <a:headEnd/>
+                <a:tailEnd/>
+              </a14:hiddenLine>
+            </a:ext>
+            <a:ext uri="{AF507438-7753-43E0-B8FC-AC1667EBCBE1}">
+              <a14:hiddenEffects xmlns:a14="http://schemas.microsoft.com/office/drawing/2010/main">
+                <a:effectLst>
+                  <a:outerShdw dist="35921" dir="2700000" algn="ctr" rotWithShape="0">
+                    <a:schemeClr val="bg2"/>
+                  </a:outerShdw>
+                </a:effectLst>
+              </a14:hiddenEffects>
+            </a:ext>
+          </a:extLst>
         </p:spPr>
-        <p:txBody>
-          <a:bodyPr vert="horz" wrap="square" lIns="91440" tIns="45720" rIns="91440" bIns="45720" numCol="1" anchor="t" anchorCtr="0" compatLnSpc="1">
-            <a:prstTxWarp prst="textNoShape">
-              <a:avLst/>
-            </a:prstTxWarp>
-          </a:bodyPr>
-          <a:lstStyle>
-            <a:lvl1pPr marL="342900" indent="-342900" algn="l" rtl="0" eaLnBrk="1" fontAlgn="base" hangingPunct="1">
-              <a:spcBef>
-                <a:spcPct val="20000"/>
-              </a:spcBef>
-              <a:spcAft>
-                <a:spcPct val="0"/>
-              </a:spcAft>
-              <a:buSzPct val="100000"/>
-              <a:buFontTx/>
-              <a:buBlip>
-                <a:blip r:embed="rId3"/>
-              </a:buBlip>
-              <a:defRPr sz="2400" b="0">
+      </p:pic>
+      <p:pic>
+        <p:nvPicPr>
+          <p:cNvPr id="1026" name="Picture 2"/>
+          <p:cNvPicPr>
+            <a:picLocks noChangeAspect="1" noChangeArrowheads="1"/>
+          </p:cNvPicPr>
+          <p:nvPr/>
+        </p:nvPicPr>
+        <p:blipFill>
+          <a:blip r:embed="rId4">
+            <a:extLst>
+              <a:ext uri="{28A0092B-C50C-407E-A947-70E740481C1C}">
+                <a14:useLocalDpi xmlns:a14="http://schemas.microsoft.com/office/drawing/2010/main" val="0"/>
+              </a:ext>
+            </a:extLst>
+          </a:blip>
+          <a:srcRect/>
+          <a:stretch>
+            <a:fillRect/>
+          </a:stretch>
+        </p:blipFill>
+        <p:spPr bwMode="auto">
+          <a:xfrm>
+            <a:off x="2847975" y="1933575"/>
+            <a:ext cx="5276850" cy="2305050"/>
+          </a:xfrm>
+          <a:prstGeom prst="rect">
+            <a:avLst/>
+          </a:prstGeom>
+          <a:noFill/>
+          <a:ln>
+            <a:noFill/>
+          </a:ln>
+          <a:effectLst/>
+          <a:extLst>
+            <a:ext uri="{909E8E84-426E-40DD-AFC4-6F175D3DCCD1}">
+              <a14:hiddenFill xmlns:a14="http://schemas.microsoft.com/office/drawing/2010/main">
+                <a:solidFill>
+                  <a:schemeClr val="accent1"/>
+                </a:solidFill>
+              </a14:hiddenFill>
+            </a:ext>
+            <a:ext uri="{91240B29-F687-4F45-9708-019B960494DF}">
+              <a14:hiddenLine xmlns:a14="http://schemas.microsoft.com/office/drawing/2010/main" w="9525">
                 <a:solidFill>
                   <a:schemeClr val="tx1"/>
                 </a:solidFill>
-                <a:latin typeface="Trebuchet MS" pitchFamily="34" charset="0"/>
-                <a:ea typeface="+mn-ea"/>
-                <a:cs typeface="+mn-cs"/>
-              </a:defRPr>
-            </a:lvl1pPr>
-            <a:lvl2pPr marL="914400" indent="-342900" algn="l" rtl="0" eaLnBrk="1" fontAlgn="base" hangingPunct="1">
-              <a:spcBef>
-                <a:spcPct val="20000"/>
-              </a:spcBef>
-              <a:spcAft>
-                <a:spcPct val="0"/>
-              </a:spcAft>
-              <a:buSzPct val="100000"/>
-              <a:buFontTx/>
-              <a:buBlip>
-                <a:blip r:embed="rId3"/>
-              </a:buBlip>
-              <a:defRPr sz="2000" b="0">
-                <a:solidFill>
-                  <a:schemeClr val="tx1"/>
-                </a:solidFill>
-                <a:latin typeface="Trebuchet MS" pitchFamily="34" charset="0"/>
-              </a:defRPr>
-            </a:lvl2pPr>
-            <a:lvl3pPr marL="1371600" indent="-282575" algn="l" rtl="0" eaLnBrk="1" fontAlgn="base" hangingPunct="1">
-              <a:spcBef>
-                <a:spcPct val="20000"/>
-              </a:spcBef>
-              <a:spcAft>
-                <a:spcPct val="0"/>
-              </a:spcAft>
-              <a:buSzPct val="100000"/>
-              <a:buFontTx/>
-              <a:buBlip>
-                <a:blip r:embed="rId3"/>
-              </a:buBlip>
-              <a:defRPr sz="1800" b="0">
-                <a:solidFill>
-                  <a:schemeClr val="tx1"/>
-                </a:solidFill>
-                <a:latin typeface="Trebuchet MS" pitchFamily="34" charset="0"/>
-              </a:defRPr>
-            </a:lvl3pPr>
-            <a:lvl4pPr marL="1774825" indent="-228600" algn="l" rtl="0" eaLnBrk="1" fontAlgn="base" hangingPunct="1">
-              <a:spcBef>
-                <a:spcPct val="20000"/>
-              </a:spcBef>
-              <a:spcAft>
-                <a:spcPct val="0"/>
-              </a:spcAft>
-              <a:buChar char="–"/>
-              <a:defRPr sz="2000">
-                <a:solidFill>
-                  <a:schemeClr val="tx1"/>
-                </a:solidFill>
-                <a:latin typeface="+mn-lt"/>
-              </a:defRPr>
-            </a:lvl4pPr>
-            <a:lvl5pPr marL="2117725" indent="-228600" algn="l" rtl="0" eaLnBrk="1" fontAlgn="base" hangingPunct="1">
-              <a:spcBef>
-                <a:spcPct val="20000"/>
-              </a:spcBef>
-              <a:spcAft>
-                <a:spcPct val="0"/>
-              </a:spcAft>
-              <a:buChar char="»"/>
-              <a:defRPr sz="2000">
-                <a:solidFill>
-                  <a:schemeClr val="tx1"/>
-                </a:solidFill>
-                <a:latin typeface="+mn-lt"/>
-              </a:defRPr>
-            </a:lvl5pPr>
-            <a:lvl6pPr marL="2574925" indent="-228600" algn="l" rtl="0" eaLnBrk="1" fontAlgn="base" hangingPunct="1">
-              <a:spcBef>
-                <a:spcPct val="20000"/>
-              </a:spcBef>
-              <a:spcAft>
-                <a:spcPct val="0"/>
-              </a:spcAft>
-              <a:buChar char="»"/>
-              <a:defRPr sz="2000">
-                <a:solidFill>
-                  <a:schemeClr val="bg1"/>
-                </a:solidFill>
-                <a:latin typeface="+mn-lt"/>
-              </a:defRPr>
-            </a:lvl6pPr>
-            <a:lvl7pPr marL="3032125" indent="-228600" algn="l" rtl="0" eaLnBrk="1" fontAlgn="base" hangingPunct="1">
-              <a:spcBef>
-                <a:spcPct val="20000"/>
-              </a:spcBef>
-              <a:spcAft>
-                <a:spcPct val="0"/>
-              </a:spcAft>
-              <a:buChar char="»"/>
-              <a:defRPr sz="2000">
-                <a:solidFill>
-                  <a:schemeClr val="bg1"/>
-                </a:solidFill>
-                <a:latin typeface="+mn-lt"/>
-              </a:defRPr>
-            </a:lvl7pPr>
-            <a:lvl8pPr marL="3489325" indent="-228600" algn="l" rtl="0" eaLnBrk="1" fontAlgn="base" hangingPunct="1">
-              <a:spcBef>
-                <a:spcPct val="20000"/>
-              </a:spcBef>
-              <a:spcAft>
-                <a:spcPct val="0"/>
-              </a:spcAft>
-              <a:buChar char="»"/>
-              <a:defRPr sz="2000">
-                <a:solidFill>
-                  <a:schemeClr val="bg1"/>
-                </a:solidFill>
-                <a:latin typeface="+mn-lt"/>
-              </a:defRPr>
-            </a:lvl8pPr>
-            <a:lvl9pPr marL="3946525" indent="-228600" algn="l" rtl="0" eaLnBrk="1" fontAlgn="base" hangingPunct="1">
-              <a:spcBef>
-                <a:spcPct val="20000"/>
-              </a:spcBef>
-              <a:spcAft>
-                <a:spcPct val="0"/>
-              </a:spcAft>
-              <a:buChar char="»"/>
-              <a:defRPr sz="2000">
-                <a:solidFill>
-                  <a:schemeClr val="bg1"/>
-                </a:solidFill>
-                <a:latin typeface="+mn-lt"/>
-              </a:defRPr>
-            </a:lvl9pPr>
-          </a:lstStyle>
-          <a:p>
-            <a:r>
-              <a:rPr lang="zh-CN" altLang="en-US" dirty="0" smtClean="0"/>
-              <a:t>移植三部曲</a:t>
-            </a:r>
-            <a:endParaRPr lang="en-US" altLang="zh-CN" dirty="0" smtClean="0"/>
-          </a:p>
-          <a:p>
-            <a:pPr lvl="1"/>
-            <a:r>
-              <a:rPr lang="zh-CN" altLang="zh-CN" sz="2400" dirty="0" smtClean="0"/>
-              <a:t>循环变嵌套函数</a:t>
-            </a:r>
-            <a:endParaRPr lang="en-US" altLang="zh-CN" sz="2400" dirty="0" smtClean="0"/>
-          </a:p>
-          <a:p>
-            <a:pPr lvl="1"/>
-            <a:r>
-              <a:rPr lang="zh-CN" altLang="zh-CN" sz="2400" dirty="0"/>
-              <a:t>数组索引变量</a:t>
-            </a:r>
-            <a:r>
-              <a:rPr lang="zh-CN" altLang="zh-CN" sz="2400" dirty="0" smtClean="0"/>
-              <a:t>化</a:t>
-            </a:r>
-            <a:endParaRPr lang="en-US" altLang="zh-CN" sz="2400" dirty="0" smtClean="0"/>
-          </a:p>
-          <a:p>
-            <a:pPr lvl="1"/>
-            <a:r>
-              <a:rPr lang="zh-CN" altLang="zh-CN" sz="2400" dirty="0" smtClean="0"/>
-              <a:t>新</a:t>
-            </a:r>
-            <a:r>
-              <a:rPr lang="zh-CN" altLang="zh-CN" sz="2400" dirty="0"/>
-              <a:t>模型</a:t>
-            </a:r>
-            <a:r>
-              <a:rPr lang="zh-CN" altLang="zh-CN" sz="2400" dirty="0" smtClean="0"/>
-              <a:t>改写</a:t>
-            </a:r>
-            <a:endParaRPr lang="en-US" altLang="zh-CN" sz="2400" dirty="0" smtClean="0"/>
-          </a:p>
-          <a:p>
-            <a:pPr lvl="1"/>
-            <a:endParaRPr lang="en-US" altLang="zh-CN" sz="2400" dirty="0" smtClean="0"/>
-          </a:p>
-          <a:p>
-            <a:r>
-              <a:rPr lang="zh-CN" altLang="en-US" dirty="0" smtClean="0"/>
-              <a:t>其它</a:t>
-            </a:r>
-            <a:endParaRPr lang="en-US" altLang="zh-CN" dirty="0" smtClean="0"/>
-          </a:p>
-          <a:p>
-            <a:pPr lvl="1"/>
-            <a:r>
-              <a:rPr lang="zh-CN" altLang="zh-CN" sz="2400" dirty="0" smtClean="0"/>
-              <a:t>结果验证</a:t>
-            </a:r>
-            <a:endParaRPr lang="en-US" altLang="zh-CN" sz="2400" dirty="0" smtClean="0"/>
-          </a:p>
-          <a:p>
-            <a:pPr lvl="1"/>
-            <a:r>
-              <a:rPr lang="zh-CN" altLang="zh-CN" sz="2400" dirty="0" smtClean="0"/>
-              <a:t>错误定位</a:t>
-            </a:r>
-            <a:endParaRPr lang="en-US" altLang="zh-CN" sz="2400" dirty="0" smtClean="0"/>
-          </a:p>
-          <a:p>
-            <a:pPr lvl="1"/>
-            <a:r>
-              <a:rPr lang="en-US" altLang="zh-CN" sz="2400" dirty="0" smtClean="0"/>
-              <a:t>driver</a:t>
-            </a:r>
-            <a:r>
-              <a:rPr lang="zh-CN" altLang="zh-CN" sz="2400" dirty="0" smtClean="0"/>
-              <a:t>编写</a:t>
-            </a:r>
-            <a:endParaRPr lang="en-US" altLang="zh-CN" sz="2400" dirty="0" smtClean="0"/>
-          </a:p>
-          <a:p>
-            <a:pPr lvl="1"/>
-            <a:endParaRPr lang="en-US" altLang="zh-CN" sz="2400" dirty="0" smtClean="0"/>
-          </a:p>
-          <a:p>
-            <a:endParaRPr lang="en-US" altLang="zh-CN" dirty="0" smtClean="0"/>
-          </a:p>
-          <a:p>
-            <a:endParaRPr lang="en-US" dirty="0"/>
-          </a:p>
-        </p:txBody>
-      </p:sp>
+                <a:miter lim="800000"/>
+                <a:headEnd/>
+                <a:tailEnd/>
+              </a14:hiddenLine>
+            </a:ext>
+            <a:ext uri="{AF507438-7753-43E0-B8FC-AC1667EBCBE1}">
+              <a14:hiddenEffects xmlns:a14="http://schemas.microsoft.com/office/drawing/2010/main">
+                <a:effectLst>
+                  <a:outerShdw dist="35921" dir="2700000" algn="ctr" rotWithShape="0">
+                    <a:schemeClr val="bg2"/>
+                  </a:outerShdw>
+                </a:effectLst>
+              </a14:hiddenEffects>
+            </a:ext>
+          </a:extLst>
+        </p:spPr>
+      </p:pic>
     </p:spTree>
     <p:extLst>
       <p:ext uri="{BB962C8B-B14F-4D97-AF65-F5344CB8AC3E}">
-        <p14:creationId xmlns:p14="http://schemas.microsoft.com/office/powerpoint/2010/main" val="4291639553"/>
+        <p14:creationId xmlns:p14="http://schemas.microsoft.com/office/powerpoint/2010/main" val="2510390046"/>
       </p:ext>
     </p:extLst>
   </p:cSld>
@@ -3915,6 +4372,2308 @@
       </p:grpSpPr>
       <p:sp>
         <p:nvSpPr>
+          <p:cNvPr id="2" name="标题 1"/>
+          <p:cNvSpPr>
+            <a:spLocks noGrp="1"/>
+          </p:cNvSpPr>
+          <p:nvPr>
+            <p:ph type="title"/>
+          </p:nvPr>
+        </p:nvSpPr>
+        <p:spPr>
+          <a:xfrm>
+            <a:off x="884238" y="247650"/>
+            <a:ext cx="9204325" cy="978729"/>
+          </a:xfrm>
+        </p:spPr>
+        <p:txBody>
+          <a:bodyPr/>
+          <a:lstStyle/>
+          <a:p>
+            <a:r>
+              <a:rPr lang="zh-CN" altLang="en-US" dirty="0"/>
+              <a:t>存储模型</a:t>
+            </a:r>
+            <a:r>
+              <a:rPr lang="en-US" altLang="zh-CN" dirty="0"/>
+              <a:t/>
+            </a:r>
+            <a:br>
+              <a:rPr lang="en-US" altLang="zh-CN" dirty="0"/>
+            </a:br>
+            <a:r>
+              <a:rPr lang="zh-CN" altLang="en-US" sz="2800" dirty="0"/>
+              <a:t>示例</a:t>
+            </a:r>
+          </a:p>
+        </p:txBody>
+      </p:sp>
+      <p:sp>
+        <p:nvSpPr>
+          <p:cNvPr id="3" name="内容占位符 2"/>
+          <p:cNvSpPr>
+            <a:spLocks noGrp="1"/>
+          </p:cNvSpPr>
+          <p:nvPr>
+            <p:ph idx="1"/>
+          </p:nvPr>
+        </p:nvSpPr>
+        <p:spPr>
+          <a:xfrm>
+            <a:off x="882780" y="1439863"/>
+            <a:ext cx="4816476" cy="4252912"/>
+          </a:xfrm>
+        </p:spPr>
+        <p:txBody>
+          <a:bodyPr/>
+          <a:lstStyle/>
+          <a:p>
+            <a:pPr marL="0" indent="0">
+              <a:buNone/>
+            </a:pPr>
+            <a:endParaRPr lang="en-US" altLang="zh-CN" sz="3200" dirty="0"/>
+          </a:p>
+          <a:p>
+            <a:endParaRPr lang="en-US" altLang="zh-CN" sz="3200" dirty="0" smtClean="0"/>
+          </a:p>
+        </p:txBody>
+      </p:sp>
+      <p:graphicFrame>
+        <p:nvGraphicFramePr>
+          <p:cNvPr id="5" name="表格 4"/>
+          <p:cNvGraphicFramePr>
+            <a:graphicFrameLocks noGrp="1"/>
+          </p:cNvGraphicFramePr>
+          <p:nvPr>
+            <p:extLst>
+              <p:ext uri="{D42A27DB-BD31-4B8C-83A1-F6EECF244321}">
+                <p14:modId xmlns:p14="http://schemas.microsoft.com/office/powerpoint/2010/main" val="3431698276"/>
+              </p:ext>
+            </p:extLst>
+          </p:nvPr>
+        </p:nvGraphicFramePr>
+        <p:xfrm>
+          <a:off x="969913" y="1596831"/>
+          <a:ext cx="8985249" cy="3425660"/>
+        </p:xfrm>
+        <a:graphic>
+          <a:graphicData uri="http://schemas.openxmlformats.org/drawingml/2006/table">
+            <a:tbl>
+              <a:tblPr firstRow="1" bandRow="1">
+                <a:tableStyleId>{5C22544A-7EE6-4342-B048-85BDC9FD1C3A}</a:tableStyleId>
+              </a:tblPr>
+              <a:tblGrid>
+                <a:gridCol w="2995083"/>
+                <a:gridCol w="2995083"/>
+                <a:gridCol w="2995083"/>
+              </a:tblGrid>
+              <a:tr h="685132">
+                <a:tc>
+                  <a:txBody>
+                    <a:bodyPr/>
+                    <a:lstStyle/>
+                    <a:p>
+                      <a:endParaRPr lang="zh-CN" altLang="en-US" dirty="0"/>
+                    </a:p>
+                  </a:txBody>
+                  <a:tcPr/>
+                </a:tc>
+                <a:tc>
+                  <a:txBody>
+                    <a:bodyPr/>
+                    <a:lstStyle/>
+                    <a:p>
+                      <a:r>
+                        <a:rPr lang="zh-CN" altLang="en-US" sz="3600" dirty="0" smtClean="0"/>
+                        <a:t>声明</a:t>
+                      </a:r>
+                      <a:endParaRPr lang="zh-CN" altLang="en-US" sz="3600" dirty="0"/>
+                    </a:p>
+                  </a:txBody>
+                  <a:tcPr/>
+                </a:tc>
+                <a:tc>
+                  <a:txBody>
+                    <a:bodyPr/>
+                    <a:lstStyle/>
+                    <a:p>
+                      <a:r>
+                        <a:rPr lang="zh-CN" altLang="en-US" sz="3600" dirty="0" smtClean="0"/>
+                        <a:t>赋值</a:t>
+                      </a:r>
+                      <a:endParaRPr lang="zh-CN" altLang="en-US" sz="3600" dirty="0"/>
+                    </a:p>
+                  </a:txBody>
+                  <a:tcPr/>
+                </a:tc>
+              </a:tr>
+              <a:tr h="685132">
+                <a:tc>
+                  <a:txBody>
+                    <a:bodyPr/>
+                    <a:lstStyle/>
+                    <a:p>
+                      <a:r>
+                        <a:rPr lang="en-US" altLang="zh-CN" sz="3200" dirty="0" smtClean="0">
+                          <a:solidFill>
+                            <a:schemeClr val="bg1"/>
+                          </a:solidFill>
+                        </a:rPr>
+                        <a:t>register</a:t>
+                      </a:r>
+                      <a:endParaRPr lang="zh-CN" altLang="en-US" sz="3200" dirty="0">
+                        <a:solidFill>
+                          <a:schemeClr val="bg1"/>
+                        </a:solidFill>
+                      </a:endParaRPr>
+                    </a:p>
+                  </a:txBody>
+                  <a:tcPr/>
+                </a:tc>
+                <a:tc>
+                  <a:txBody>
+                    <a:bodyPr/>
+                    <a:lstStyle/>
+                    <a:p>
+                      <a:r>
+                        <a:rPr lang="en-US" altLang="zh-CN" sz="1800" kern="1200" dirty="0" smtClean="0">
+                          <a:solidFill>
+                            <a:srgbClr val="A000A0"/>
+                          </a:solidFill>
+                          <a:latin typeface="新宋体"/>
+                          <a:ea typeface="新宋体"/>
+                          <a:cs typeface="+mn-cs"/>
+                        </a:rPr>
+                        <a:t>device</a:t>
+                      </a:r>
+                      <a:endParaRPr lang="zh-CN" altLang="en-US" sz="1800" kern="1200" dirty="0">
+                        <a:solidFill>
+                          <a:srgbClr val="A000A0"/>
+                        </a:solidFill>
+                        <a:latin typeface="新宋体"/>
+                        <a:ea typeface="新宋体"/>
+                        <a:cs typeface="+mn-cs"/>
+                      </a:endParaRPr>
+                    </a:p>
+                  </a:txBody>
+                  <a:tcPr/>
+                </a:tc>
+                <a:tc>
+                  <a:txBody>
+                    <a:bodyPr/>
+                    <a:lstStyle/>
+                    <a:p>
+                      <a:r>
+                        <a:rPr lang="en-US" altLang="zh-CN" sz="1800" kern="1200" dirty="0" smtClean="0">
+                          <a:solidFill>
+                            <a:srgbClr val="A000A0"/>
+                          </a:solidFill>
+                          <a:latin typeface="新宋体"/>
+                          <a:ea typeface="新宋体"/>
+                          <a:cs typeface="+mn-cs"/>
+                        </a:rPr>
+                        <a:t>device</a:t>
+                      </a:r>
+                      <a:endParaRPr lang="zh-CN" altLang="en-US" dirty="0">
+                        <a:solidFill>
+                          <a:schemeClr val="bg1"/>
+                        </a:solidFill>
+                      </a:endParaRPr>
+                    </a:p>
+                  </a:txBody>
+                  <a:tcPr/>
+                </a:tc>
+              </a:tr>
+              <a:tr h="685132">
+                <a:tc>
+                  <a:txBody>
+                    <a:bodyPr/>
+                    <a:lstStyle/>
+                    <a:p>
+                      <a:pPr marL="0" marR="0" indent="0" algn="l" defTabSz="914400" rtl="0" eaLnBrk="1" fontAlgn="auto" latinLnBrk="0" hangingPunct="1">
+                        <a:lnSpc>
+                          <a:spcPct val="100000"/>
+                        </a:lnSpc>
+                        <a:spcBef>
+                          <a:spcPts val="0"/>
+                        </a:spcBef>
+                        <a:spcAft>
+                          <a:spcPts val="0"/>
+                        </a:spcAft>
+                        <a:buClrTx/>
+                        <a:buSzTx/>
+                        <a:buFontTx/>
+                        <a:buNone/>
+                        <a:tabLst/>
+                        <a:defRPr/>
+                      </a:pPr>
+                      <a:r>
+                        <a:rPr lang="en-US" altLang="zh-CN" sz="3200" dirty="0" smtClean="0">
+                          <a:solidFill>
+                            <a:schemeClr val="bg1"/>
+                          </a:solidFill>
+                        </a:rPr>
+                        <a:t>global</a:t>
+                      </a:r>
+                      <a:endParaRPr lang="zh-CN" altLang="en-US" sz="3200" dirty="0" smtClean="0">
+                        <a:solidFill>
+                          <a:schemeClr val="bg1"/>
+                        </a:solidFill>
+                      </a:endParaRPr>
+                    </a:p>
+                  </a:txBody>
+                  <a:tcPr/>
+                </a:tc>
+                <a:tc>
+                  <a:txBody>
+                    <a:bodyPr/>
+                    <a:lstStyle/>
+                    <a:p>
+                      <a:pPr marL="0" marR="0" indent="0" algn="l" defTabSz="914400" rtl="0" eaLnBrk="1" fontAlgn="auto" latinLnBrk="0" hangingPunct="1">
+                        <a:lnSpc>
+                          <a:spcPct val="100000"/>
+                        </a:lnSpc>
+                        <a:spcBef>
+                          <a:spcPts val="0"/>
+                        </a:spcBef>
+                        <a:spcAft>
+                          <a:spcPts val="0"/>
+                        </a:spcAft>
+                        <a:buClrTx/>
+                        <a:buSzTx/>
+                        <a:buFontTx/>
+                        <a:buNone/>
+                        <a:tabLst/>
+                        <a:defRPr/>
+                      </a:pPr>
+                      <a:r>
+                        <a:rPr lang="en-US" altLang="zh-CN" sz="1800" kern="1200" dirty="0" smtClean="0">
+                          <a:solidFill>
+                            <a:srgbClr val="A000A0"/>
+                          </a:solidFill>
+                          <a:latin typeface="新宋体"/>
+                          <a:ea typeface="新宋体"/>
+                          <a:cs typeface="+mn-cs"/>
+                        </a:rPr>
+                        <a:t>host</a:t>
+                      </a:r>
+                    </a:p>
+                    <a:p>
+                      <a:endParaRPr lang="zh-CN" altLang="en-US" dirty="0">
+                        <a:solidFill>
+                          <a:schemeClr val="bg1"/>
+                        </a:solidFill>
+                      </a:endParaRPr>
+                    </a:p>
+                  </a:txBody>
+                  <a:tcPr/>
+                </a:tc>
+                <a:tc>
+                  <a:txBody>
+                    <a:bodyPr/>
+                    <a:lstStyle/>
+                    <a:p>
+                      <a:r>
+                        <a:rPr lang="en-US" altLang="zh-CN" sz="1800" dirty="0" err="1" smtClean="0">
+                          <a:solidFill>
+                            <a:srgbClr val="880000"/>
+                          </a:solidFill>
+                          <a:latin typeface="新宋体"/>
+                          <a:ea typeface="新宋体"/>
+                        </a:rPr>
+                        <a:t>cudaMemcpy</a:t>
+                      </a:r>
+                      <a:endParaRPr lang="en-US" altLang="zh-CN" sz="1800" dirty="0" smtClean="0">
+                        <a:solidFill>
+                          <a:srgbClr val="880000"/>
+                        </a:solidFill>
+                        <a:latin typeface="新宋体"/>
+                        <a:ea typeface="新宋体"/>
+                      </a:endParaRPr>
+                    </a:p>
+                    <a:p>
+                      <a:endParaRPr lang="zh-CN" altLang="en-US" dirty="0"/>
+                    </a:p>
+                  </a:txBody>
+                  <a:tcPr/>
+                </a:tc>
+              </a:tr>
+              <a:tr h="685132">
+                <a:tc>
+                  <a:txBody>
+                    <a:bodyPr/>
+                    <a:lstStyle/>
+                    <a:p>
+                      <a:r>
+                        <a:rPr lang="en-US" altLang="zh-CN" sz="3200" dirty="0" smtClean="0">
+                          <a:solidFill>
+                            <a:schemeClr val="bg1"/>
+                          </a:solidFill>
+                        </a:rPr>
+                        <a:t>constant</a:t>
+                      </a:r>
+                      <a:endParaRPr lang="zh-CN" altLang="en-US" sz="3200" dirty="0">
+                        <a:solidFill>
+                          <a:schemeClr val="bg1"/>
+                        </a:solidFill>
+                      </a:endParaRPr>
+                    </a:p>
+                  </a:txBody>
+                  <a:tcPr/>
+                </a:tc>
+                <a:tc>
+                  <a:txBody>
+                    <a:bodyPr/>
+                    <a:lstStyle/>
+                    <a:p>
+                      <a:pPr marL="0" marR="0" indent="0" algn="l" defTabSz="914400" rtl="0" eaLnBrk="1" fontAlgn="auto" latinLnBrk="0" hangingPunct="1">
+                        <a:lnSpc>
+                          <a:spcPct val="100000"/>
+                        </a:lnSpc>
+                        <a:spcBef>
+                          <a:spcPts val="0"/>
+                        </a:spcBef>
+                        <a:spcAft>
+                          <a:spcPts val="0"/>
+                        </a:spcAft>
+                        <a:buClrTx/>
+                        <a:buSzTx/>
+                        <a:buFontTx/>
+                        <a:buNone/>
+                        <a:tabLst/>
+                        <a:defRPr/>
+                      </a:pPr>
+                      <a:r>
+                        <a:rPr lang="en-US" altLang="zh-CN" sz="1800" kern="1200" dirty="0" smtClean="0">
+                          <a:solidFill>
+                            <a:srgbClr val="A000A0"/>
+                          </a:solidFill>
+                          <a:latin typeface="新宋体"/>
+                          <a:ea typeface="新宋体"/>
+                          <a:cs typeface="+mn-cs"/>
+                        </a:rPr>
+                        <a:t>global</a:t>
+                      </a:r>
+                    </a:p>
+                    <a:p>
+                      <a:endParaRPr lang="zh-CN" altLang="en-US" dirty="0">
+                        <a:solidFill>
+                          <a:schemeClr val="bg1"/>
+                        </a:solidFill>
+                      </a:endParaRPr>
+                    </a:p>
+                  </a:txBody>
+                  <a:tcPr/>
+                </a:tc>
+                <a:tc>
+                  <a:txBody>
+                    <a:bodyPr/>
+                    <a:lstStyle/>
+                    <a:p>
+                      <a:r>
+                        <a:rPr lang="en-US" altLang="zh-CN" sz="1800" dirty="0" err="1" smtClean="0">
+                          <a:solidFill>
+                            <a:srgbClr val="880000"/>
+                          </a:solidFill>
+                          <a:latin typeface="新宋体"/>
+                          <a:ea typeface="新宋体"/>
+                        </a:rPr>
+                        <a:t>cudaMemcpyToSymbol</a:t>
+                      </a:r>
+                      <a:endParaRPr lang="en-US" altLang="zh-CN" sz="1800" dirty="0" smtClean="0">
+                        <a:solidFill>
+                          <a:srgbClr val="880000"/>
+                        </a:solidFill>
+                        <a:latin typeface="新宋体"/>
+                        <a:ea typeface="新宋体"/>
+                      </a:endParaRPr>
+                    </a:p>
+                    <a:p>
+                      <a:endParaRPr lang="zh-CN" altLang="en-US" dirty="0" smtClean="0">
+                        <a:solidFill>
+                          <a:schemeClr val="bg1"/>
+                        </a:solidFill>
+                      </a:endParaRPr>
+                    </a:p>
+                  </a:txBody>
+                  <a:tcPr/>
+                </a:tc>
+              </a:tr>
+              <a:tr h="685132">
+                <a:tc>
+                  <a:txBody>
+                    <a:bodyPr/>
+                    <a:lstStyle/>
+                    <a:p>
+                      <a:r>
+                        <a:rPr lang="en-US" altLang="zh-CN" sz="3200" dirty="0" smtClean="0">
+                          <a:solidFill>
+                            <a:schemeClr val="bg1"/>
+                          </a:solidFill>
+                        </a:rPr>
+                        <a:t>shared</a:t>
+                      </a:r>
+                      <a:endParaRPr lang="zh-CN" altLang="en-US" sz="3200" dirty="0">
+                        <a:solidFill>
+                          <a:schemeClr val="bg1"/>
+                        </a:solidFill>
+                      </a:endParaRPr>
+                    </a:p>
+                  </a:txBody>
+                  <a:tcPr/>
+                </a:tc>
+                <a:tc>
+                  <a:txBody>
+                    <a:bodyPr/>
+                    <a:lstStyle/>
+                    <a:p>
+                      <a:r>
+                        <a:rPr lang="en-US" altLang="zh-CN" sz="1800" kern="1200" dirty="0" smtClean="0">
+                          <a:solidFill>
+                            <a:srgbClr val="A000A0"/>
+                          </a:solidFill>
+                          <a:latin typeface="新宋体"/>
+                          <a:ea typeface="新宋体"/>
+                          <a:cs typeface="+mn-cs"/>
+                        </a:rPr>
+                        <a:t>device</a:t>
+                      </a:r>
+                      <a:endParaRPr lang="en-US" altLang="zh-CN" sz="1800" dirty="0" smtClean="0">
+                        <a:solidFill>
+                          <a:srgbClr val="A000A0"/>
+                        </a:solidFill>
+                        <a:latin typeface="新宋体"/>
+                        <a:ea typeface="新宋体"/>
+                      </a:endParaRPr>
+                    </a:p>
+                    <a:p>
+                      <a:endParaRPr lang="zh-CN" altLang="en-US" dirty="0">
+                        <a:solidFill>
+                          <a:schemeClr val="bg1"/>
+                        </a:solidFill>
+                      </a:endParaRPr>
+                    </a:p>
+                  </a:txBody>
+                  <a:tcPr/>
+                </a:tc>
+                <a:tc>
+                  <a:txBody>
+                    <a:bodyPr/>
+                    <a:lstStyle/>
+                    <a:p>
+                      <a:r>
+                        <a:rPr lang="en-US" altLang="zh-CN" sz="1800" dirty="0" smtClean="0">
+                          <a:solidFill>
+                            <a:srgbClr val="880000"/>
+                          </a:solidFill>
+                          <a:latin typeface="新宋体"/>
+                          <a:ea typeface="新宋体"/>
+                        </a:rPr>
+                        <a:t>__</a:t>
+                      </a:r>
+                      <a:r>
+                        <a:rPr lang="en-US" altLang="zh-CN" sz="1800" dirty="0" err="1" smtClean="0">
+                          <a:solidFill>
+                            <a:srgbClr val="880000"/>
+                          </a:solidFill>
+                          <a:latin typeface="新宋体"/>
+                          <a:ea typeface="新宋体"/>
+                        </a:rPr>
+                        <a:t>syncthreads</a:t>
+                      </a:r>
+                      <a:r>
+                        <a:rPr lang="en-US" altLang="zh-CN" sz="1800" dirty="0" smtClean="0">
+                          <a:solidFill>
+                            <a:prstClr val="black"/>
+                          </a:solidFill>
+                          <a:latin typeface="新宋体"/>
+                          <a:ea typeface="新宋体"/>
+                        </a:rPr>
+                        <a:t>()</a:t>
+                      </a:r>
+                    </a:p>
+                  </a:txBody>
+                  <a:tcPr/>
+                </a:tc>
+              </a:tr>
+            </a:tbl>
+          </a:graphicData>
+        </a:graphic>
+      </p:graphicFrame>
+    </p:spTree>
+    <p:extLst>
+      <p:ext uri="{BB962C8B-B14F-4D97-AF65-F5344CB8AC3E}">
+        <p14:creationId xmlns:p14="http://schemas.microsoft.com/office/powerpoint/2010/main" val="2632320016"/>
+      </p:ext>
+    </p:extLst>
+  </p:cSld>
+  <p:clrMapOvr>
+    <a:masterClrMapping/>
+  </p:clrMapOvr>
+  <mc:AlternateContent xmlns:mc="http://schemas.openxmlformats.org/markup-compatibility/2006" xmlns:p14="http://schemas.microsoft.com/office/powerpoint/2010/main">
+    <mc:Choice Requires="p14">
+      <p:transition spd="med" p14:dur="700">
+        <p:fade/>
+      </p:transition>
+    </mc:Choice>
+    <mc:Fallback xmlns="">
+      <p:transition spd="med">
+        <p:fade/>
+      </p:transition>
+    </mc:Fallback>
+  </mc:AlternateContent>
+  <p:timing>
+    <p:tnLst>
+      <p:par>
+        <p:cTn id="1" dur="indefinite" restart="never" nodeType="tmRoot"/>
+      </p:par>
+    </p:tnLst>
+  </p:timing>
+</p:sld>
+</file>
+
+<file path=ppt/slides/slide12.xml><?xml version="1.0" encoding="utf-8"?>
+<p:sld xmlns:a="http://schemas.openxmlformats.org/drawingml/2006/main" xmlns:r="http://schemas.openxmlformats.org/officeDocument/2006/relationships" xmlns:p="http://schemas.openxmlformats.org/presentationml/2006/main">
+  <p:cSld>
+    <p:spTree>
+      <p:nvGrpSpPr>
+        <p:cNvPr id="1" name=""/>
+        <p:cNvGrpSpPr/>
+        <p:nvPr/>
+      </p:nvGrpSpPr>
+      <p:grpSpPr>
+        <a:xfrm>
+          <a:off x="0" y="0"/>
+          <a:ext cx="0" cy="0"/>
+          <a:chOff x="0" y="0"/>
+          <a:chExt cx="0" cy="0"/>
+        </a:xfrm>
+      </p:grpSpPr>
+      <p:sp>
+        <p:nvSpPr>
+          <p:cNvPr id="2" name="Title 1"/>
+          <p:cNvSpPr>
+            <a:spLocks noGrp="1"/>
+          </p:cNvSpPr>
+          <p:nvPr>
+            <p:ph type="title"/>
+          </p:nvPr>
+        </p:nvSpPr>
+        <p:spPr>
+          <a:xfrm>
+            <a:off x="884238" y="247650"/>
+            <a:ext cx="9204325" cy="590931"/>
+          </a:xfrm>
+        </p:spPr>
+        <p:txBody>
+          <a:bodyPr/>
+          <a:lstStyle/>
+          <a:p>
+            <a:r>
+              <a:rPr lang="zh-CN" altLang="zh-CN" dirty="0"/>
+              <a:t>技巧</a:t>
+            </a:r>
+            <a:r>
+              <a:rPr lang="en-US" altLang="zh-CN" dirty="0"/>
+              <a:t>Tips</a:t>
+            </a:r>
+            <a:endParaRPr lang="en-US" dirty="0"/>
+          </a:p>
+        </p:txBody>
+      </p:sp>
+      <p:sp>
+        <p:nvSpPr>
+          <p:cNvPr id="3" name="Content Placeholder 2"/>
+          <p:cNvSpPr>
+            <a:spLocks noGrp="1"/>
+          </p:cNvSpPr>
+          <p:nvPr>
+            <p:ph idx="1"/>
+          </p:nvPr>
+        </p:nvSpPr>
+        <p:spPr>
+          <a:xfrm>
+            <a:off x="884902" y="1504334"/>
+            <a:ext cx="4254657" cy="4612691"/>
+          </a:xfrm>
+          <a:noFill/>
+          <a:ln w="9525">
+            <a:noFill/>
+            <a:miter lim="800000"/>
+            <a:headEnd/>
+            <a:tailEnd/>
+          </a:ln>
+        </p:spPr>
+        <p:txBody>
+          <a:bodyPr vert="horz" wrap="square" lIns="91440" tIns="45720" rIns="91440" bIns="45720" numCol="1" anchor="t" anchorCtr="0" compatLnSpc="1">
+            <a:prstTxWarp prst="textNoShape">
+              <a:avLst/>
+            </a:prstTxWarp>
+          </a:bodyPr>
+          <a:lstStyle/>
+          <a:p>
+            <a:pPr defTabSz="457056"/>
+            <a:r>
+              <a:rPr lang="zh-CN" altLang="en-US" kern="1200" dirty="0"/>
+              <a:t>异常处理</a:t>
+            </a:r>
+            <a:endParaRPr lang="en-US" altLang="zh-CN" kern="1200" dirty="0"/>
+          </a:p>
+          <a:p>
+            <a:pPr lvl="1" defTabSz="457056"/>
+            <a:r>
+              <a:rPr lang="zh-CN" altLang="zh-CN" sz="2400" kern="1200" dirty="0">
+                <a:ea typeface="MS PGothic" pitchFamily="34" charset="-128"/>
+                <a:cs typeface="+mn-cs"/>
+              </a:rPr>
+              <a:t>结果验证</a:t>
+            </a:r>
+            <a:endParaRPr lang="en-US" altLang="zh-CN" sz="2400" kern="1200" dirty="0">
+              <a:ea typeface="MS PGothic" pitchFamily="34" charset="-128"/>
+              <a:cs typeface="+mn-cs"/>
+            </a:endParaRPr>
+          </a:p>
+          <a:p>
+            <a:pPr lvl="1" defTabSz="457056"/>
+            <a:r>
+              <a:rPr lang="zh-CN" altLang="zh-CN" sz="2400" kern="1200" dirty="0">
+                <a:ea typeface="MS PGothic" pitchFamily="34" charset="-128"/>
+                <a:cs typeface="+mn-cs"/>
+              </a:rPr>
+              <a:t>错误定位</a:t>
+            </a:r>
+            <a:endParaRPr lang="en-US" altLang="zh-CN" sz="2400" kern="1200" dirty="0">
+              <a:ea typeface="MS PGothic" pitchFamily="34" charset="-128"/>
+              <a:cs typeface="+mn-cs"/>
+            </a:endParaRPr>
+          </a:p>
+          <a:p>
+            <a:pPr lvl="1" defTabSz="457056"/>
+            <a:endParaRPr lang="en-US" altLang="zh-CN" sz="2400" kern="1200" dirty="0">
+              <a:ea typeface="MS PGothic" pitchFamily="34" charset="-128"/>
+              <a:cs typeface="+mn-cs"/>
+            </a:endParaRPr>
+          </a:p>
+          <a:p>
+            <a:pPr defTabSz="457056"/>
+            <a:r>
+              <a:rPr lang="zh-CN" altLang="en-US" kern="1200" dirty="0"/>
+              <a:t>线程配置</a:t>
+            </a:r>
+            <a:endParaRPr lang="en-US" altLang="zh-CN" kern="1200" dirty="0"/>
+          </a:p>
+          <a:p>
+            <a:pPr lvl="1" defTabSz="457056"/>
+            <a:r>
+              <a:rPr lang="zh-CN" altLang="zh-CN" sz="2400" kern="1200" dirty="0">
+                <a:ea typeface="MS PGothic" pitchFamily="34" charset="-128"/>
+                <a:cs typeface="+mn-cs"/>
+              </a:rPr>
+              <a:t>线程数目</a:t>
+            </a:r>
+            <a:r>
+              <a:rPr lang="en-US" altLang="zh-CN" sz="2400" kern="1200" dirty="0">
+                <a:ea typeface="MS PGothic" pitchFamily="34" charset="-128"/>
+                <a:cs typeface="+mn-cs"/>
+              </a:rPr>
+              <a:t>32</a:t>
+            </a:r>
+            <a:r>
+              <a:rPr lang="zh-CN" altLang="zh-CN" sz="2400" kern="1200" dirty="0">
+                <a:ea typeface="MS PGothic" pitchFamily="34" charset="-128"/>
+                <a:cs typeface="+mn-cs"/>
+              </a:rPr>
+              <a:t>的倍数</a:t>
+            </a:r>
+            <a:endParaRPr lang="en-US" altLang="zh-CN" sz="2400" kern="1200" dirty="0">
+              <a:ea typeface="MS PGothic" pitchFamily="34" charset="-128"/>
+              <a:cs typeface="+mn-cs"/>
+            </a:endParaRPr>
+          </a:p>
+          <a:p>
+            <a:pPr lvl="1" defTabSz="457056"/>
+            <a:r>
+              <a:rPr lang="zh-CN" altLang="zh-CN" sz="2400" kern="1200" dirty="0">
+                <a:ea typeface="MS PGothic" pitchFamily="34" charset="-128"/>
+                <a:cs typeface="+mn-cs"/>
+              </a:rPr>
+              <a:t>线程数目超过阈值</a:t>
+            </a:r>
+            <a:endParaRPr lang="en-US" altLang="zh-CN" sz="2400" kern="1200" dirty="0">
+              <a:ea typeface="MS PGothic" pitchFamily="34" charset="-128"/>
+              <a:cs typeface="+mn-cs"/>
+            </a:endParaRPr>
+          </a:p>
+          <a:p>
+            <a:pPr defTabSz="457056"/>
+            <a:endParaRPr lang="en-US" kern="1200" dirty="0"/>
+          </a:p>
+        </p:txBody>
+      </p:sp>
+      <p:sp>
+        <p:nvSpPr>
+          <p:cNvPr id="4" name="Content Placeholder 2"/>
+          <p:cNvSpPr txBox="1">
+            <a:spLocks/>
+          </p:cNvSpPr>
+          <p:nvPr/>
+        </p:nvSpPr>
+        <p:spPr bwMode="auto">
+          <a:xfrm>
+            <a:off x="6179566" y="1460090"/>
+            <a:ext cx="4107657" cy="4667442"/>
+          </a:xfrm>
+          <a:prstGeom prst="rect">
+            <a:avLst/>
+          </a:prstGeom>
+          <a:noFill/>
+          <a:ln w="9525">
+            <a:noFill/>
+            <a:miter lim="800000"/>
+            <a:headEnd/>
+            <a:tailEnd/>
+          </a:ln>
+        </p:spPr>
+        <p:txBody>
+          <a:bodyPr vert="horz" wrap="square" lIns="91440" tIns="45720" rIns="91440" bIns="45720" numCol="1" anchor="t" anchorCtr="0" compatLnSpc="1">
+            <a:prstTxWarp prst="textNoShape">
+              <a:avLst/>
+            </a:prstTxWarp>
+          </a:bodyPr>
+          <a:lstStyle>
+            <a:lvl1pPr marL="342900" indent="-342900" algn="l" rtl="0" eaLnBrk="1" fontAlgn="base" hangingPunct="1">
+              <a:spcBef>
+                <a:spcPct val="20000"/>
+              </a:spcBef>
+              <a:spcAft>
+                <a:spcPct val="0"/>
+              </a:spcAft>
+              <a:buSzPct val="100000"/>
+              <a:buFontTx/>
+              <a:buBlip>
+                <a:blip r:embed="rId3"/>
+              </a:buBlip>
+              <a:defRPr sz="2400" b="0">
+                <a:solidFill>
+                  <a:schemeClr val="tx1"/>
+                </a:solidFill>
+                <a:latin typeface="Trebuchet MS" pitchFamily="34" charset="0"/>
+                <a:ea typeface="+mn-ea"/>
+                <a:cs typeface="+mn-cs"/>
+              </a:defRPr>
+            </a:lvl1pPr>
+            <a:lvl2pPr marL="914400" indent="-342900" algn="l" rtl="0" eaLnBrk="1" fontAlgn="base" hangingPunct="1">
+              <a:spcBef>
+                <a:spcPct val="20000"/>
+              </a:spcBef>
+              <a:spcAft>
+                <a:spcPct val="0"/>
+              </a:spcAft>
+              <a:buSzPct val="100000"/>
+              <a:buFontTx/>
+              <a:buBlip>
+                <a:blip r:embed="rId3"/>
+              </a:buBlip>
+              <a:defRPr sz="2000" b="0">
+                <a:solidFill>
+                  <a:schemeClr val="tx1"/>
+                </a:solidFill>
+                <a:latin typeface="Trebuchet MS" pitchFamily="34" charset="0"/>
+              </a:defRPr>
+            </a:lvl2pPr>
+            <a:lvl3pPr marL="1371600" indent="-282575" algn="l" rtl="0" eaLnBrk="1" fontAlgn="base" hangingPunct="1">
+              <a:spcBef>
+                <a:spcPct val="20000"/>
+              </a:spcBef>
+              <a:spcAft>
+                <a:spcPct val="0"/>
+              </a:spcAft>
+              <a:buSzPct val="100000"/>
+              <a:buFontTx/>
+              <a:buBlip>
+                <a:blip r:embed="rId3"/>
+              </a:buBlip>
+              <a:defRPr sz="1800" b="0">
+                <a:solidFill>
+                  <a:schemeClr val="tx1"/>
+                </a:solidFill>
+                <a:latin typeface="Trebuchet MS" pitchFamily="34" charset="0"/>
+              </a:defRPr>
+            </a:lvl3pPr>
+            <a:lvl4pPr marL="1774825" indent="-228600" algn="l" rtl="0" eaLnBrk="1" fontAlgn="base" hangingPunct="1">
+              <a:spcBef>
+                <a:spcPct val="20000"/>
+              </a:spcBef>
+              <a:spcAft>
+                <a:spcPct val="0"/>
+              </a:spcAft>
+              <a:buChar char="–"/>
+              <a:defRPr sz="2000">
+                <a:solidFill>
+                  <a:schemeClr val="tx1"/>
+                </a:solidFill>
+                <a:latin typeface="+mn-lt"/>
+              </a:defRPr>
+            </a:lvl4pPr>
+            <a:lvl5pPr marL="2117725" indent="-228600" algn="l" rtl="0" eaLnBrk="1" fontAlgn="base" hangingPunct="1">
+              <a:spcBef>
+                <a:spcPct val="20000"/>
+              </a:spcBef>
+              <a:spcAft>
+                <a:spcPct val="0"/>
+              </a:spcAft>
+              <a:buChar char="»"/>
+              <a:defRPr sz="2000">
+                <a:solidFill>
+                  <a:schemeClr val="tx1"/>
+                </a:solidFill>
+                <a:latin typeface="+mn-lt"/>
+              </a:defRPr>
+            </a:lvl5pPr>
+            <a:lvl6pPr marL="2574925" indent="-228600" algn="l" rtl="0" eaLnBrk="1" fontAlgn="base" hangingPunct="1">
+              <a:spcBef>
+                <a:spcPct val="20000"/>
+              </a:spcBef>
+              <a:spcAft>
+                <a:spcPct val="0"/>
+              </a:spcAft>
+              <a:buChar char="»"/>
+              <a:defRPr sz="2000">
+                <a:solidFill>
+                  <a:schemeClr val="bg1"/>
+                </a:solidFill>
+                <a:latin typeface="+mn-lt"/>
+              </a:defRPr>
+            </a:lvl6pPr>
+            <a:lvl7pPr marL="3032125" indent="-228600" algn="l" rtl="0" eaLnBrk="1" fontAlgn="base" hangingPunct="1">
+              <a:spcBef>
+                <a:spcPct val="20000"/>
+              </a:spcBef>
+              <a:spcAft>
+                <a:spcPct val="0"/>
+              </a:spcAft>
+              <a:buChar char="»"/>
+              <a:defRPr sz="2000">
+                <a:solidFill>
+                  <a:schemeClr val="bg1"/>
+                </a:solidFill>
+                <a:latin typeface="+mn-lt"/>
+              </a:defRPr>
+            </a:lvl7pPr>
+            <a:lvl8pPr marL="3489325" indent="-228600" algn="l" rtl="0" eaLnBrk="1" fontAlgn="base" hangingPunct="1">
+              <a:spcBef>
+                <a:spcPct val="20000"/>
+              </a:spcBef>
+              <a:spcAft>
+                <a:spcPct val="0"/>
+              </a:spcAft>
+              <a:buChar char="»"/>
+              <a:defRPr sz="2000">
+                <a:solidFill>
+                  <a:schemeClr val="bg1"/>
+                </a:solidFill>
+                <a:latin typeface="+mn-lt"/>
+              </a:defRPr>
+            </a:lvl8pPr>
+            <a:lvl9pPr marL="3946525" indent="-228600" algn="l" rtl="0" eaLnBrk="1" fontAlgn="base" hangingPunct="1">
+              <a:spcBef>
+                <a:spcPct val="20000"/>
+              </a:spcBef>
+              <a:spcAft>
+                <a:spcPct val="0"/>
+              </a:spcAft>
+              <a:buChar char="»"/>
+              <a:defRPr sz="2000">
+                <a:solidFill>
+                  <a:schemeClr val="bg1"/>
+                </a:solidFill>
+                <a:latin typeface="+mn-lt"/>
+              </a:defRPr>
+            </a:lvl9pPr>
+          </a:lstStyle>
+          <a:p>
+            <a:r>
+              <a:rPr lang="zh-CN" altLang="en-US" dirty="0" smtClean="0"/>
+              <a:t>测时</a:t>
+            </a:r>
+            <a:r>
+              <a:rPr lang="zh-CN" altLang="en-US" dirty="0"/>
+              <a:t>对比</a:t>
+            </a:r>
+            <a:endParaRPr lang="en-US" altLang="zh-CN" dirty="0"/>
+          </a:p>
+          <a:p>
+            <a:pPr lvl="1"/>
+            <a:r>
+              <a:rPr lang="zh-CN" altLang="en-US" sz="2400" dirty="0"/>
+              <a:t>调用</a:t>
+            </a:r>
+            <a:r>
+              <a:rPr lang="en-US" altLang="zh-CN" sz="2400" dirty="0" err="1"/>
+              <a:t>helper_timer.h</a:t>
+            </a:r>
+            <a:r>
+              <a:rPr lang="en-US" altLang="zh-CN" sz="2400" dirty="0"/>
+              <a:t> </a:t>
+            </a:r>
+          </a:p>
+          <a:p>
+            <a:pPr lvl="1"/>
+            <a:r>
+              <a:rPr lang="zh-CN" altLang="en-US" sz="2400" dirty="0"/>
+              <a:t>注意</a:t>
+            </a:r>
+            <a:r>
+              <a:rPr lang="en-US" altLang="zh-CN" sz="2400" dirty="0"/>
+              <a:t>Synchronize</a:t>
+            </a:r>
+            <a:r>
+              <a:rPr lang="zh-CN" altLang="en-US" sz="2400" dirty="0"/>
+              <a:t> </a:t>
+            </a:r>
+            <a:endParaRPr lang="en-US" altLang="zh-CN" sz="2400" dirty="0"/>
+          </a:p>
+          <a:p>
+            <a:pPr lvl="1"/>
+            <a:r>
+              <a:rPr lang="zh-CN" altLang="en-US" sz="2400" dirty="0"/>
+              <a:t>线程数目</a:t>
+            </a:r>
+            <a:r>
+              <a:rPr lang="en-US" altLang="zh-CN" sz="2400" dirty="0"/>
+              <a:t>(</a:t>
+            </a:r>
+            <a:r>
+              <a:rPr lang="zh-CN" altLang="en-US" sz="2400" dirty="0"/>
+              <a:t>问题规模</a:t>
+            </a:r>
+            <a:r>
+              <a:rPr lang="en-US" altLang="zh-CN" sz="2400" dirty="0"/>
+              <a:t>)</a:t>
+            </a:r>
+            <a:r>
+              <a:rPr lang="zh-CN" altLang="en-US" sz="2400" dirty="0"/>
+              <a:t>多大时，</a:t>
+            </a:r>
+            <a:r>
+              <a:rPr lang="en-US" altLang="zh-CN" sz="2400" dirty="0"/>
+              <a:t>GPU</a:t>
+            </a:r>
+            <a:r>
+              <a:rPr lang="zh-CN" altLang="en-US" sz="2400" dirty="0"/>
+              <a:t>发挥的性能赶超</a:t>
+            </a:r>
+            <a:r>
+              <a:rPr lang="en-US" altLang="zh-CN" sz="2400" dirty="0"/>
+              <a:t>CPU</a:t>
+            </a:r>
+            <a:r>
+              <a:rPr lang="zh-CN" altLang="en-US" sz="2400" dirty="0"/>
+              <a:t>？</a:t>
+            </a:r>
+            <a:endParaRPr lang="en-US" altLang="zh-CN" sz="2400" dirty="0"/>
+          </a:p>
+          <a:p>
+            <a:endParaRPr lang="en-US" altLang="zh-CN" dirty="0"/>
+          </a:p>
+          <a:p>
+            <a:pPr lvl="1"/>
+            <a:endParaRPr lang="en-US" altLang="zh-CN" sz="2400" dirty="0" smtClean="0"/>
+          </a:p>
+          <a:p>
+            <a:pPr marL="571500" lvl="1" indent="0">
+              <a:buNone/>
+            </a:pPr>
+            <a:endParaRPr lang="en-US" altLang="zh-CN" sz="2400" dirty="0" smtClean="0"/>
+          </a:p>
+          <a:p>
+            <a:endParaRPr lang="en-US" altLang="zh-CN" dirty="0" smtClean="0"/>
+          </a:p>
+          <a:p>
+            <a:endParaRPr lang="en-US" dirty="0"/>
+          </a:p>
+        </p:txBody>
+      </p:sp>
+    </p:spTree>
+    <p:extLst>
+      <p:ext uri="{BB962C8B-B14F-4D97-AF65-F5344CB8AC3E}">
+        <p14:creationId xmlns:p14="http://schemas.microsoft.com/office/powerpoint/2010/main" val="4291639553"/>
+      </p:ext>
+    </p:extLst>
+  </p:cSld>
+  <p:clrMapOvr>
+    <a:masterClrMapping/>
+  </p:clrMapOvr>
+  <mc:AlternateContent xmlns:mc="http://schemas.openxmlformats.org/markup-compatibility/2006" xmlns:p14="http://schemas.microsoft.com/office/powerpoint/2010/main">
+    <mc:Choice Requires="p14">
+      <p:transition spd="med" p14:dur="700">
+        <p:fade/>
+      </p:transition>
+    </mc:Choice>
+    <mc:Fallback xmlns="">
+      <p:transition spd="med">
+        <p:fade/>
+      </p:transition>
+    </mc:Fallback>
+  </mc:AlternateContent>
+  <p:timing>
+    <p:tnLst>
+      <p:par>
+        <p:cTn id="1" dur="indefinite" restart="never" nodeType="tmRoot"/>
+      </p:par>
+    </p:tnLst>
+  </p:timing>
+</p:sld>
+</file>
+
+<file path=ppt/slides/slide13.xml><?xml version="1.0" encoding="utf-8"?>
+<p:sld xmlns:a="http://schemas.openxmlformats.org/drawingml/2006/main" xmlns:r="http://schemas.openxmlformats.org/officeDocument/2006/relationships" xmlns:p="http://schemas.openxmlformats.org/presentationml/2006/main">
+  <p:cSld>
+    <p:spTree>
+      <p:nvGrpSpPr>
+        <p:cNvPr id="1" name=""/>
+        <p:cNvGrpSpPr/>
+        <p:nvPr/>
+      </p:nvGrpSpPr>
+      <p:grpSpPr>
+        <a:xfrm>
+          <a:off x="0" y="0"/>
+          <a:ext cx="0" cy="0"/>
+          <a:chOff x="0" y="0"/>
+          <a:chExt cx="0" cy="0"/>
+        </a:xfrm>
+      </p:grpSpPr>
+      <p:sp>
+        <p:nvSpPr>
+          <p:cNvPr id="12" name="标题 1"/>
+          <p:cNvSpPr>
+            <a:spLocks noGrp="1"/>
+          </p:cNvSpPr>
+          <p:nvPr>
+            <p:ph type="title"/>
+          </p:nvPr>
+        </p:nvSpPr>
+        <p:spPr>
+          <a:xfrm>
+            <a:off x="884238" y="247650"/>
+            <a:ext cx="9204325" cy="978729"/>
+          </a:xfrm>
+        </p:spPr>
+        <p:txBody>
+          <a:bodyPr/>
+          <a:lstStyle/>
+          <a:p>
+            <a:r>
+              <a:rPr lang="zh-CN" altLang="zh-CN" dirty="0"/>
+              <a:t>技巧</a:t>
+            </a:r>
+            <a:r>
+              <a:rPr lang="en-US" altLang="zh-CN" dirty="0"/>
+              <a:t>Tips</a:t>
+            </a:r>
+            <a:br>
+              <a:rPr lang="en-US" altLang="zh-CN" dirty="0"/>
+            </a:br>
+            <a:r>
+              <a:rPr lang="zh-CN" altLang="en-US" sz="2800" dirty="0" smtClean="0"/>
+              <a:t>异常处理</a:t>
+            </a:r>
+            <a:endParaRPr lang="zh-CN" altLang="en-US" sz="2800" dirty="0"/>
+          </a:p>
+        </p:txBody>
+      </p:sp>
+      <p:pic>
+        <p:nvPicPr>
+          <p:cNvPr id="2053" name="Picture 5"/>
+          <p:cNvPicPr>
+            <a:picLocks noChangeAspect="1" noChangeArrowheads="1"/>
+          </p:cNvPicPr>
+          <p:nvPr/>
+        </p:nvPicPr>
+        <p:blipFill>
+          <a:blip r:embed="rId3">
+            <a:extLst>
+              <a:ext uri="{28A0092B-C50C-407E-A947-70E740481C1C}">
+                <a14:useLocalDpi xmlns:a14="http://schemas.microsoft.com/office/drawing/2010/main" val="0"/>
+              </a:ext>
+            </a:extLst>
+          </a:blip>
+          <a:srcRect/>
+          <a:stretch>
+            <a:fillRect/>
+          </a:stretch>
+        </p:blipFill>
+        <p:spPr bwMode="auto">
+          <a:xfrm>
+            <a:off x="2591549" y="1169068"/>
+            <a:ext cx="5629275" cy="1009650"/>
+          </a:xfrm>
+          <a:prstGeom prst="rect">
+            <a:avLst/>
+          </a:prstGeom>
+          <a:noFill/>
+          <a:ln>
+            <a:noFill/>
+          </a:ln>
+          <a:effectLst/>
+          <a:extLst>
+            <a:ext uri="{909E8E84-426E-40DD-AFC4-6F175D3DCCD1}">
+              <a14:hiddenFill xmlns:a14="http://schemas.microsoft.com/office/drawing/2010/main">
+                <a:solidFill>
+                  <a:schemeClr val="accent1"/>
+                </a:solidFill>
+              </a14:hiddenFill>
+            </a:ext>
+            <a:ext uri="{91240B29-F687-4F45-9708-019B960494DF}">
+              <a14:hiddenLine xmlns:a14="http://schemas.microsoft.com/office/drawing/2010/main" w="9525">
+                <a:solidFill>
+                  <a:schemeClr val="tx1"/>
+                </a:solidFill>
+                <a:miter lim="800000"/>
+                <a:headEnd/>
+                <a:tailEnd/>
+              </a14:hiddenLine>
+            </a:ext>
+            <a:ext uri="{AF507438-7753-43E0-B8FC-AC1667EBCBE1}">
+              <a14:hiddenEffects xmlns:a14="http://schemas.microsoft.com/office/drawing/2010/main">
+                <a:effectLst>
+                  <a:outerShdw dist="35921" dir="2700000" algn="ctr" rotWithShape="0">
+                    <a:schemeClr val="bg2"/>
+                  </a:outerShdw>
+                </a:effectLst>
+              </a14:hiddenEffects>
+            </a:ext>
+          </a:extLst>
+        </p:spPr>
+      </p:pic>
+      <p:pic>
+        <p:nvPicPr>
+          <p:cNvPr id="2054" name="Picture 6"/>
+          <p:cNvPicPr>
+            <a:picLocks noChangeAspect="1" noChangeArrowheads="1"/>
+          </p:cNvPicPr>
+          <p:nvPr/>
+        </p:nvPicPr>
+        <p:blipFill>
+          <a:blip r:embed="rId4">
+            <a:extLst>
+              <a:ext uri="{28A0092B-C50C-407E-A947-70E740481C1C}">
+                <a14:useLocalDpi xmlns:a14="http://schemas.microsoft.com/office/drawing/2010/main" val="0"/>
+              </a:ext>
+            </a:extLst>
+          </a:blip>
+          <a:srcRect/>
+          <a:stretch>
+            <a:fillRect/>
+          </a:stretch>
+        </p:blipFill>
+        <p:spPr bwMode="auto">
+          <a:xfrm>
+            <a:off x="1838325" y="2226842"/>
+            <a:ext cx="7296150" cy="3609975"/>
+          </a:xfrm>
+          <a:prstGeom prst="rect">
+            <a:avLst/>
+          </a:prstGeom>
+          <a:noFill/>
+          <a:ln>
+            <a:noFill/>
+          </a:ln>
+          <a:effectLst/>
+          <a:extLst>
+            <a:ext uri="{909E8E84-426E-40DD-AFC4-6F175D3DCCD1}">
+              <a14:hiddenFill xmlns:a14="http://schemas.microsoft.com/office/drawing/2010/main">
+                <a:solidFill>
+                  <a:schemeClr val="accent1"/>
+                </a:solidFill>
+              </a14:hiddenFill>
+            </a:ext>
+            <a:ext uri="{91240B29-F687-4F45-9708-019B960494DF}">
+              <a14:hiddenLine xmlns:a14="http://schemas.microsoft.com/office/drawing/2010/main" w="9525">
+                <a:solidFill>
+                  <a:schemeClr val="tx1"/>
+                </a:solidFill>
+                <a:miter lim="800000"/>
+                <a:headEnd/>
+                <a:tailEnd/>
+              </a14:hiddenLine>
+            </a:ext>
+            <a:ext uri="{AF507438-7753-43E0-B8FC-AC1667EBCBE1}">
+              <a14:hiddenEffects xmlns:a14="http://schemas.microsoft.com/office/drawing/2010/main">
+                <a:effectLst>
+                  <a:outerShdw dist="35921" dir="2700000" algn="ctr" rotWithShape="0">
+                    <a:schemeClr val="bg2"/>
+                  </a:outerShdw>
+                </a:effectLst>
+              </a14:hiddenEffects>
+            </a:ext>
+          </a:extLst>
+        </p:spPr>
+      </p:pic>
+      <p:pic>
+        <p:nvPicPr>
+          <p:cNvPr id="2052" name="Picture 4"/>
+          <p:cNvPicPr>
+            <a:picLocks noChangeAspect="1" noChangeArrowheads="1"/>
+          </p:cNvPicPr>
+          <p:nvPr/>
+        </p:nvPicPr>
+        <p:blipFill>
+          <a:blip r:embed="rId5">
+            <a:extLst>
+              <a:ext uri="{28A0092B-C50C-407E-A947-70E740481C1C}">
+                <a14:useLocalDpi xmlns:a14="http://schemas.microsoft.com/office/drawing/2010/main" val="0"/>
+              </a:ext>
+            </a:extLst>
+          </a:blip>
+          <a:srcRect/>
+          <a:stretch>
+            <a:fillRect/>
+          </a:stretch>
+        </p:blipFill>
+        <p:spPr bwMode="auto">
+          <a:xfrm>
+            <a:off x="4896599" y="5360567"/>
+            <a:ext cx="3324225" cy="476250"/>
+          </a:xfrm>
+          <a:prstGeom prst="rect">
+            <a:avLst/>
+          </a:prstGeom>
+          <a:noFill/>
+          <a:ln>
+            <a:noFill/>
+          </a:ln>
+          <a:effectLst/>
+          <a:extLst>
+            <a:ext uri="{909E8E84-426E-40DD-AFC4-6F175D3DCCD1}">
+              <a14:hiddenFill xmlns:a14="http://schemas.microsoft.com/office/drawing/2010/main">
+                <a:solidFill>
+                  <a:schemeClr val="accent1"/>
+                </a:solidFill>
+              </a14:hiddenFill>
+            </a:ext>
+            <a:ext uri="{91240B29-F687-4F45-9708-019B960494DF}">
+              <a14:hiddenLine xmlns:a14="http://schemas.microsoft.com/office/drawing/2010/main" w="9525">
+                <a:solidFill>
+                  <a:schemeClr val="tx1"/>
+                </a:solidFill>
+                <a:miter lim="800000"/>
+                <a:headEnd/>
+                <a:tailEnd/>
+              </a14:hiddenLine>
+            </a:ext>
+            <a:ext uri="{AF507438-7753-43E0-B8FC-AC1667EBCBE1}">
+              <a14:hiddenEffects xmlns:a14="http://schemas.microsoft.com/office/drawing/2010/main">
+                <a:effectLst>
+                  <a:outerShdw dist="35921" dir="2700000" algn="ctr" rotWithShape="0">
+                    <a:schemeClr val="bg2"/>
+                  </a:outerShdw>
+                </a:effectLst>
+              </a14:hiddenEffects>
+            </a:ext>
+          </a:extLst>
+        </p:spPr>
+      </p:pic>
+    </p:spTree>
+    <p:extLst>
+      <p:ext uri="{BB962C8B-B14F-4D97-AF65-F5344CB8AC3E}">
+        <p14:creationId xmlns:p14="http://schemas.microsoft.com/office/powerpoint/2010/main" val="2255820023"/>
+      </p:ext>
+    </p:extLst>
+  </p:cSld>
+  <p:clrMapOvr>
+    <a:masterClrMapping/>
+  </p:clrMapOvr>
+  <mc:AlternateContent xmlns:mc="http://schemas.openxmlformats.org/markup-compatibility/2006" xmlns:p14="http://schemas.microsoft.com/office/powerpoint/2010/main">
+    <mc:Choice Requires="p14">
+      <p:transition spd="med" p14:dur="700">
+        <p:fade/>
+      </p:transition>
+    </mc:Choice>
+    <mc:Fallback xmlns="">
+      <p:transition spd="med">
+        <p:fade/>
+      </p:transition>
+    </mc:Fallback>
+  </mc:AlternateContent>
+  <p:timing>
+    <p:tnLst>
+      <p:par>
+        <p:cTn id="1" dur="indefinite" restart="never" nodeType="tmRoot"/>
+      </p:par>
+    </p:tnLst>
+  </p:timing>
+</p:sld>
+</file>
+
+<file path=ppt/slides/slide14.xml><?xml version="1.0" encoding="utf-8"?>
+<p:sld xmlns:a="http://schemas.openxmlformats.org/drawingml/2006/main" xmlns:r="http://schemas.openxmlformats.org/officeDocument/2006/relationships" xmlns:p="http://schemas.openxmlformats.org/presentationml/2006/main">
+  <p:cSld>
+    <p:spTree>
+      <p:nvGrpSpPr>
+        <p:cNvPr id="1" name=""/>
+        <p:cNvGrpSpPr/>
+        <p:nvPr/>
+      </p:nvGrpSpPr>
+      <p:grpSpPr>
+        <a:xfrm>
+          <a:off x="0" y="0"/>
+          <a:ext cx="0" cy="0"/>
+          <a:chOff x="0" y="0"/>
+          <a:chExt cx="0" cy="0"/>
+        </a:xfrm>
+      </p:grpSpPr>
+      <p:pic>
+        <p:nvPicPr>
+          <p:cNvPr id="2050" name="Picture 2"/>
+          <p:cNvPicPr>
+            <a:picLocks noChangeAspect="1" noChangeArrowheads="1"/>
+          </p:cNvPicPr>
+          <p:nvPr/>
+        </p:nvPicPr>
+        <p:blipFill>
+          <a:blip r:embed="rId3">
+            <a:extLst>
+              <a:ext uri="{28A0092B-C50C-407E-A947-70E740481C1C}">
+                <a14:useLocalDpi xmlns:a14="http://schemas.microsoft.com/office/drawing/2010/main" val="0"/>
+              </a:ext>
+            </a:extLst>
+          </a:blip>
+          <a:srcRect/>
+          <a:stretch>
+            <a:fillRect/>
+          </a:stretch>
+        </p:blipFill>
+        <p:spPr bwMode="auto">
+          <a:xfrm>
+            <a:off x="2453439" y="1915772"/>
+            <a:ext cx="5905500" cy="2314575"/>
+          </a:xfrm>
+          <a:prstGeom prst="rect">
+            <a:avLst/>
+          </a:prstGeom>
+          <a:noFill/>
+          <a:ln>
+            <a:noFill/>
+          </a:ln>
+          <a:effectLst/>
+          <a:extLst>
+            <a:ext uri="{909E8E84-426E-40DD-AFC4-6F175D3DCCD1}">
+              <a14:hiddenFill xmlns:a14="http://schemas.microsoft.com/office/drawing/2010/main">
+                <a:solidFill>
+                  <a:schemeClr val="accent1"/>
+                </a:solidFill>
+              </a14:hiddenFill>
+            </a:ext>
+            <a:ext uri="{91240B29-F687-4F45-9708-019B960494DF}">
+              <a14:hiddenLine xmlns:a14="http://schemas.microsoft.com/office/drawing/2010/main" w="9525">
+                <a:solidFill>
+                  <a:schemeClr val="tx1"/>
+                </a:solidFill>
+                <a:miter lim="800000"/>
+                <a:headEnd/>
+                <a:tailEnd/>
+              </a14:hiddenLine>
+            </a:ext>
+            <a:ext uri="{AF507438-7753-43E0-B8FC-AC1667EBCBE1}">
+              <a14:hiddenEffects xmlns:a14="http://schemas.microsoft.com/office/drawing/2010/main">
+                <a:effectLst>
+                  <a:outerShdw dist="35921" dir="2700000" algn="ctr" rotWithShape="0">
+                    <a:schemeClr val="bg2"/>
+                  </a:outerShdw>
+                </a:effectLst>
+              </a14:hiddenEffects>
+            </a:ext>
+          </a:extLst>
+        </p:spPr>
+      </p:pic>
+      <p:pic>
+        <p:nvPicPr>
+          <p:cNvPr id="2051" name="Picture 3"/>
+          <p:cNvPicPr>
+            <a:picLocks noChangeAspect="1" noChangeArrowheads="1"/>
+          </p:cNvPicPr>
+          <p:nvPr/>
+        </p:nvPicPr>
+        <p:blipFill>
+          <a:blip r:embed="rId4">
+            <a:extLst>
+              <a:ext uri="{28A0092B-C50C-407E-A947-70E740481C1C}">
+                <a14:useLocalDpi xmlns:a14="http://schemas.microsoft.com/office/drawing/2010/main" val="0"/>
+              </a:ext>
+            </a:extLst>
+          </a:blip>
+          <a:srcRect/>
+          <a:stretch>
+            <a:fillRect/>
+          </a:stretch>
+        </p:blipFill>
+        <p:spPr bwMode="auto">
+          <a:xfrm>
+            <a:off x="2924926" y="4422852"/>
+            <a:ext cx="4962525" cy="1381125"/>
+          </a:xfrm>
+          <a:prstGeom prst="rect">
+            <a:avLst/>
+          </a:prstGeom>
+          <a:noFill/>
+          <a:ln>
+            <a:noFill/>
+          </a:ln>
+          <a:effectLst/>
+          <a:extLst>
+            <a:ext uri="{909E8E84-426E-40DD-AFC4-6F175D3DCCD1}">
+              <a14:hiddenFill xmlns:a14="http://schemas.microsoft.com/office/drawing/2010/main">
+                <a:solidFill>
+                  <a:schemeClr val="accent1"/>
+                </a:solidFill>
+              </a14:hiddenFill>
+            </a:ext>
+            <a:ext uri="{91240B29-F687-4F45-9708-019B960494DF}">
+              <a14:hiddenLine xmlns:a14="http://schemas.microsoft.com/office/drawing/2010/main" w="9525">
+                <a:solidFill>
+                  <a:schemeClr val="tx1"/>
+                </a:solidFill>
+                <a:miter lim="800000"/>
+                <a:headEnd/>
+                <a:tailEnd/>
+              </a14:hiddenLine>
+            </a:ext>
+            <a:ext uri="{AF507438-7753-43E0-B8FC-AC1667EBCBE1}">
+              <a14:hiddenEffects xmlns:a14="http://schemas.microsoft.com/office/drawing/2010/main">
+                <a:effectLst>
+                  <a:outerShdw dist="35921" dir="2700000" algn="ctr" rotWithShape="0">
+                    <a:schemeClr val="bg2"/>
+                  </a:outerShdw>
+                </a:effectLst>
+              </a14:hiddenEffects>
+            </a:ext>
+          </a:extLst>
+        </p:spPr>
+      </p:pic>
+      <p:sp>
+        <p:nvSpPr>
+          <p:cNvPr id="12" name="标题 1"/>
+          <p:cNvSpPr>
+            <a:spLocks noGrp="1"/>
+          </p:cNvSpPr>
+          <p:nvPr>
+            <p:ph type="title"/>
+          </p:nvPr>
+        </p:nvSpPr>
+        <p:spPr>
+          <a:xfrm>
+            <a:off x="884238" y="247650"/>
+            <a:ext cx="9204325" cy="978729"/>
+          </a:xfrm>
+        </p:spPr>
+        <p:txBody>
+          <a:bodyPr/>
+          <a:lstStyle/>
+          <a:p>
+            <a:r>
+              <a:rPr lang="zh-CN" altLang="zh-CN" dirty="0"/>
+              <a:t>技巧</a:t>
+            </a:r>
+            <a:r>
+              <a:rPr lang="en-US" altLang="zh-CN" dirty="0"/>
+              <a:t>Tips</a:t>
+            </a:r>
+            <a:br>
+              <a:rPr lang="en-US" altLang="zh-CN" dirty="0"/>
+            </a:br>
+            <a:r>
+              <a:rPr lang="zh-CN" altLang="en-US" sz="2800" dirty="0" smtClean="0"/>
+              <a:t>线程配置</a:t>
+            </a:r>
+            <a:r>
+              <a:rPr lang="en-US" altLang="zh-CN" sz="2800" dirty="0"/>
+              <a:t>——</a:t>
+            </a:r>
+            <a:r>
+              <a:rPr lang="en-US" altLang="zh-CN" sz="2800" dirty="0" smtClean="0"/>
+              <a:t>32</a:t>
+            </a:r>
+            <a:r>
+              <a:rPr lang="zh-CN" altLang="en-US" sz="2800" dirty="0"/>
+              <a:t>的</a:t>
+            </a:r>
+            <a:r>
+              <a:rPr lang="zh-CN" altLang="en-US" sz="2800" dirty="0" smtClean="0"/>
+              <a:t>倍数</a:t>
+            </a:r>
+            <a:endParaRPr lang="zh-CN" altLang="en-US" sz="2800" dirty="0"/>
+          </a:p>
+        </p:txBody>
+      </p:sp>
+    </p:spTree>
+    <p:extLst>
+      <p:ext uri="{BB962C8B-B14F-4D97-AF65-F5344CB8AC3E}">
+        <p14:creationId xmlns:p14="http://schemas.microsoft.com/office/powerpoint/2010/main" val="1179822049"/>
+      </p:ext>
+    </p:extLst>
+  </p:cSld>
+  <p:clrMapOvr>
+    <a:masterClrMapping/>
+  </p:clrMapOvr>
+  <mc:AlternateContent xmlns:mc="http://schemas.openxmlformats.org/markup-compatibility/2006" xmlns:p14="http://schemas.microsoft.com/office/powerpoint/2010/main">
+    <mc:Choice Requires="p14">
+      <p:transition spd="med" p14:dur="700">
+        <p:fade/>
+      </p:transition>
+    </mc:Choice>
+    <mc:Fallback xmlns="">
+      <p:transition spd="med">
+        <p:fade/>
+      </p:transition>
+    </mc:Fallback>
+  </mc:AlternateContent>
+  <p:timing>
+    <p:tnLst>
+      <p:par>
+        <p:cTn id="1" dur="indefinite" restart="never" nodeType="tmRoot"/>
+      </p:par>
+    </p:tnLst>
+  </p:timing>
+</p:sld>
+</file>
+
+<file path=ppt/slides/slide15.xml><?xml version="1.0" encoding="utf-8"?>
+<p:sld xmlns:a="http://schemas.openxmlformats.org/drawingml/2006/main" xmlns:r="http://schemas.openxmlformats.org/officeDocument/2006/relationships" xmlns:p="http://schemas.openxmlformats.org/presentationml/2006/main">
+  <p:cSld>
+    <p:spTree>
+      <p:nvGrpSpPr>
+        <p:cNvPr id="1" name=""/>
+        <p:cNvGrpSpPr/>
+        <p:nvPr/>
+      </p:nvGrpSpPr>
+      <p:grpSpPr>
+        <a:xfrm>
+          <a:off x="0" y="0"/>
+          <a:ext cx="0" cy="0"/>
+          <a:chOff x="0" y="0"/>
+          <a:chExt cx="0" cy="0"/>
+        </a:xfrm>
+      </p:grpSpPr>
+      <p:sp>
+        <p:nvSpPr>
+          <p:cNvPr id="2" name="标题 1"/>
+          <p:cNvSpPr>
+            <a:spLocks noGrp="1"/>
+          </p:cNvSpPr>
+          <p:nvPr>
+            <p:ph type="title"/>
+          </p:nvPr>
+        </p:nvSpPr>
+        <p:spPr>
+          <a:xfrm>
+            <a:off x="884238" y="247650"/>
+            <a:ext cx="9204325" cy="978729"/>
+          </a:xfrm>
+        </p:spPr>
+        <p:txBody>
+          <a:bodyPr/>
+          <a:lstStyle/>
+          <a:p>
+            <a:r>
+              <a:rPr lang="zh-CN" altLang="zh-CN" dirty="0" smtClean="0"/>
+              <a:t>技巧</a:t>
+            </a:r>
+            <a:r>
+              <a:rPr lang="en-US" altLang="zh-CN" dirty="0" smtClean="0"/>
+              <a:t>Tips</a:t>
+            </a:r>
+            <a:br>
+              <a:rPr lang="en-US" altLang="zh-CN" dirty="0" smtClean="0"/>
+            </a:br>
+            <a:r>
+              <a:rPr lang="zh-CN" altLang="en-US" sz="2800" dirty="0" smtClean="0"/>
+              <a:t>线程配置</a:t>
+            </a:r>
+            <a:r>
+              <a:rPr lang="en-US" altLang="zh-CN" sz="2800" dirty="0" smtClean="0"/>
+              <a:t>——</a:t>
+            </a:r>
+            <a:r>
+              <a:rPr lang="zh-CN" altLang="en-US" sz="2800" dirty="0" smtClean="0"/>
+              <a:t>超过阈值</a:t>
+            </a:r>
+            <a:endParaRPr lang="zh-CN" altLang="en-US" sz="2800" dirty="0"/>
+          </a:p>
+        </p:txBody>
+      </p:sp>
+      <p:sp>
+        <p:nvSpPr>
+          <p:cNvPr id="3" name="内容占位符 2"/>
+          <p:cNvSpPr>
+            <a:spLocks noGrp="1"/>
+          </p:cNvSpPr>
+          <p:nvPr>
+            <p:ph idx="1"/>
+          </p:nvPr>
+        </p:nvSpPr>
+        <p:spPr>
+          <a:xfrm>
+            <a:off x="882779" y="1439863"/>
+            <a:ext cx="4928085" cy="4252912"/>
+          </a:xfrm>
+        </p:spPr>
+        <p:txBody>
+          <a:bodyPr/>
+          <a:lstStyle/>
+          <a:p>
+            <a:r>
+              <a:rPr lang="en-US" altLang="zh-CN" dirty="0" smtClean="0"/>
+              <a:t>           </a:t>
+            </a:r>
+            <a:r>
+              <a:rPr lang="en-US" altLang="zh-CN" dirty="0" err="1" smtClean="0"/>
+              <a:t>int</a:t>
+            </a:r>
+            <a:r>
+              <a:rPr lang="en-US" altLang="zh-CN" dirty="0" smtClean="0"/>
+              <a:t> </a:t>
+            </a:r>
+            <a:r>
+              <a:rPr lang="en-US" altLang="zh-CN" dirty="0"/>
+              <a:t>n = 10000000;</a:t>
+            </a:r>
+          </a:p>
+          <a:p>
+            <a:endParaRPr lang="en-US" altLang="zh-CN" dirty="0" smtClean="0"/>
+          </a:p>
+        </p:txBody>
+      </p:sp>
+      <p:sp>
+        <p:nvSpPr>
+          <p:cNvPr id="4" name="内容占位符 2"/>
+          <p:cNvSpPr txBox="1">
+            <a:spLocks/>
+          </p:cNvSpPr>
+          <p:nvPr/>
+        </p:nvSpPr>
+        <p:spPr bwMode="auto">
+          <a:xfrm>
+            <a:off x="6127598" y="1434603"/>
+            <a:ext cx="4816476" cy="4252912"/>
+          </a:xfrm>
+          <a:prstGeom prst="rect">
+            <a:avLst/>
+          </a:prstGeom>
+          <a:noFill/>
+          <a:ln w="9525">
+            <a:noFill/>
+            <a:miter lim="800000"/>
+            <a:headEnd/>
+            <a:tailEnd/>
+          </a:ln>
+        </p:spPr>
+        <p:txBody>
+          <a:bodyPr vert="horz" wrap="square" lIns="91440" tIns="45720" rIns="91440" bIns="45720" numCol="1" anchor="t" anchorCtr="0" compatLnSpc="1">
+            <a:prstTxWarp prst="textNoShape">
+              <a:avLst/>
+            </a:prstTxWarp>
+          </a:bodyPr>
+          <a:lstStyle>
+            <a:lvl1pPr marL="342900" indent="-342900" algn="l" rtl="0" eaLnBrk="1" fontAlgn="base" hangingPunct="1">
+              <a:spcBef>
+                <a:spcPct val="20000"/>
+              </a:spcBef>
+              <a:spcAft>
+                <a:spcPct val="0"/>
+              </a:spcAft>
+              <a:buSzPct val="100000"/>
+              <a:buFontTx/>
+              <a:buBlip>
+                <a:blip r:embed="rId3"/>
+              </a:buBlip>
+              <a:defRPr sz="2400" b="0">
+                <a:solidFill>
+                  <a:schemeClr val="tx1"/>
+                </a:solidFill>
+                <a:latin typeface="Trebuchet MS" pitchFamily="34" charset="0"/>
+                <a:ea typeface="+mn-ea"/>
+                <a:cs typeface="+mn-cs"/>
+              </a:defRPr>
+            </a:lvl1pPr>
+            <a:lvl2pPr marL="914400" indent="-342900" algn="l" rtl="0" eaLnBrk="1" fontAlgn="base" hangingPunct="1">
+              <a:spcBef>
+                <a:spcPct val="20000"/>
+              </a:spcBef>
+              <a:spcAft>
+                <a:spcPct val="0"/>
+              </a:spcAft>
+              <a:buSzPct val="100000"/>
+              <a:buFontTx/>
+              <a:buBlip>
+                <a:blip r:embed="rId3"/>
+              </a:buBlip>
+              <a:defRPr sz="2000" b="0">
+                <a:solidFill>
+                  <a:schemeClr val="tx1"/>
+                </a:solidFill>
+                <a:latin typeface="Trebuchet MS" pitchFamily="34" charset="0"/>
+              </a:defRPr>
+            </a:lvl2pPr>
+            <a:lvl3pPr marL="1371600" indent="-282575" algn="l" rtl="0" eaLnBrk="1" fontAlgn="base" hangingPunct="1">
+              <a:spcBef>
+                <a:spcPct val="20000"/>
+              </a:spcBef>
+              <a:spcAft>
+                <a:spcPct val="0"/>
+              </a:spcAft>
+              <a:buSzPct val="100000"/>
+              <a:buFontTx/>
+              <a:buBlip>
+                <a:blip r:embed="rId3"/>
+              </a:buBlip>
+              <a:defRPr sz="1800" b="0">
+                <a:solidFill>
+                  <a:schemeClr val="tx1"/>
+                </a:solidFill>
+                <a:latin typeface="Trebuchet MS" pitchFamily="34" charset="0"/>
+              </a:defRPr>
+            </a:lvl3pPr>
+            <a:lvl4pPr marL="1774825" indent="-228600" algn="l" rtl="0" eaLnBrk="1" fontAlgn="base" hangingPunct="1">
+              <a:spcBef>
+                <a:spcPct val="20000"/>
+              </a:spcBef>
+              <a:spcAft>
+                <a:spcPct val="0"/>
+              </a:spcAft>
+              <a:buChar char="–"/>
+              <a:defRPr sz="2000">
+                <a:solidFill>
+                  <a:schemeClr val="tx1"/>
+                </a:solidFill>
+                <a:latin typeface="+mn-lt"/>
+              </a:defRPr>
+            </a:lvl4pPr>
+            <a:lvl5pPr marL="2117725" indent="-228600" algn="l" rtl="0" eaLnBrk="1" fontAlgn="base" hangingPunct="1">
+              <a:spcBef>
+                <a:spcPct val="20000"/>
+              </a:spcBef>
+              <a:spcAft>
+                <a:spcPct val="0"/>
+              </a:spcAft>
+              <a:buChar char="»"/>
+              <a:defRPr sz="2000">
+                <a:solidFill>
+                  <a:schemeClr val="tx1"/>
+                </a:solidFill>
+                <a:latin typeface="+mn-lt"/>
+              </a:defRPr>
+            </a:lvl5pPr>
+            <a:lvl6pPr marL="2574925" indent="-228600" algn="l" rtl="0" eaLnBrk="1" fontAlgn="base" hangingPunct="1">
+              <a:spcBef>
+                <a:spcPct val="20000"/>
+              </a:spcBef>
+              <a:spcAft>
+                <a:spcPct val="0"/>
+              </a:spcAft>
+              <a:buChar char="»"/>
+              <a:defRPr sz="2000">
+                <a:solidFill>
+                  <a:schemeClr val="bg1"/>
+                </a:solidFill>
+                <a:latin typeface="+mn-lt"/>
+              </a:defRPr>
+            </a:lvl6pPr>
+            <a:lvl7pPr marL="3032125" indent="-228600" algn="l" rtl="0" eaLnBrk="1" fontAlgn="base" hangingPunct="1">
+              <a:spcBef>
+                <a:spcPct val="20000"/>
+              </a:spcBef>
+              <a:spcAft>
+                <a:spcPct val="0"/>
+              </a:spcAft>
+              <a:buChar char="»"/>
+              <a:defRPr sz="2000">
+                <a:solidFill>
+                  <a:schemeClr val="bg1"/>
+                </a:solidFill>
+                <a:latin typeface="+mn-lt"/>
+              </a:defRPr>
+            </a:lvl7pPr>
+            <a:lvl8pPr marL="3489325" indent="-228600" algn="l" rtl="0" eaLnBrk="1" fontAlgn="base" hangingPunct="1">
+              <a:spcBef>
+                <a:spcPct val="20000"/>
+              </a:spcBef>
+              <a:spcAft>
+                <a:spcPct val="0"/>
+              </a:spcAft>
+              <a:buChar char="»"/>
+              <a:defRPr sz="2000">
+                <a:solidFill>
+                  <a:schemeClr val="bg1"/>
+                </a:solidFill>
+                <a:latin typeface="+mn-lt"/>
+              </a:defRPr>
+            </a:lvl8pPr>
+            <a:lvl9pPr marL="3946525" indent="-228600" algn="l" rtl="0" eaLnBrk="1" fontAlgn="base" hangingPunct="1">
+              <a:spcBef>
+                <a:spcPct val="20000"/>
+              </a:spcBef>
+              <a:spcAft>
+                <a:spcPct val="0"/>
+              </a:spcAft>
+              <a:buChar char="»"/>
+              <a:defRPr sz="2000">
+                <a:solidFill>
+                  <a:schemeClr val="bg1"/>
+                </a:solidFill>
+                <a:latin typeface="+mn-lt"/>
+              </a:defRPr>
+            </a:lvl9pPr>
+          </a:lstStyle>
+          <a:p>
+            <a:endParaRPr lang="en-US" altLang="zh-CN" dirty="0" smtClean="0"/>
+          </a:p>
+          <a:p>
+            <a:pPr marL="0" indent="0">
+              <a:buNone/>
+            </a:pPr>
+            <a:r>
+              <a:rPr lang="en-US" altLang="zh-CN" dirty="0" smtClean="0"/>
+              <a:t>                 </a:t>
+            </a:r>
+          </a:p>
+          <a:p>
+            <a:r>
+              <a:rPr lang="en-US" altLang="zh-CN" dirty="0"/>
+              <a:t> </a:t>
+            </a:r>
+            <a:r>
+              <a:rPr lang="en-US" altLang="zh-CN" dirty="0" smtClean="0"/>
+              <a:t>                </a:t>
+            </a:r>
+            <a:r>
+              <a:rPr lang="en-US" altLang="zh-CN" dirty="0" err="1" smtClean="0"/>
+              <a:t>int</a:t>
+            </a:r>
+            <a:r>
+              <a:rPr lang="en-US" altLang="zh-CN" dirty="0" smtClean="0"/>
+              <a:t> </a:t>
+            </a:r>
+            <a:r>
+              <a:rPr lang="en-US" altLang="zh-CN" dirty="0"/>
+              <a:t>n = 10000000</a:t>
+            </a:r>
+            <a:r>
+              <a:rPr lang="en-US" altLang="zh-CN" b="1" dirty="0">
+                <a:solidFill>
+                  <a:srgbClr val="FFFF00"/>
+                </a:solidFill>
+              </a:rPr>
+              <a:t>0</a:t>
+            </a:r>
+            <a:r>
+              <a:rPr lang="en-US" altLang="zh-CN" dirty="0"/>
+              <a:t>;</a:t>
+            </a:r>
+          </a:p>
+          <a:p>
+            <a:endParaRPr lang="en-US" altLang="zh-CN" dirty="0">
+              <a:latin typeface="Arial" panose="020B0604020202020204" pitchFamily="34" charset="0"/>
+              <a:cs typeface="Arial" panose="020B0604020202020204" pitchFamily="34" charset="0"/>
+            </a:endParaRPr>
+          </a:p>
+        </p:txBody>
+      </p:sp>
+      <p:pic>
+        <p:nvPicPr>
+          <p:cNvPr id="3075" name="Picture 3"/>
+          <p:cNvPicPr>
+            <a:picLocks noChangeAspect="1" noChangeArrowheads="1"/>
+          </p:cNvPicPr>
+          <p:nvPr/>
+        </p:nvPicPr>
+        <p:blipFill>
+          <a:blip r:embed="rId4">
+            <a:extLst>
+              <a:ext uri="{28A0092B-C50C-407E-A947-70E740481C1C}">
+                <a14:useLocalDpi xmlns:a14="http://schemas.microsoft.com/office/drawing/2010/main" val="0"/>
+              </a:ext>
+            </a:extLst>
+          </a:blip>
+          <a:srcRect/>
+          <a:stretch>
+            <a:fillRect/>
+          </a:stretch>
+        </p:blipFill>
+        <p:spPr bwMode="auto">
+          <a:xfrm>
+            <a:off x="994610" y="1915029"/>
+            <a:ext cx="3657600" cy="428625"/>
+          </a:xfrm>
+          <a:prstGeom prst="rect">
+            <a:avLst/>
+          </a:prstGeom>
+          <a:noFill/>
+          <a:ln>
+            <a:noFill/>
+          </a:ln>
+          <a:effectLst/>
+          <a:extLst>
+            <a:ext uri="{909E8E84-426E-40DD-AFC4-6F175D3DCCD1}">
+              <a14:hiddenFill xmlns:a14="http://schemas.microsoft.com/office/drawing/2010/main">
+                <a:solidFill>
+                  <a:schemeClr val="accent1"/>
+                </a:solidFill>
+              </a14:hiddenFill>
+            </a:ext>
+            <a:ext uri="{91240B29-F687-4F45-9708-019B960494DF}">
+              <a14:hiddenLine xmlns:a14="http://schemas.microsoft.com/office/drawing/2010/main" w="9525">
+                <a:solidFill>
+                  <a:schemeClr val="tx1"/>
+                </a:solidFill>
+                <a:miter lim="800000"/>
+                <a:headEnd/>
+                <a:tailEnd/>
+              </a14:hiddenLine>
+            </a:ext>
+            <a:ext uri="{AF507438-7753-43E0-B8FC-AC1667EBCBE1}">
+              <a14:hiddenEffects xmlns:a14="http://schemas.microsoft.com/office/drawing/2010/main">
+                <a:effectLst>
+                  <a:outerShdw dist="35921" dir="2700000" algn="ctr" rotWithShape="0">
+                    <a:schemeClr val="bg2"/>
+                  </a:outerShdw>
+                </a:effectLst>
+              </a14:hiddenEffects>
+            </a:ext>
+          </a:extLst>
+        </p:spPr>
+      </p:pic>
+      <p:pic>
+        <p:nvPicPr>
+          <p:cNvPr id="3076" name="Picture 4"/>
+          <p:cNvPicPr>
+            <a:picLocks noChangeAspect="1" noChangeArrowheads="1"/>
+          </p:cNvPicPr>
+          <p:nvPr/>
+        </p:nvPicPr>
+        <p:blipFill>
+          <a:blip r:embed="rId5">
+            <a:extLst>
+              <a:ext uri="{28A0092B-C50C-407E-A947-70E740481C1C}">
+                <a14:useLocalDpi xmlns:a14="http://schemas.microsoft.com/office/drawing/2010/main" val="0"/>
+              </a:ext>
+            </a:extLst>
+          </a:blip>
+          <a:srcRect/>
+          <a:stretch>
+            <a:fillRect/>
+          </a:stretch>
+        </p:blipFill>
+        <p:spPr bwMode="auto">
+          <a:xfrm>
+            <a:off x="2159018" y="2735174"/>
+            <a:ext cx="8496300" cy="3429000"/>
+          </a:xfrm>
+          <a:prstGeom prst="rect">
+            <a:avLst/>
+          </a:prstGeom>
+          <a:noFill/>
+          <a:ln>
+            <a:noFill/>
+          </a:ln>
+          <a:effectLst/>
+          <a:extLst>
+            <a:ext uri="{909E8E84-426E-40DD-AFC4-6F175D3DCCD1}">
+              <a14:hiddenFill xmlns:a14="http://schemas.microsoft.com/office/drawing/2010/main">
+                <a:solidFill>
+                  <a:schemeClr val="accent1"/>
+                </a:solidFill>
+              </a14:hiddenFill>
+            </a:ext>
+            <a:ext uri="{91240B29-F687-4F45-9708-019B960494DF}">
+              <a14:hiddenLine xmlns:a14="http://schemas.microsoft.com/office/drawing/2010/main" w="9525">
+                <a:solidFill>
+                  <a:schemeClr val="tx1"/>
+                </a:solidFill>
+                <a:miter lim="800000"/>
+                <a:headEnd/>
+                <a:tailEnd/>
+              </a14:hiddenLine>
+            </a:ext>
+            <a:ext uri="{AF507438-7753-43E0-B8FC-AC1667EBCBE1}">
+              <a14:hiddenEffects xmlns:a14="http://schemas.microsoft.com/office/drawing/2010/main">
+                <a:effectLst>
+                  <a:outerShdw dist="35921" dir="2700000" algn="ctr" rotWithShape="0">
+                    <a:schemeClr val="bg2"/>
+                  </a:outerShdw>
+                </a:effectLst>
+              </a14:hiddenEffects>
+            </a:ext>
+          </a:extLst>
+        </p:spPr>
+      </p:pic>
+    </p:spTree>
+    <p:extLst>
+      <p:ext uri="{BB962C8B-B14F-4D97-AF65-F5344CB8AC3E}">
+        <p14:creationId xmlns:p14="http://schemas.microsoft.com/office/powerpoint/2010/main" val="613409829"/>
+      </p:ext>
+    </p:extLst>
+  </p:cSld>
+  <p:clrMapOvr>
+    <a:masterClrMapping/>
+  </p:clrMapOvr>
+  <mc:AlternateContent xmlns:mc="http://schemas.openxmlformats.org/markup-compatibility/2006" xmlns:p14="http://schemas.microsoft.com/office/powerpoint/2010/main">
+    <mc:Choice Requires="p14">
+      <p:transition spd="med" p14:dur="700">
+        <p:fade/>
+      </p:transition>
+    </mc:Choice>
+    <mc:Fallback xmlns="">
+      <p:transition spd="med">
+        <p:fade/>
+      </p:transition>
+    </mc:Fallback>
+  </mc:AlternateContent>
+  <p:timing>
+    <p:tnLst>
+      <p:par>
+        <p:cTn id="1" dur="indefinite" restart="never" nodeType="tmRoot"/>
+      </p:par>
+    </p:tnLst>
+  </p:timing>
+</p:sld>
+</file>
+
+<file path=ppt/slides/slide16.xml><?xml version="1.0" encoding="utf-8"?>
+<p:sld xmlns:a="http://schemas.openxmlformats.org/drawingml/2006/main" xmlns:r="http://schemas.openxmlformats.org/officeDocument/2006/relationships" xmlns:p="http://schemas.openxmlformats.org/presentationml/2006/main">
+  <p:cSld>
+    <p:spTree>
+      <p:nvGrpSpPr>
+        <p:cNvPr id="1" name=""/>
+        <p:cNvGrpSpPr/>
+        <p:nvPr/>
+      </p:nvGrpSpPr>
+      <p:grpSpPr>
+        <a:xfrm>
+          <a:off x="0" y="0"/>
+          <a:ext cx="0" cy="0"/>
+          <a:chOff x="0" y="0"/>
+          <a:chExt cx="0" cy="0"/>
+        </a:xfrm>
+      </p:grpSpPr>
+      <p:sp>
+        <p:nvSpPr>
+          <p:cNvPr id="12" name="标题 1"/>
+          <p:cNvSpPr>
+            <a:spLocks noGrp="1"/>
+          </p:cNvSpPr>
+          <p:nvPr>
+            <p:ph type="title"/>
+          </p:nvPr>
+        </p:nvSpPr>
+        <p:spPr>
+          <a:xfrm>
+            <a:off x="884238" y="247650"/>
+            <a:ext cx="9204325" cy="978729"/>
+          </a:xfrm>
+        </p:spPr>
+        <p:txBody>
+          <a:bodyPr/>
+          <a:lstStyle/>
+          <a:p>
+            <a:r>
+              <a:rPr lang="zh-CN" altLang="zh-CN" dirty="0"/>
+              <a:t>技巧</a:t>
+            </a:r>
+            <a:r>
+              <a:rPr lang="en-US" altLang="zh-CN" dirty="0"/>
+              <a:t>Tips</a:t>
+            </a:r>
+            <a:br>
+              <a:rPr lang="en-US" altLang="zh-CN" dirty="0"/>
+            </a:br>
+            <a:r>
+              <a:rPr lang="zh-CN" altLang="en-US" sz="2800" dirty="0" smtClean="0"/>
+              <a:t>测时对比</a:t>
+            </a:r>
+            <a:endParaRPr lang="zh-CN" altLang="en-US" sz="2800" dirty="0"/>
+          </a:p>
+        </p:txBody>
+      </p:sp>
+      <p:pic>
+        <p:nvPicPr>
+          <p:cNvPr id="1026" name="Picture 2"/>
+          <p:cNvPicPr>
+            <a:picLocks noChangeAspect="1" noChangeArrowheads="1"/>
+          </p:cNvPicPr>
+          <p:nvPr/>
+        </p:nvPicPr>
+        <p:blipFill>
+          <a:blip r:embed="rId3">
+            <a:extLst>
+              <a:ext uri="{28A0092B-C50C-407E-A947-70E740481C1C}">
+                <a14:useLocalDpi xmlns:a14="http://schemas.microsoft.com/office/drawing/2010/main" val="0"/>
+              </a:ext>
+            </a:extLst>
+          </a:blip>
+          <a:srcRect/>
+          <a:stretch>
+            <a:fillRect/>
+          </a:stretch>
+        </p:blipFill>
+        <p:spPr bwMode="auto">
+          <a:xfrm>
+            <a:off x="2085975" y="1185863"/>
+            <a:ext cx="6800850" cy="3800475"/>
+          </a:xfrm>
+          <a:prstGeom prst="rect">
+            <a:avLst/>
+          </a:prstGeom>
+          <a:noFill/>
+          <a:ln>
+            <a:noFill/>
+          </a:ln>
+          <a:effectLst/>
+          <a:extLst>
+            <a:ext uri="{909E8E84-426E-40DD-AFC4-6F175D3DCCD1}">
+              <a14:hiddenFill xmlns:a14="http://schemas.microsoft.com/office/drawing/2010/main">
+                <a:solidFill>
+                  <a:schemeClr val="accent1"/>
+                </a:solidFill>
+              </a14:hiddenFill>
+            </a:ext>
+            <a:ext uri="{91240B29-F687-4F45-9708-019B960494DF}">
+              <a14:hiddenLine xmlns:a14="http://schemas.microsoft.com/office/drawing/2010/main" w="9525">
+                <a:solidFill>
+                  <a:schemeClr val="tx1"/>
+                </a:solidFill>
+                <a:miter lim="800000"/>
+                <a:headEnd/>
+                <a:tailEnd/>
+              </a14:hiddenLine>
+            </a:ext>
+            <a:ext uri="{AF507438-7753-43E0-B8FC-AC1667EBCBE1}">
+              <a14:hiddenEffects xmlns:a14="http://schemas.microsoft.com/office/drawing/2010/main">
+                <a:effectLst>
+                  <a:outerShdw dist="35921" dir="2700000" algn="ctr" rotWithShape="0">
+                    <a:schemeClr val="bg2"/>
+                  </a:outerShdw>
+                </a:effectLst>
+              </a14:hiddenEffects>
+            </a:ext>
+          </a:extLst>
+        </p:spPr>
+      </p:pic>
+      <p:pic>
+        <p:nvPicPr>
+          <p:cNvPr id="1028" name="Picture 4"/>
+          <p:cNvPicPr>
+            <a:picLocks noChangeAspect="1" noChangeArrowheads="1"/>
+          </p:cNvPicPr>
+          <p:nvPr/>
+        </p:nvPicPr>
+        <p:blipFill>
+          <a:blip r:embed="rId4">
+            <a:extLst>
+              <a:ext uri="{28A0092B-C50C-407E-A947-70E740481C1C}">
+                <a14:useLocalDpi xmlns:a14="http://schemas.microsoft.com/office/drawing/2010/main" val="0"/>
+              </a:ext>
+            </a:extLst>
+          </a:blip>
+          <a:srcRect/>
+          <a:stretch>
+            <a:fillRect/>
+          </a:stretch>
+        </p:blipFill>
+        <p:spPr bwMode="auto">
+          <a:xfrm>
+            <a:off x="8886825" y="2152650"/>
+            <a:ext cx="1800225" cy="1866900"/>
+          </a:xfrm>
+          <a:prstGeom prst="rect">
+            <a:avLst/>
+          </a:prstGeom>
+          <a:noFill/>
+          <a:ln>
+            <a:noFill/>
+          </a:ln>
+          <a:effectLst/>
+          <a:extLst>
+            <a:ext uri="{909E8E84-426E-40DD-AFC4-6F175D3DCCD1}">
+              <a14:hiddenFill xmlns:a14="http://schemas.microsoft.com/office/drawing/2010/main">
+                <a:solidFill>
+                  <a:schemeClr val="accent1"/>
+                </a:solidFill>
+              </a14:hiddenFill>
+            </a:ext>
+            <a:ext uri="{91240B29-F687-4F45-9708-019B960494DF}">
+              <a14:hiddenLine xmlns:a14="http://schemas.microsoft.com/office/drawing/2010/main" w="9525">
+                <a:solidFill>
+                  <a:schemeClr val="tx1"/>
+                </a:solidFill>
+                <a:miter lim="800000"/>
+                <a:headEnd/>
+                <a:tailEnd/>
+              </a14:hiddenLine>
+            </a:ext>
+            <a:ext uri="{AF507438-7753-43E0-B8FC-AC1667EBCBE1}">
+              <a14:hiddenEffects xmlns:a14="http://schemas.microsoft.com/office/drawing/2010/main">
+                <a:effectLst>
+                  <a:outerShdw dist="35921" dir="2700000" algn="ctr" rotWithShape="0">
+                    <a:schemeClr val="bg2"/>
+                  </a:outerShdw>
+                </a:effectLst>
+              </a14:hiddenEffects>
+            </a:ext>
+          </a:extLst>
+        </p:spPr>
+      </p:pic>
+    </p:spTree>
+    <p:extLst>
+      <p:ext uri="{BB962C8B-B14F-4D97-AF65-F5344CB8AC3E}">
+        <p14:creationId xmlns:p14="http://schemas.microsoft.com/office/powerpoint/2010/main" val="3721861799"/>
+      </p:ext>
+    </p:extLst>
+  </p:cSld>
+  <p:clrMapOvr>
+    <a:masterClrMapping/>
+  </p:clrMapOvr>
+  <mc:AlternateContent xmlns:mc="http://schemas.openxmlformats.org/markup-compatibility/2006" xmlns:p14="http://schemas.microsoft.com/office/powerpoint/2010/main">
+    <mc:Choice Requires="p14">
+      <p:transition spd="med" p14:dur="700">
+        <p:fade/>
+      </p:transition>
+    </mc:Choice>
+    <mc:Fallback xmlns="">
+      <p:transition spd="med">
+        <p:fade/>
+      </p:transition>
+    </mc:Fallback>
+  </mc:AlternateContent>
+  <p:timing>
+    <p:tnLst>
+      <p:par>
+        <p:cTn id="1" dur="indefinite" restart="never" nodeType="tmRoot"/>
+      </p:par>
+    </p:tnLst>
+  </p:timing>
+</p:sld>
+</file>
+
+<file path=ppt/slides/slide17.xml><?xml version="1.0" encoding="utf-8"?>
+<p:sld xmlns:a="http://schemas.openxmlformats.org/drawingml/2006/main" xmlns:r="http://schemas.openxmlformats.org/officeDocument/2006/relationships" xmlns:p="http://schemas.openxmlformats.org/presentationml/2006/main">
+  <p:cSld>
+    <p:spTree>
+      <p:nvGrpSpPr>
+        <p:cNvPr id="1" name=""/>
+        <p:cNvGrpSpPr/>
+        <p:nvPr/>
+      </p:nvGrpSpPr>
+      <p:grpSpPr>
+        <a:xfrm>
+          <a:off x="0" y="0"/>
+          <a:ext cx="0" cy="0"/>
+          <a:chOff x="0" y="0"/>
+          <a:chExt cx="0" cy="0"/>
+        </a:xfrm>
+      </p:grpSpPr>
+      <p:sp>
+        <p:nvSpPr>
           <p:cNvPr id="2" name="Title 1"/>
           <p:cNvSpPr>
             <a:spLocks noGrp="1"/>
@@ -3987,7 +6746,23 @@
             </a:r>
             <a:r>
               <a:rPr lang="zh-CN" altLang="zh-CN" sz="2400" dirty="0"/>
-              <a:t>的基础上求最短距离（</a:t>
+              <a:t>的基础上</a:t>
+            </a:r>
+            <a:r>
+              <a:rPr lang="zh-CN" altLang="zh-CN" sz="2400" dirty="0" smtClean="0"/>
+              <a:t>求</a:t>
+            </a:r>
+            <a:r>
+              <a:rPr lang="zh-CN" altLang="en-US" sz="2400" dirty="0" smtClean="0"/>
+              <a:t>平均</a:t>
+            </a:r>
+            <a:r>
+              <a:rPr lang="zh-CN" altLang="zh-CN" sz="2400" dirty="0" smtClean="0"/>
+              <a:t>距离</a:t>
+            </a:r>
+            <a:r>
+              <a:rPr lang="zh-CN" altLang="zh-CN" sz="2400" dirty="0"/>
+              <a:t>（</a:t>
             </a:r>
             <a:r>
               <a:rPr lang="en-US" altLang="zh-CN" sz="2400" dirty="0"/>
@@ -4014,7 +6789,7 @@
             <a:pPr lvl="1"/>
             <a:r>
               <a:rPr lang="en-US" altLang="zh-CN" sz="2400" dirty="0"/>
-              <a:t>min</a:t>
+              <a:t>sum</a:t>
             </a:r>
             <a:r>
               <a:rPr lang="en-US" altLang="zh-CN" sz="2400" dirty="0" smtClean="0"/>
@@ -4032,6 +6807,11 @@
               <a:rPr lang="en-US" altLang="zh-CN" sz="2400" dirty="0" smtClean="0"/>
               <a:t>] ) </a:t>
             </a:r>
+            <a:r>
+              <a:rPr lang="en-US" altLang="zh-CN" sz="2400" dirty="0" smtClean="0"/>
+              <a:t>/ n</a:t>
+            </a:r>
+            <a:endParaRPr lang="en-US" altLang="zh-CN" sz="2400" dirty="0" smtClean="0"/>
           </a:p>
           <a:p>
             <a:endParaRPr lang="en-US" altLang="zh-CN" dirty="0" smtClean="0"/>
@@ -6038,11 +8818,7 @@
             </a:r>
             <a:r>
               <a:rPr lang="zh-CN" altLang="zh-CN" sz="3200" dirty="0"/>
-              <a:t>索引变量</a:t>
-            </a:r>
-            <a:r>
-              <a:rPr lang="zh-CN" altLang="zh-CN" sz="3200" dirty="0"/>
-              <a:t>化</a:t>
+              <a:t>索引变量化</a:t>
             </a:r>
             <a:endParaRPr lang="en-US" altLang="zh-CN" sz="3200" dirty="0" smtClean="0"/>
           </a:p>
@@ -6161,6 +8937,70 @@
           <a:chExt cx="0" cy="0"/>
         </a:xfrm>
       </p:grpSpPr>
+      <p:pic>
+        <p:nvPicPr>
+          <p:cNvPr id="6" name="Picture 3"/>
+          <p:cNvPicPr>
+            <a:picLocks noChangeAspect="1" noChangeArrowheads="1"/>
+          </p:cNvPicPr>
+          <p:nvPr/>
+        </p:nvPicPr>
+        <p:blipFill>
+          <a:blip r:embed="rId3">
+            <a:extLst>
+              <a:ext uri="{28A0092B-C50C-407E-A947-70E740481C1C}">
+                <a14:useLocalDpi xmlns:a14="http://schemas.microsoft.com/office/drawing/2010/main" val="0"/>
+              </a:ext>
+            </a:extLst>
+          </a:blip>
+          <a:srcRect/>
+          <a:stretch>
+            <a:fillRect/>
+          </a:stretch>
+        </p:blipFill>
+        <p:spPr bwMode="auto">
+          <a:xfrm>
+            <a:off x="2638425" y="1092864"/>
+            <a:ext cx="5478880" cy="5130724"/>
+          </a:xfrm>
+          <a:prstGeom prst="rect">
+            <a:avLst/>
+          </a:prstGeom>
+          <a:noFill/>
+          <a:ln>
+            <a:noFill/>
+          </a:ln>
+          <a:effectLst/>
+          <a:extLst>
+            <a:ext uri="{909E8E84-426E-40DD-AFC4-6F175D3DCCD1}">
+              <a14:hiddenFill xmlns:a14="http://schemas.microsoft.com/office/drawing/2010/main">
+                <a:solidFill>
+                  <a:schemeClr val="accent1"/>
+                </a:solidFill>
+              </a14:hiddenFill>
+            </a:ext>
+            <a:ext uri="{91240B29-F687-4F45-9708-019B960494DF}">
+              <a14:hiddenLine xmlns:a14="http://schemas.microsoft.com/office/drawing/2010/main" w="9525">
+                <a:solidFill>
+                  <a:schemeClr val="tx1"/>
+                </a:solidFill>
+                <a:miter lim="800000"/>
+                <a:headEnd/>
+                <a:tailEnd/>
+              </a14:hiddenLine>
+            </a:ext>
+            <a:ext uri="{AF507438-7753-43E0-B8FC-AC1667EBCBE1}">
+              <a14:hiddenEffects xmlns:a14="http://schemas.microsoft.com/office/drawing/2010/main">
+                <a:effectLst>
+                  <a:outerShdw dist="35921" dir="2700000" algn="ctr" rotWithShape="0">
+                    <a:schemeClr val="bg2"/>
+                  </a:outerShdw>
+                </a:effectLst>
+              </a14:hiddenEffects>
+            </a:ext>
+          </a:extLst>
+        </p:spPr>
+      </p:pic>
       <p:sp>
         <p:nvSpPr>
           <p:cNvPr id="2" name="标题 1"/>
@@ -6233,6 +9073,127 @@
           </a:p>
         </p:txBody>
       </p:sp>
+    </p:spTree>
+    <p:extLst>
+      <p:ext uri="{BB962C8B-B14F-4D97-AF65-F5344CB8AC3E}">
+        <p14:creationId xmlns:p14="http://schemas.microsoft.com/office/powerpoint/2010/main" val="1274977374"/>
+      </p:ext>
+    </p:extLst>
+  </p:cSld>
+  <p:clrMapOvr>
+    <a:masterClrMapping/>
+  </p:clrMapOvr>
+  <mc:AlternateContent xmlns:mc="http://schemas.openxmlformats.org/markup-compatibility/2006" xmlns:p14="http://schemas.microsoft.com/office/powerpoint/2010/main">
+    <mc:Choice Requires="p14">
+      <p:transition spd="med" p14:dur="700">
+        <p:fade/>
+      </p:transition>
+    </mc:Choice>
+    <mc:Fallback xmlns="">
+      <p:transition spd="med">
+        <p:fade/>
+      </p:transition>
+    </mc:Fallback>
+  </mc:AlternateContent>
+  <p:timing>
+    <p:tnLst>
+      <p:par>
+        <p:cTn id="1" dur="indefinite" restart="never" nodeType="tmRoot"/>
+      </p:par>
+    </p:tnLst>
+  </p:timing>
+</p:sld>
+</file>
+
+<file path=ppt/slides/slide8.xml><?xml version="1.0" encoding="utf-8"?>
+<p:sld xmlns:a="http://schemas.openxmlformats.org/drawingml/2006/main" xmlns:r="http://schemas.openxmlformats.org/officeDocument/2006/relationships" xmlns:p="http://schemas.openxmlformats.org/presentationml/2006/main">
+  <p:cSld>
+    <p:spTree>
+      <p:nvGrpSpPr>
+        <p:cNvPr id="1" name=""/>
+        <p:cNvGrpSpPr/>
+        <p:nvPr/>
+      </p:nvGrpSpPr>
+      <p:grpSpPr>
+        <a:xfrm>
+          <a:off x="0" y="0"/>
+          <a:ext cx="0" cy="0"/>
+          <a:chOff x="0" y="0"/>
+          <a:chExt cx="0" cy="0"/>
+        </a:xfrm>
+      </p:grpSpPr>
+      <p:sp>
+        <p:nvSpPr>
+          <p:cNvPr id="2" name="标题 1"/>
+          <p:cNvSpPr>
+            <a:spLocks noGrp="1"/>
+          </p:cNvSpPr>
+          <p:nvPr>
+            <p:ph type="title"/>
+          </p:nvPr>
+        </p:nvSpPr>
+        <p:spPr>
+          <a:xfrm>
+            <a:off x="884238" y="247650"/>
+            <a:ext cx="9204325" cy="978729"/>
+          </a:xfrm>
+        </p:spPr>
+        <p:txBody>
+          <a:bodyPr/>
+          <a:lstStyle/>
+          <a:p>
+            <a:r>
+              <a:rPr lang="en-US" altLang="zh-CN" dirty="0"/>
+              <a:t>C</a:t>
+            </a:r>
+            <a:r>
+              <a:rPr lang="zh-CN" altLang="en-US" dirty="0"/>
+              <a:t>移植</a:t>
+            </a:r>
+            <a:r>
+              <a:rPr lang="en-US" altLang="zh-CN" dirty="0"/>
+              <a:t>CUDA</a:t>
+            </a:r>
+            <a:br>
+              <a:rPr lang="en-US" altLang="zh-CN" dirty="0"/>
+            </a:br>
+            <a:r>
+              <a:rPr lang="zh-CN" altLang="en-US" sz="2800" dirty="0"/>
+              <a:t>新模型</a:t>
+            </a:r>
+          </a:p>
+        </p:txBody>
+      </p:sp>
+      <p:sp>
+        <p:nvSpPr>
+          <p:cNvPr id="3" name="内容占位符 2"/>
+          <p:cNvSpPr>
+            <a:spLocks noGrp="1"/>
+          </p:cNvSpPr>
+          <p:nvPr>
+            <p:ph idx="1"/>
+          </p:nvPr>
+        </p:nvSpPr>
+        <p:spPr>
+          <a:xfrm>
+            <a:off x="882780" y="1439863"/>
+            <a:ext cx="4816476" cy="4252912"/>
+          </a:xfrm>
+        </p:spPr>
+        <p:txBody>
+          <a:bodyPr/>
+          <a:lstStyle/>
+          <a:p>
+            <a:pPr marL="0" indent="0">
+              <a:buNone/>
+            </a:pPr>
+            <a:endParaRPr lang="en-US" altLang="zh-CN" sz="3200" dirty="0"/>
+          </a:p>
+          <a:p>
+            <a:endParaRPr lang="en-US" altLang="zh-CN" sz="3200" dirty="0" smtClean="0"/>
+          </a:p>
+        </p:txBody>
+      </p:sp>
       <p:graphicFrame>
         <p:nvGraphicFramePr>
           <p:cNvPr id="5" name="表格 4"/>
@@ -6242,7 +9203,7 @@
           <p:nvPr>
             <p:extLst>
               <p:ext uri="{D42A27DB-BD31-4B8C-83A1-F6EECF244321}">
-                <p14:modId xmlns:p14="http://schemas.microsoft.com/office/powerpoint/2010/main" val="3658980245"/>
+                <p14:modId xmlns:p14="http://schemas.microsoft.com/office/powerpoint/2010/main" val="1965164715"/>
               </p:ext>
             </p:extLst>
           </p:nvPr>
@@ -6773,120 +9734,7 @@
     </p:spTree>
     <p:extLst>
       <p:ext uri="{BB962C8B-B14F-4D97-AF65-F5344CB8AC3E}">
-        <p14:creationId xmlns:p14="http://schemas.microsoft.com/office/powerpoint/2010/main" val="1274977374"/>
-      </p:ext>
-    </p:extLst>
-  </p:cSld>
-  <p:clrMapOvr>
-    <a:masterClrMapping/>
-  </p:clrMapOvr>
-  <mc:AlternateContent xmlns:mc="http://schemas.openxmlformats.org/markup-compatibility/2006" xmlns:p14="http://schemas.microsoft.com/office/powerpoint/2010/main">
-    <mc:Choice Requires="p14">
-      <p:transition spd="med" p14:dur="700">
-        <p:fade/>
-      </p:transition>
-    </mc:Choice>
-    <mc:Fallback xmlns="">
-      <p:transition spd="med">
-        <p:fade/>
-      </p:transition>
-    </mc:Fallback>
-  </mc:AlternateContent>
-  <p:timing>
-    <p:tnLst>
-      <p:par>
-        <p:cTn id="1" dur="indefinite" restart="never" nodeType="tmRoot"/>
-      </p:par>
-    </p:tnLst>
-  </p:timing>
-</p:sld>
-</file>
-
-<file path=ppt/slides/slide8.xml><?xml version="1.0" encoding="utf-8"?>
-<p:sld xmlns:a="http://schemas.openxmlformats.org/drawingml/2006/main" xmlns:r="http://schemas.openxmlformats.org/officeDocument/2006/relationships" xmlns:p="http://schemas.openxmlformats.org/presentationml/2006/main">
-  <p:cSld>
-    <p:spTree>
-      <p:nvGrpSpPr>
-        <p:cNvPr id="1" name=""/>
-        <p:cNvGrpSpPr/>
-        <p:nvPr/>
-      </p:nvGrpSpPr>
-      <p:grpSpPr>
-        <a:xfrm>
-          <a:off x="0" y="0"/>
-          <a:ext cx="0" cy="0"/>
-          <a:chOff x="0" y="0"/>
-          <a:chExt cx="0" cy="0"/>
-        </a:xfrm>
-      </p:grpSpPr>
-      <p:pic>
-        <p:nvPicPr>
-          <p:cNvPr id="1027" name="Picture 3"/>
-          <p:cNvPicPr>
-            <a:picLocks noChangeAspect="1" noChangeArrowheads="1"/>
-          </p:cNvPicPr>
-          <p:nvPr/>
-        </p:nvPicPr>
-        <p:blipFill>
-          <a:blip r:embed="rId2">
-            <a:extLst>
-              <a:ext uri="{28A0092B-C50C-407E-A947-70E740481C1C}">
-                <a14:useLocalDpi xmlns:a14="http://schemas.microsoft.com/office/drawing/2010/main" val="0"/>
-              </a:ext>
-            </a:extLst>
-          </a:blip>
-          <a:srcRect/>
-          <a:stretch>
-            <a:fillRect/>
-          </a:stretch>
-        </p:blipFill>
-        <p:spPr bwMode="auto">
-          <a:xfrm>
-            <a:off x="2638425" y="419100"/>
-            <a:ext cx="5695950" cy="5334000"/>
-          </a:xfrm>
-          <a:prstGeom prst="rect">
-            <a:avLst/>
-          </a:prstGeom>
-          <a:noFill/>
-          <a:ln>
-            <a:noFill/>
-          </a:ln>
-          <a:effectLst/>
-          <a:extLst>
-            <a:ext uri="{909E8E84-426E-40DD-AFC4-6F175D3DCCD1}">
-              <a14:hiddenFill xmlns:a14="http://schemas.microsoft.com/office/drawing/2010/main">
-                <a:solidFill>
-                  <a:schemeClr val="accent1"/>
-                </a:solidFill>
-              </a14:hiddenFill>
-            </a:ext>
-            <a:ext uri="{91240B29-F687-4F45-9708-019B960494DF}">
-              <a14:hiddenLine xmlns:a14="http://schemas.microsoft.com/office/drawing/2010/main" w="9525">
-                <a:solidFill>
-                  <a:schemeClr val="tx1"/>
-                </a:solidFill>
-                <a:miter lim="800000"/>
-                <a:headEnd/>
-                <a:tailEnd/>
-              </a14:hiddenLine>
-            </a:ext>
-            <a:ext uri="{AF507438-7753-43E0-B8FC-AC1667EBCBE1}">
-              <a14:hiddenEffects xmlns:a14="http://schemas.microsoft.com/office/drawing/2010/main">
-                <a:effectLst>
-                  <a:outerShdw dist="35921" dir="2700000" algn="ctr" rotWithShape="0">
-                    <a:schemeClr val="bg2"/>
-                  </a:outerShdw>
-                </a:effectLst>
-              </a14:hiddenEffects>
-            </a:ext>
-          </a:extLst>
-        </p:spPr>
-      </p:pic>
-    </p:spTree>
-    <p:extLst>
-      <p:ext uri="{BB962C8B-B14F-4D97-AF65-F5344CB8AC3E}">
-        <p14:creationId xmlns:p14="http://schemas.microsoft.com/office/powerpoint/2010/main" val="506965390"/>
+        <p14:creationId xmlns:p14="http://schemas.microsoft.com/office/powerpoint/2010/main" val="2526555178"/>
       </p:ext>
     </p:extLst>
   </p:cSld>

</xml_diff>

<commit_message>
update ppt, first reduction then matrix multiply
</commit_message>
<xml_diff>
--- a/doc/cuda_training_day1_pm(20141219Liu).pptx
+++ b/doc/cuda_training_day1_pm(20141219Liu).pptx
@@ -5,10 +5,10 @@
     <p:sldMasterId id="2147483784" r:id="rId4"/>
   </p:sldMasterIdLst>
   <p:notesMasterIdLst>
-    <p:notesMasterId r:id="rId22"/>
+    <p:notesMasterId r:id="rId21"/>
   </p:notesMasterIdLst>
   <p:handoutMasterIdLst>
-    <p:handoutMasterId r:id="rId23"/>
+    <p:handoutMasterId r:id="rId22"/>
   </p:handoutMasterIdLst>
   <p:sldIdLst>
     <p:sldId id="1017" r:id="rId5"/>
@@ -27,7 +27,6 @@
     <p:sldId id="1043" r:id="rId18"/>
     <p:sldId id="1042" r:id="rId19"/>
     <p:sldId id="1044" r:id="rId20"/>
-    <p:sldId id="1037" r:id="rId21"/>
   </p:sldIdLst>
   <p:sldSz cx="10972800" cy="6172200"/>
   <p:notesSz cx="7010400" cy="9296400"/>
@@ -305,7 +304,7 @@
               <a:pPr>
                 <a:defRPr/>
               </a:pPr>
-              <a:t>12/17/2014</a:t>
+              <a:t>12/20/2014</a:t>
             </a:fld>
             <a:endParaRPr lang="en-US" dirty="0"/>
           </a:p>
@@ -1119,6 +1118,29 @@
           <a:bodyPr/>
           <a:lstStyle/>
           <a:p>
+            <a:r>
+              <a:rPr lang="en-US" altLang="zh-CN" smtClean="0"/>
+              <a:t>C:\ProgramData\NVIDIA </a:t>
+            </a:r>
+            <a:r>
+              <a:rPr lang="en-US" altLang="zh-CN" dirty="0" smtClean="0"/>
+              <a:t>Corporation\CUDA Samples\v6.0\common\inc</a:t>
+            </a:r>
+          </a:p>
+          <a:p>
+            <a:endParaRPr lang="en-US" altLang="zh-CN" dirty="0" smtClean="0"/>
+          </a:p>
+          <a:p>
+            <a:r>
+              <a:rPr lang="en-US" altLang="zh-CN" dirty="0" smtClean="0"/>
+              <a:t>helper_timer.h</a:t>
+            </a:r>
+          </a:p>
+          <a:p>
+            <a:r>
+              <a:rPr lang="en-US" altLang="zh-CN" dirty="0" smtClean="0"/>
+              <a:t>//#include &lt;exception.h&gt;</a:t>
+            </a:r>
             <a:endParaRPr lang="zh-CN" altLang="en-US" dirty="0"/>
           </a:p>
         </p:txBody>
@@ -1156,169 +1178,6 @@
     <p:extLst>
       <p:ext uri="{BB962C8B-B14F-4D97-AF65-F5344CB8AC3E}">
         <p14:creationId xmlns:p14="http://schemas.microsoft.com/office/powerpoint/2010/main" val="3436033865"/>
-      </p:ext>
-    </p:extLst>
-  </p:cSld>
-  <p:clrMapOvr>
-    <a:masterClrMapping/>
-  </p:clrMapOvr>
-</p:notes>
-</file>
-
-<file path=ppt/notesSlides/notesSlide14.xml><?xml version="1.0" encoding="utf-8"?>
-<p:notes xmlns:a="http://schemas.openxmlformats.org/drawingml/2006/main" xmlns:r="http://schemas.openxmlformats.org/officeDocument/2006/relationships" xmlns:p="http://schemas.openxmlformats.org/presentationml/2006/main">
-  <p:cSld>
-    <p:spTree>
-      <p:nvGrpSpPr>
-        <p:cNvPr id="1" name=""/>
-        <p:cNvGrpSpPr/>
-        <p:nvPr/>
-      </p:nvGrpSpPr>
-      <p:grpSpPr>
-        <a:xfrm>
-          <a:off x="0" y="0"/>
-          <a:ext cx="0" cy="0"/>
-          <a:chOff x="0" y="0"/>
-          <a:chExt cx="0" cy="0"/>
-        </a:xfrm>
-      </p:grpSpPr>
-      <p:sp>
-        <p:nvSpPr>
-          <p:cNvPr id="2" name="幻灯片图像占位符 1"/>
-          <p:cNvSpPr>
-            <a:spLocks noGrp="1" noRot="1" noChangeAspect="1"/>
-          </p:cNvSpPr>
-          <p:nvPr>
-            <p:ph type="sldImg"/>
-          </p:nvPr>
-        </p:nvSpPr>
-        <p:spPr/>
-      </p:sp>
-      <p:sp>
-        <p:nvSpPr>
-          <p:cNvPr id="3" name="备注占位符 2"/>
-          <p:cNvSpPr>
-            <a:spLocks noGrp="1"/>
-          </p:cNvSpPr>
-          <p:nvPr>
-            <p:ph type="body" idx="1"/>
-          </p:nvPr>
-        </p:nvSpPr>
-        <p:spPr/>
-        <p:txBody>
-          <a:bodyPr/>
-          <a:lstStyle/>
-          <a:p>
-            <a:r>
-              <a:rPr lang="zh-CN" altLang="zh-CN" dirty="0" smtClean="0"/>
-              <a:t>新例子——例</a:t>
-            </a:r>
-            <a:r>
-              <a:rPr lang="en-US" altLang="zh-CN" dirty="0" smtClean="0"/>
-              <a:t>2</a:t>
-            </a:r>
-            <a:r>
-              <a:rPr lang="zh-CN" altLang="zh-CN" dirty="0" smtClean="0"/>
-              <a:t>，矩阵相乘</a:t>
-            </a:r>
-            <a:endParaRPr lang="en-US" altLang="zh-CN" dirty="0" smtClean="0"/>
-          </a:p>
-          <a:p>
-            <a:pPr lvl="1"/>
-            <a:r>
-              <a:rPr lang="en-US" altLang="zh-CN" sz="2400" dirty="0" smtClean="0"/>
-              <a:t>C</a:t>
-            </a:r>
-            <a:r>
-              <a:rPr lang="zh-CN" altLang="zh-CN" sz="2400" dirty="0" smtClean="0"/>
-              <a:t>算法</a:t>
-            </a:r>
-            <a:endParaRPr lang="en-US" altLang="zh-CN" sz="2400" dirty="0" smtClean="0"/>
-          </a:p>
-          <a:p>
-            <a:pPr lvl="1"/>
-            <a:r>
-              <a:rPr lang="en-US" altLang="zh-CN" sz="2400" dirty="0" smtClean="0"/>
-              <a:t>CUDA</a:t>
-            </a:r>
-            <a:r>
-              <a:rPr lang="zh-CN" altLang="zh-CN" sz="2400" dirty="0" smtClean="0"/>
-              <a:t>算法</a:t>
-            </a:r>
-            <a:endParaRPr lang="en-US" altLang="zh-CN" sz="2400" dirty="0" smtClean="0"/>
-          </a:p>
-          <a:p>
-            <a:pPr lvl="1"/>
-            <a:r>
-              <a:rPr lang="en-US" altLang="zh-CN" sz="2400" dirty="0" smtClean="0"/>
-              <a:t>C</a:t>
-            </a:r>
-            <a:r>
-              <a:rPr lang="zh-CN" altLang="en-US" sz="2400" dirty="0" smtClean="0"/>
-              <a:t>优化</a:t>
-            </a:r>
-            <a:r>
-              <a:rPr lang="en-US" altLang="zh-CN" sz="2400" dirty="0" smtClean="0"/>
-              <a:t>-block</a:t>
-            </a:r>
-          </a:p>
-          <a:p>
-            <a:pPr lvl="1"/>
-            <a:endParaRPr lang="en-US" altLang="zh-CN" sz="2400" dirty="0" smtClean="0"/>
-          </a:p>
-          <a:p>
-            <a:pPr marL="342900" lvl="1"/>
-            <a:r>
-              <a:rPr lang="en-US" altLang="zh-CN" sz="2400" dirty="0" smtClean="0"/>
-              <a:t>CUDA</a:t>
-            </a:r>
-            <a:r>
-              <a:rPr lang="zh-CN" altLang="en-US" sz="2400" dirty="0" smtClean="0"/>
-              <a:t>优化 </a:t>
-            </a:r>
-            <a:r>
-              <a:rPr lang="en-US" altLang="zh-CN" sz="2400" dirty="0" smtClean="0"/>
-              <a:t>… …</a:t>
-            </a:r>
-          </a:p>
-          <a:p>
-            <a:endParaRPr lang="zh-CN" altLang="en-US" dirty="0"/>
-          </a:p>
-        </p:txBody>
-      </p:sp>
-      <p:sp>
-        <p:nvSpPr>
-          <p:cNvPr id="4" name="灯片编号占位符 3"/>
-          <p:cNvSpPr>
-            <a:spLocks noGrp="1"/>
-          </p:cNvSpPr>
-          <p:nvPr>
-            <p:ph type="sldNum" sz="quarter" idx="10"/>
-          </p:nvPr>
-        </p:nvSpPr>
-        <p:spPr/>
-        <p:txBody>
-          <a:bodyPr/>
-          <a:lstStyle/>
-          <a:p>
-            <a:pPr>
-              <a:defRPr/>
-            </a:pPr>
-            <a:fld id="{E02D639A-AF38-4D9A-897E-57859A70BDEB}" type="slidenum">
-              <a:rPr lang="en-US" smtClean="0"/>
-              <a:pPr>
-                <a:defRPr/>
-              </a:pPr>
-              <a:t>17</a:t>
-            </a:fld>
-            <a:endParaRPr lang="en-US" dirty="0"/>
-          </a:p>
-        </p:txBody>
-      </p:sp>
-    </p:spTree>
-    <p:extLst>
-      <p:ext uri="{BB962C8B-B14F-4D97-AF65-F5344CB8AC3E}">
-        <p14:creationId xmlns:p14="http://schemas.microsoft.com/office/powerpoint/2010/main" val="2943062953"/>
       </p:ext>
     </p:extLst>
   </p:cSld>
@@ -9030,1030 +8889,6 @@
         </p:cTn>
       </p:par>
     </p:tnLst>
-  </p:timing>
-</p:sld>
-</file>
-
-<file path=ppt/slides/slide17.xml><?xml version="1.0" encoding="utf-8"?>
-<p:sld xmlns:a="http://schemas.openxmlformats.org/drawingml/2006/main" xmlns:r="http://schemas.openxmlformats.org/officeDocument/2006/relationships" xmlns:p="http://schemas.openxmlformats.org/presentationml/2006/main">
-  <p:cSld>
-    <p:spTree>
-      <p:nvGrpSpPr>
-        <p:cNvPr id="1" name=""/>
-        <p:cNvGrpSpPr/>
-        <p:nvPr/>
-      </p:nvGrpSpPr>
-      <p:grpSpPr>
-        <a:xfrm>
-          <a:off x="0" y="0"/>
-          <a:ext cx="0" cy="0"/>
-          <a:chOff x="0" y="0"/>
-          <a:chExt cx="0" cy="0"/>
-        </a:xfrm>
-      </p:grpSpPr>
-      <p:sp>
-        <p:nvSpPr>
-          <p:cNvPr id="2" name="Title 1"/>
-          <p:cNvSpPr>
-            <a:spLocks noGrp="1"/>
-          </p:cNvSpPr>
-          <p:nvPr>
-            <p:ph type="title"/>
-          </p:nvPr>
-        </p:nvSpPr>
-        <p:spPr>
-          <a:xfrm>
-            <a:off x="884238" y="247650"/>
-            <a:ext cx="9204325" cy="590931"/>
-          </a:xfrm>
-        </p:spPr>
-        <p:txBody>
-          <a:bodyPr/>
-          <a:lstStyle/>
-          <a:p>
-            <a:r>
-              <a:rPr lang="zh-CN" altLang="en-US" dirty="0" smtClean="0"/>
-              <a:t>练习</a:t>
-            </a:r>
-            <a:endParaRPr lang="en-US" dirty="0"/>
-          </a:p>
-        </p:txBody>
-      </p:sp>
-      <p:sp>
-        <p:nvSpPr>
-          <p:cNvPr id="3" name="Content Placeholder 2"/>
-          <p:cNvSpPr>
-            <a:spLocks noGrp="1"/>
-          </p:cNvSpPr>
-          <p:nvPr>
-            <p:ph idx="1"/>
-          </p:nvPr>
-        </p:nvSpPr>
-        <p:spPr>
-          <a:xfrm>
-            <a:off x="884902" y="1504334"/>
-            <a:ext cx="4254657" cy="4612691"/>
-          </a:xfrm>
-        </p:spPr>
-        <p:txBody>
-          <a:bodyPr/>
-          <a:lstStyle/>
-          <a:p>
-            <a:r>
-              <a:rPr lang="zh-CN" altLang="en-US" sz="4000" dirty="0" smtClean="0"/>
-              <a:t>例</a:t>
-            </a:r>
-            <a:r>
-              <a:rPr lang="en-US" altLang="zh-CN" sz="4000" dirty="0"/>
-              <a:t>1</a:t>
-            </a:r>
-            <a:r>
-              <a:rPr lang="zh-CN" altLang="zh-CN" sz="4000" dirty="0" smtClean="0"/>
-              <a:t>延伸</a:t>
-            </a:r>
-            <a:endParaRPr lang="en-US" altLang="zh-CN" sz="4000" dirty="0" smtClean="0"/>
-          </a:p>
-          <a:p>
-            <a:pPr lvl="1"/>
-            <a:r>
-              <a:rPr lang="zh-CN" altLang="zh-CN" sz="3200" dirty="0"/>
-              <a:t>在例</a:t>
-            </a:r>
-            <a:r>
-              <a:rPr lang="en-US" altLang="zh-CN" sz="3200" dirty="0"/>
-              <a:t>1</a:t>
-            </a:r>
-            <a:r>
-              <a:rPr lang="zh-CN" altLang="zh-CN" sz="3200" dirty="0"/>
-              <a:t>的基础上</a:t>
-            </a:r>
-            <a:r>
-              <a:rPr lang="zh-CN" altLang="zh-CN" sz="3200" dirty="0" smtClean="0"/>
-              <a:t>求</a:t>
-            </a:r>
-            <a:r>
-              <a:rPr lang="zh-CN" altLang="en-US" sz="3200" dirty="0" smtClean="0"/>
-              <a:t>平均</a:t>
-            </a:r>
-            <a:r>
-              <a:rPr lang="zh-CN" altLang="zh-CN" sz="3200" dirty="0" smtClean="0"/>
-              <a:t>距离</a:t>
-            </a:r>
-            <a:r>
-              <a:rPr lang="zh-CN" altLang="zh-CN" sz="3200" dirty="0"/>
-              <a:t>（</a:t>
-            </a:r>
-            <a:r>
-              <a:rPr lang="en-US" altLang="zh-CN" sz="3200" dirty="0"/>
-              <a:t>reduction</a:t>
-            </a:r>
-            <a:r>
-              <a:rPr lang="zh-CN" altLang="zh-CN" sz="3200" dirty="0" smtClean="0"/>
-              <a:t>）</a:t>
-            </a:r>
-            <a:endParaRPr lang="en-US" altLang="zh-CN" sz="3200" dirty="0" smtClean="0"/>
-          </a:p>
-          <a:p>
-            <a:pPr lvl="1"/>
-            <a:endParaRPr lang="en-US" altLang="zh-CN" sz="3200" dirty="0" smtClean="0"/>
-          </a:p>
-          <a:p>
-            <a:r>
-              <a:rPr lang="zh-CN" altLang="en-US" sz="4000" dirty="0" smtClean="0"/>
-              <a:t>公式</a:t>
-            </a:r>
-            <a:endParaRPr lang="en-US" altLang="zh-CN" sz="4000" dirty="0" smtClean="0"/>
-          </a:p>
-          <a:p>
-            <a:pPr lvl="1"/>
-            <a:r>
-              <a:rPr lang="en-US" altLang="zh-CN" sz="3200" dirty="0"/>
-              <a:t>sum</a:t>
-            </a:r>
-            <a:r>
-              <a:rPr lang="en-US" altLang="zh-CN" sz="3200" dirty="0" smtClean="0"/>
-              <a:t>( </a:t>
-            </a:r>
-            <a:r>
-              <a:rPr lang="en-US" altLang="zh-CN" sz="3200" dirty="0"/>
-              <a:t>d[</a:t>
-            </a:r>
-            <a:r>
-              <a:rPr lang="en-US" altLang="zh-CN" sz="3200" dirty="0" err="1"/>
-              <a:t>i</a:t>
-            </a:r>
-            <a:r>
-              <a:rPr lang="en-US" altLang="zh-CN" sz="3200" dirty="0" smtClean="0"/>
-              <a:t>] ) / n</a:t>
-            </a:r>
-          </a:p>
-          <a:p>
-            <a:endParaRPr lang="en-US" altLang="zh-CN" sz="3200" dirty="0" smtClean="0"/>
-          </a:p>
-          <a:p>
-            <a:endParaRPr lang="en-US" sz="3200" dirty="0"/>
-          </a:p>
-        </p:txBody>
-      </p:sp>
-      <p:sp>
-        <p:nvSpPr>
-          <p:cNvPr id="4" name="Content Placeholder 2"/>
-          <p:cNvSpPr txBox="1">
-            <a:spLocks/>
-          </p:cNvSpPr>
-          <p:nvPr/>
-        </p:nvSpPr>
-        <p:spPr bwMode="auto">
-          <a:xfrm>
-            <a:off x="6179566" y="1460090"/>
-            <a:ext cx="4107657" cy="4667442"/>
-          </a:xfrm>
-          <a:prstGeom prst="rect">
-            <a:avLst/>
-          </a:prstGeom>
-          <a:noFill/>
-          <a:ln w="9525">
-            <a:noFill/>
-            <a:miter lim="800000"/>
-            <a:headEnd/>
-            <a:tailEnd/>
-          </a:ln>
-        </p:spPr>
-        <p:txBody>
-          <a:bodyPr vert="horz" wrap="square" lIns="91440" tIns="45720" rIns="91440" bIns="45720" numCol="1" anchor="t" anchorCtr="0" compatLnSpc="1">
-            <a:prstTxWarp prst="textNoShape">
-              <a:avLst/>
-            </a:prstTxWarp>
-          </a:bodyPr>
-          <a:lstStyle>
-            <a:lvl1pPr marL="342900" indent="-342900" algn="l" rtl="0" eaLnBrk="1" fontAlgn="base" hangingPunct="1">
-              <a:spcBef>
-                <a:spcPct val="20000"/>
-              </a:spcBef>
-              <a:spcAft>
-                <a:spcPct val="0"/>
-              </a:spcAft>
-              <a:buSzPct val="100000"/>
-              <a:buFontTx/>
-              <a:buBlip>
-                <a:blip r:embed="rId3"/>
-              </a:buBlip>
-              <a:defRPr sz="2400" b="0">
-                <a:solidFill>
-                  <a:schemeClr val="tx1"/>
-                </a:solidFill>
-                <a:latin typeface="Trebuchet MS" pitchFamily="34" charset="0"/>
-                <a:ea typeface="+mn-ea"/>
-                <a:cs typeface="+mn-cs"/>
-              </a:defRPr>
-            </a:lvl1pPr>
-            <a:lvl2pPr marL="914400" indent="-342900" algn="l" rtl="0" eaLnBrk="1" fontAlgn="base" hangingPunct="1">
-              <a:spcBef>
-                <a:spcPct val="20000"/>
-              </a:spcBef>
-              <a:spcAft>
-                <a:spcPct val="0"/>
-              </a:spcAft>
-              <a:buSzPct val="100000"/>
-              <a:buFontTx/>
-              <a:buBlip>
-                <a:blip r:embed="rId3"/>
-              </a:buBlip>
-              <a:defRPr sz="2000" b="0">
-                <a:solidFill>
-                  <a:schemeClr val="tx1"/>
-                </a:solidFill>
-                <a:latin typeface="Trebuchet MS" pitchFamily="34" charset="0"/>
-              </a:defRPr>
-            </a:lvl2pPr>
-            <a:lvl3pPr marL="1371600" indent="-282575" algn="l" rtl="0" eaLnBrk="1" fontAlgn="base" hangingPunct="1">
-              <a:spcBef>
-                <a:spcPct val="20000"/>
-              </a:spcBef>
-              <a:spcAft>
-                <a:spcPct val="0"/>
-              </a:spcAft>
-              <a:buSzPct val="100000"/>
-              <a:buFontTx/>
-              <a:buBlip>
-                <a:blip r:embed="rId3"/>
-              </a:buBlip>
-              <a:defRPr sz="1800" b="0">
-                <a:solidFill>
-                  <a:schemeClr val="tx1"/>
-                </a:solidFill>
-                <a:latin typeface="Trebuchet MS" pitchFamily="34" charset="0"/>
-              </a:defRPr>
-            </a:lvl3pPr>
-            <a:lvl4pPr marL="1774825" indent="-228600" algn="l" rtl="0" eaLnBrk="1" fontAlgn="base" hangingPunct="1">
-              <a:spcBef>
-                <a:spcPct val="20000"/>
-              </a:spcBef>
-              <a:spcAft>
-                <a:spcPct val="0"/>
-              </a:spcAft>
-              <a:buChar char="–"/>
-              <a:defRPr sz="2000">
-                <a:solidFill>
-                  <a:schemeClr val="tx1"/>
-                </a:solidFill>
-                <a:latin typeface="+mn-lt"/>
-              </a:defRPr>
-            </a:lvl4pPr>
-            <a:lvl5pPr marL="2117725" indent="-228600" algn="l" rtl="0" eaLnBrk="1" fontAlgn="base" hangingPunct="1">
-              <a:spcBef>
-                <a:spcPct val="20000"/>
-              </a:spcBef>
-              <a:spcAft>
-                <a:spcPct val="0"/>
-              </a:spcAft>
-              <a:buChar char="»"/>
-              <a:defRPr sz="2000">
-                <a:solidFill>
-                  <a:schemeClr val="tx1"/>
-                </a:solidFill>
-                <a:latin typeface="+mn-lt"/>
-              </a:defRPr>
-            </a:lvl5pPr>
-            <a:lvl6pPr marL="2574925" indent="-228600" algn="l" rtl="0" eaLnBrk="1" fontAlgn="base" hangingPunct="1">
-              <a:spcBef>
-                <a:spcPct val="20000"/>
-              </a:spcBef>
-              <a:spcAft>
-                <a:spcPct val="0"/>
-              </a:spcAft>
-              <a:buChar char="»"/>
-              <a:defRPr sz="2000">
-                <a:solidFill>
-                  <a:schemeClr val="bg1"/>
-                </a:solidFill>
-                <a:latin typeface="+mn-lt"/>
-              </a:defRPr>
-            </a:lvl6pPr>
-            <a:lvl7pPr marL="3032125" indent="-228600" algn="l" rtl="0" eaLnBrk="1" fontAlgn="base" hangingPunct="1">
-              <a:spcBef>
-                <a:spcPct val="20000"/>
-              </a:spcBef>
-              <a:spcAft>
-                <a:spcPct val="0"/>
-              </a:spcAft>
-              <a:buChar char="»"/>
-              <a:defRPr sz="2000">
-                <a:solidFill>
-                  <a:schemeClr val="bg1"/>
-                </a:solidFill>
-                <a:latin typeface="+mn-lt"/>
-              </a:defRPr>
-            </a:lvl7pPr>
-            <a:lvl8pPr marL="3489325" indent="-228600" algn="l" rtl="0" eaLnBrk="1" fontAlgn="base" hangingPunct="1">
-              <a:spcBef>
-                <a:spcPct val="20000"/>
-              </a:spcBef>
-              <a:spcAft>
-                <a:spcPct val="0"/>
-              </a:spcAft>
-              <a:buChar char="»"/>
-              <a:defRPr sz="2000">
-                <a:solidFill>
-                  <a:schemeClr val="bg1"/>
-                </a:solidFill>
-                <a:latin typeface="+mn-lt"/>
-              </a:defRPr>
-            </a:lvl8pPr>
-            <a:lvl9pPr marL="3946525" indent="-228600" algn="l" rtl="0" eaLnBrk="1" fontAlgn="base" hangingPunct="1">
-              <a:spcBef>
-                <a:spcPct val="20000"/>
-              </a:spcBef>
-              <a:spcAft>
-                <a:spcPct val="0"/>
-              </a:spcAft>
-              <a:buChar char="»"/>
-              <a:defRPr sz="2000">
-                <a:solidFill>
-                  <a:schemeClr val="bg1"/>
-                </a:solidFill>
-                <a:latin typeface="+mn-lt"/>
-              </a:defRPr>
-            </a:lvl9pPr>
-          </a:lstStyle>
-          <a:p>
-            <a:r>
-              <a:rPr lang="zh-CN" altLang="zh-CN" sz="3600" dirty="0"/>
-              <a:t>新例子——例</a:t>
-            </a:r>
-            <a:r>
-              <a:rPr lang="en-US" altLang="zh-CN" sz="3600" dirty="0"/>
-              <a:t>2</a:t>
-            </a:r>
-            <a:r>
-              <a:rPr lang="zh-CN" altLang="zh-CN" sz="3600" dirty="0"/>
-              <a:t>，矩阵</a:t>
-            </a:r>
-            <a:r>
-              <a:rPr lang="zh-CN" altLang="zh-CN" sz="3600" dirty="0" smtClean="0"/>
-              <a:t>相乘</a:t>
-            </a:r>
-            <a:endParaRPr lang="en-US" altLang="zh-CN" sz="3600" dirty="0" smtClean="0"/>
-          </a:p>
-          <a:p>
-            <a:pPr lvl="1"/>
-            <a:r>
-              <a:rPr lang="en-US" altLang="zh-CN" sz="2800" dirty="0"/>
-              <a:t>C</a:t>
-            </a:r>
-            <a:r>
-              <a:rPr lang="zh-CN" altLang="zh-CN" sz="2800" dirty="0" smtClean="0"/>
-              <a:t>算法</a:t>
-            </a:r>
-            <a:endParaRPr lang="en-US" altLang="zh-CN" sz="2800" dirty="0" smtClean="0"/>
-          </a:p>
-          <a:p>
-            <a:pPr lvl="1"/>
-            <a:r>
-              <a:rPr lang="en-US" altLang="zh-CN" sz="2800" dirty="0"/>
-              <a:t>CUDA</a:t>
-            </a:r>
-            <a:r>
-              <a:rPr lang="zh-CN" altLang="zh-CN" sz="2800" dirty="0" smtClean="0"/>
-              <a:t>算法</a:t>
-            </a:r>
-            <a:endParaRPr lang="en-US" altLang="zh-CN" sz="2800" dirty="0" smtClean="0"/>
-          </a:p>
-          <a:p>
-            <a:pPr lvl="1"/>
-            <a:r>
-              <a:rPr lang="en-US" altLang="zh-CN" sz="2800" dirty="0"/>
-              <a:t>C</a:t>
-            </a:r>
-            <a:r>
-              <a:rPr lang="zh-CN" altLang="en-US" sz="2800" dirty="0"/>
-              <a:t>优化</a:t>
-            </a:r>
-            <a:r>
-              <a:rPr lang="en-US" altLang="zh-CN" sz="2800" dirty="0"/>
-              <a:t>-</a:t>
-            </a:r>
-            <a:r>
-              <a:rPr lang="en-US" altLang="zh-CN" sz="2800" dirty="0" smtClean="0"/>
-              <a:t>block</a:t>
-            </a:r>
-          </a:p>
-          <a:p>
-            <a:pPr lvl="1"/>
-            <a:endParaRPr lang="en-US" altLang="zh-CN" sz="2800" dirty="0" smtClean="0"/>
-          </a:p>
-          <a:p>
-            <a:r>
-              <a:rPr lang="en-US" altLang="zh-CN" sz="2800" dirty="0"/>
-              <a:t>CUDA</a:t>
-            </a:r>
-            <a:r>
-              <a:rPr lang="zh-CN" altLang="en-US" sz="2800" dirty="0" smtClean="0"/>
-              <a:t>优化</a:t>
-            </a:r>
-            <a:endParaRPr lang="en-US" altLang="zh-CN" sz="2800" dirty="0" smtClean="0"/>
-          </a:p>
-          <a:p>
-            <a:pPr lvl="1"/>
-            <a:r>
-              <a:rPr lang="en-US" altLang="zh-CN" sz="2800" dirty="0" smtClean="0"/>
-              <a:t>…</a:t>
-            </a:r>
-            <a:endParaRPr lang="en-US" altLang="zh-CN" sz="2800" dirty="0" smtClean="0"/>
-          </a:p>
-          <a:p>
-            <a:pPr lvl="1"/>
-            <a:endParaRPr lang="en-US" altLang="zh-CN" sz="2800" dirty="0" smtClean="0"/>
-          </a:p>
-          <a:p>
-            <a:endParaRPr lang="en-US" altLang="zh-CN" sz="2800" dirty="0" smtClean="0"/>
-          </a:p>
-          <a:p>
-            <a:endParaRPr lang="en-US" sz="2800" dirty="0"/>
-          </a:p>
-        </p:txBody>
-      </p:sp>
-    </p:spTree>
-    <p:extLst>
-      <p:ext uri="{BB962C8B-B14F-4D97-AF65-F5344CB8AC3E}">
-        <p14:creationId xmlns:p14="http://schemas.microsoft.com/office/powerpoint/2010/main" val="819375491"/>
-      </p:ext>
-    </p:extLst>
-  </p:cSld>
-  <p:clrMapOvr>
-    <a:masterClrMapping/>
-  </p:clrMapOvr>
-  <mc:AlternateContent xmlns:mc="http://schemas.openxmlformats.org/markup-compatibility/2006" xmlns:p14="http://schemas.microsoft.com/office/powerpoint/2010/main">
-    <mc:Choice Requires="p14">
-      <p:transition spd="med" p14:dur="700">
-        <p:fade/>
-      </p:transition>
-    </mc:Choice>
-    <mc:Fallback xmlns="">
-      <p:transition spd="med">
-        <p:fade/>
-      </p:transition>
-    </mc:Fallback>
-  </mc:AlternateContent>
-  <p:timing>
-    <p:tnLst>
-      <p:par>
-        <p:cTn id="1" dur="indefinite" restart="never" nodeType="tmRoot">
-          <p:childTnLst>
-            <p:seq concurrent="1" nextAc="seek">
-              <p:cTn id="2" dur="indefinite" nodeType="mainSeq">
-                <p:childTnLst>
-                  <p:par>
-                    <p:cTn id="3" fill="hold">
-                      <p:stCondLst>
-                        <p:cond delay="indefinite"/>
-                        <p:cond evt="onBegin" delay="0">
-                          <p:tn val="2"/>
-                        </p:cond>
-                      </p:stCondLst>
-                      <p:childTnLst>
-                        <p:par>
-                          <p:cTn id="4" fill="hold">
-                            <p:stCondLst>
-                              <p:cond delay="0"/>
-                            </p:stCondLst>
-                            <p:childTnLst>
-                              <p:par>
-                                <p:cTn id="5" presetID="42" presetClass="entr" presetSubtype="0" fill="hold" grpId="0" nodeType="withEffect">
-                                  <p:stCondLst>
-                                    <p:cond delay="0"/>
-                                  </p:stCondLst>
-                                  <p:childTnLst>
-                                    <p:set>
-                                      <p:cBhvr>
-                                        <p:cTn id="6" dur="1" fill="hold">
-                                          <p:stCondLst>
-                                            <p:cond delay="0"/>
-                                          </p:stCondLst>
-                                        </p:cTn>
-                                        <p:tgtEl>
-                                          <p:spTgt spid="3">
-                                            <p:txEl>
-                                              <p:pRg st="0" end="0"/>
-                                            </p:txEl>
-                                          </p:spTgt>
-                                        </p:tgtEl>
-                                        <p:attrNameLst>
-                                          <p:attrName>style.visibility</p:attrName>
-                                        </p:attrNameLst>
-                                      </p:cBhvr>
-                                      <p:to>
-                                        <p:strVal val="visible"/>
-                                      </p:to>
-                                    </p:set>
-                                    <p:animEffect transition="in" filter="fade">
-                                      <p:cBhvr>
-                                        <p:cTn id="7" dur="1000"/>
-                                        <p:tgtEl>
-                                          <p:spTgt spid="3">
-                                            <p:txEl>
-                                              <p:pRg st="0" end="0"/>
-                                            </p:txEl>
-                                          </p:spTgt>
-                                        </p:tgtEl>
-                                      </p:cBhvr>
-                                    </p:animEffect>
-                                    <p:anim calcmode="lin" valueType="num">
-                                      <p:cBhvr>
-                                        <p:cTn id="8" dur="1000" fill="hold"/>
-                                        <p:tgtEl>
-                                          <p:spTgt spid="3">
-                                            <p:txEl>
-                                              <p:pRg st="0" end="0"/>
-                                            </p:txEl>
-                                          </p:spTgt>
-                                        </p:tgtEl>
-                                        <p:attrNameLst>
-                                          <p:attrName>ppt_x</p:attrName>
-                                        </p:attrNameLst>
-                                      </p:cBhvr>
-                                      <p:tavLst>
-                                        <p:tav tm="0">
-                                          <p:val>
-                                            <p:strVal val="#ppt_x"/>
-                                          </p:val>
-                                        </p:tav>
-                                        <p:tav tm="100000">
-                                          <p:val>
-                                            <p:strVal val="#ppt_x"/>
-                                          </p:val>
-                                        </p:tav>
-                                      </p:tavLst>
-                                    </p:anim>
-                                    <p:anim calcmode="lin" valueType="num">
-                                      <p:cBhvr>
-                                        <p:cTn id="9" dur="1000" fill="hold"/>
-                                        <p:tgtEl>
-                                          <p:spTgt spid="3">
-                                            <p:txEl>
-                                              <p:pRg st="0" end="0"/>
-                                            </p:txEl>
-                                          </p:spTgt>
-                                        </p:tgtEl>
-                                        <p:attrNameLst>
-                                          <p:attrName>ppt_y</p:attrName>
-                                        </p:attrNameLst>
-                                      </p:cBhvr>
-                                      <p:tavLst>
-                                        <p:tav tm="0">
-                                          <p:val>
-                                            <p:strVal val="#ppt_y+.1"/>
-                                          </p:val>
-                                        </p:tav>
-                                        <p:tav tm="100000">
-                                          <p:val>
-                                            <p:strVal val="#ppt_y"/>
-                                          </p:val>
-                                        </p:tav>
-                                      </p:tavLst>
-                                    </p:anim>
-                                  </p:childTnLst>
-                                </p:cTn>
-                              </p:par>
-                              <p:par>
-                                <p:cTn id="10" presetID="42" presetClass="entr" presetSubtype="0" fill="hold" grpId="0" nodeType="withEffect">
-                                  <p:stCondLst>
-                                    <p:cond delay="0"/>
-                                  </p:stCondLst>
-                                  <p:childTnLst>
-                                    <p:set>
-                                      <p:cBhvr>
-                                        <p:cTn id="11" dur="1" fill="hold">
-                                          <p:stCondLst>
-                                            <p:cond delay="0"/>
-                                          </p:stCondLst>
-                                        </p:cTn>
-                                        <p:tgtEl>
-                                          <p:spTgt spid="3">
-                                            <p:txEl>
-                                              <p:pRg st="1" end="1"/>
-                                            </p:txEl>
-                                          </p:spTgt>
-                                        </p:tgtEl>
-                                        <p:attrNameLst>
-                                          <p:attrName>style.visibility</p:attrName>
-                                        </p:attrNameLst>
-                                      </p:cBhvr>
-                                      <p:to>
-                                        <p:strVal val="visible"/>
-                                      </p:to>
-                                    </p:set>
-                                    <p:animEffect transition="in" filter="fade">
-                                      <p:cBhvr>
-                                        <p:cTn id="12" dur="1000"/>
-                                        <p:tgtEl>
-                                          <p:spTgt spid="3">
-                                            <p:txEl>
-                                              <p:pRg st="1" end="1"/>
-                                            </p:txEl>
-                                          </p:spTgt>
-                                        </p:tgtEl>
-                                      </p:cBhvr>
-                                    </p:animEffect>
-                                    <p:anim calcmode="lin" valueType="num">
-                                      <p:cBhvr>
-                                        <p:cTn id="13" dur="1000" fill="hold"/>
-                                        <p:tgtEl>
-                                          <p:spTgt spid="3">
-                                            <p:txEl>
-                                              <p:pRg st="1" end="1"/>
-                                            </p:txEl>
-                                          </p:spTgt>
-                                        </p:tgtEl>
-                                        <p:attrNameLst>
-                                          <p:attrName>ppt_x</p:attrName>
-                                        </p:attrNameLst>
-                                      </p:cBhvr>
-                                      <p:tavLst>
-                                        <p:tav tm="0">
-                                          <p:val>
-                                            <p:strVal val="#ppt_x"/>
-                                          </p:val>
-                                        </p:tav>
-                                        <p:tav tm="100000">
-                                          <p:val>
-                                            <p:strVal val="#ppt_x"/>
-                                          </p:val>
-                                        </p:tav>
-                                      </p:tavLst>
-                                    </p:anim>
-                                    <p:anim calcmode="lin" valueType="num">
-                                      <p:cBhvr>
-                                        <p:cTn id="14" dur="1000" fill="hold"/>
-                                        <p:tgtEl>
-                                          <p:spTgt spid="3">
-                                            <p:txEl>
-                                              <p:pRg st="1" end="1"/>
-                                            </p:txEl>
-                                          </p:spTgt>
-                                        </p:tgtEl>
-                                        <p:attrNameLst>
-                                          <p:attrName>ppt_y</p:attrName>
-                                        </p:attrNameLst>
-                                      </p:cBhvr>
-                                      <p:tavLst>
-                                        <p:tav tm="0">
-                                          <p:val>
-                                            <p:strVal val="#ppt_y+.1"/>
-                                          </p:val>
-                                        </p:tav>
-                                        <p:tav tm="100000">
-                                          <p:val>
-                                            <p:strVal val="#ppt_y"/>
-                                          </p:val>
-                                        </p:tav>
-                                      </p:tavLst>
-                                    </p:anim>
-                                  </p:childTnLst>
-                                </p:cTn>
-                              </p:par>
-                            </p:childTnLst>
-                          </p:cTn>
-                        </p:par>
-                      </p:childTnLst>
-                    </p:cTn>
-                  </p:par>
-                  <p:par>
-                    <p:cTn id="15" fill="hold">
-                      <p:stCondLst>
-                        <p:cond delay="indefinite"/>
-                      </p:stCondLst>
-                      <p:childTnLst>
-                        <p:par>
-                          <p:cTn id="16" fill="hold">
-                            <p:stCondLst>
-                              <p:cond delay="0"/>
-                            </p:stCondLst>
-                            <p:childTnLst>
-                              <p:par>
-                                <p:cTn id="17" presetID="42" presetClass="entr" presetSubtype="0" fill="hold" grpId="0" nodeType="clickEffect">
-                                  <p:stCondLst>
-                                    <p:cond delay="0"/>
-                                  </p:stCondLst>
-                                  <p:childTnLst>
-                                    <p:set>
-                                      <p:cBhvr>
-                                        <p:cTn id="18" dur="1" fill="hold">
-                                          <p:stCondLst>
-                                            <p:cond delay="0"/>
-                                          </p:stCondLst>
-                                        </p:cTn>
-                                        <p:tgtEl>
-                                          <p:spTgt spid="3">
-                                            <p:txEl>
-                                              <p:pRg st="3" end="3"/>
-                                            </p:txEl>
-                                          </p:spTgt>
-                                        </p:tgtEl>
-                                        <p:attrNameLst>
-                                          <p:attrName>style.visibility</p:attrName>
-                                        </p:attrNameLst>
-                                      </p:cBhvr>
-                                      <p:to>
-                                        <p:strVal val="visible"/>
-                                      </p:to>
-                                    </p:set>
-                                    <p:animEffect transition="in" filter="fade">
-                                      <p:cBhvr>
-                                        <p:cTn id="19" dur="1000"/>
-                                        <p:tgtEl>
-                                          <p:spTgt spid="3">
-                                            <p:txEl>
-                                              <p:pRg st="3" end="3"/>
-                                            </p:txEl>
-                                          </p:spTgt>
-                                        </p:tgtEl>
-                                      </p:cBhvr>
-                                    </p:animEffect>
-                                    <p:anim calcmode="lin" valueType="num">
-                                      <p:cBhvr>
-                                        <p:cTn id="20" dur="1000" fill="hold"/>
-                                        <p:tgtEl>
-                                          <p:spTgt spid="3">
-                                            <p:txEl>
-                                              <p:pRg st="3" end="3"/>
-                                            </p:txEl>
-                                          </p:spTgt>
-                                        </p:tgtEl>
-                                        <p:attrNameLst>
-                                          <p:attrName>ppt_x</p:attrName>
-                                        </p:attrNameLst>
-                                      </p:cBhvr>
-                                      <p:tavLst>
-                                        <p:tav tm="0">
-                                          <p:val>
-                                            <p:strVal val="#ppt_x"/>
-                                          </p:val>
-                                        </p:tav>
-                                        <p:tav tm="100000">
-                                          <p:val>
-                                            <p:strVal val="#ppt_x"/>
-                                          </p:val>
-                                        </p:tav>
-                                      </p:tavLst>
-                                    </p:anim>
-                                    <p:anim calcmode="lin" valueType="num">
-                                      <p:cBhvr>
-                                        <p:cTn id="21" dur="1000" fill="hold"/>
-                                        <p:tgtEl>
-                                          <p:spTgt spid="3">
-                                            <p:txEl>
-                                              <p:pRg st="3" end="3"/>
-                                            </p:txEl>
-                                          </p:spTgt>
-                                        </p:tgtEl>
-                                        <p:attrNameLst>
-                                          <p:attrName>ppt_y</p:attrName>
-                                        </p:attrNameLst>
-                                      </p:cBhvr>
-                                      <p:tavLst>
-                                        <p:tav tm="0">
-                                          <p:val>
-                                            <p:strVal val="#ppt_y+.1"/>
-                                          </p:val>
-                                        </p:tav>
-                                        <p:tav tm="100000">
-                                          <p:val>
-                                            <p:strVal val="#ppt_y"/>
-                                          </p:val>
-                                        </p:tav>
-                                      </p:tavLst>
-                                    </p:anim>
-                                  </p:childTnLst>
-                                </p:cTn>
-                              </p:par>
-                              <p:par>
-                                <p:cTn id="22" presetID="42" presetClass="entr" presetSubtype="0" fill="hold" grpId="0" nodeType="withEffect">
-                                  <p:stCondLst>
-                                    <p:cond delay="0"/>
-                                  </p:stCondLst>
-                                  <p:childTnLst>
-                                    <p:set>
-                                      <p:cBhvr>
-                                        <p:cTn id="23" dur="1" fill="hold">
-                                          <p:stCondLst>
-                                            <p:cond delay="0"/>
-                                          </p:stCondLst>
-                                        </p:cTn>
-                                        <p:tgtEl>
-                                          <p:spTgt spid="3">
-                                            <p:txEl>
-                                              <p:pRg st="4" end="4"/>
-                                            </p:txEl>
-                                          </p:spTgt>
-                                        </p:tgtEl>
-                                        <p:attrNameLst>
-                                          <p:attrName>style.visibility</p:attrName>
-                                        </p:attrNameLst>
-                                      </p:cBhvr>
-                                      <p:to>
-                                        <p:strVal val="visible"/>
-                                      </p:to>
-                                    </p:set>
-                                    <p:animEffect transition="in" filter="fade">
-                                      <p:cBhvr>
-                                        <p:cTn id="24" dur="1000"/>
-                                        <p:tgtEl>
-                                          <p:spTgt spid="3">
-                                            <p:txEl>
-                                              <p:pRg st="4" end="4"/>
-                                            </p:txEl>
-                                          </p:spTgt>
-                                        </p:tgtEl>
-                                      </p:cBhvr>
-                                    </p:animEffect>
-                                    <p:anim calcmode="lin" valueType="num">
-                                      <p:cBhvr>
-                                        <p:cTn id="25" dur="1000" fill="hold"/>
-                                        <p:tgtEl>
-                                          <p:spTgt spid="3">
-                                            <p:txEl>
-                                              <p:pRg st="4" end="4"/>
-                                            </p:txEl>
-                                          </p:spTgt>
-                                        </p:tgtEl>
-                                        <p:attrNameLst>
-                                          <p:attrName>ppt_x</p:attrName>
-                                        </p:attrNameLst>
-                                      </p:cBhvr>
-                                      <p:tavLst>
-                                        <p:tav tm="0">
-                                          <p:val>
-                                            <p:strVal val="#ppt_x"/>
-                                          </p:val>
-                                        </p:tav>
-                                        <p:tav tm="100000">
-                                          <p:val>
-                                            <p:strVal val="#ppt_x"/>
-                                          </p:val>
-                                        </p:tav>
-                                      </p:tavLst>
-                                    </p:anim>
-                                    <p:anim calcmode="lin" valueType="num">
-                                      <p:cBhvr>
-                                        <p:cTn id="26" dur="1000" fill="hold"/>
-                                        <p:tgtEl>
-                                          <p:spTgt spid="3">
-                                            <p:txEl>
-                                              <p:pRg st="4" end="4"/>
-                                            </p:txEl>
-                                          </p:spTgt>
-                                        </p:tgtEl>
-                                        <p:attrNameLst>
-                                          <p:attrName>ppt_y</p:attrName>
-                                        </p:attrNameLst>
-                                      </p:cBhvr>
-                                      <p:tavLst>
-                                        <p:tav tm="0">
-                                          <p:val>
-                                            <p:strVal val="#ppt_y+.1"/>
-                                          </p:val>
-                                        </p:tav>
-                                        <p:tav tm="100000">
-                                          <p:val>
-                                            <p:strVal val="#ppt_y"/>
-                                          </p:val>
-                                        </p:tav>
-                                      </p:tavLst>
-                                    </p:anim>
-                                  </p:childTnLst>
-                                </p:cTn>
-                              </p:par>
-                            </p:childTnLst>
-                          </p:cTn>
-                        </p:par>
-                      </p:childTnLst>
-                    </p:cTn>
-                  </p:par>
-                  <p:par>
-                    <p:cTn id="27" fill="hold">
-                      <p:stCondLst>
-                        <p:cond delay="indefinite"/>
-                      </p:stCondLst>
-                      <p:childTnLst>
-                        <p:par>
-                          <p:cTn id="28" fill="hold">
-                            <p:stCondLst>
-                              <p:cond delay="0"/>
-                            </p:stCondLst>
-                            <p:childTnLst>
-                              <p:par>
-                                <p:cTn id="29" presetID="42" presetClass="entr" presetSubtype="0" fill="hold" grpId="0" nodeType="clickEffect">
-                                  <p:stCondLst>
-                                    <p:cond delay="0"/>
-                                  </p:stCondLst>
-                                  <p:childTnLst>
-                                    <p:set>
-                                      <p:cBhvr>
-                                        <p:cTn id="30" dur="1" fill="hold">
-                                          <p:stCondLst>
-                                            <p:cond delay="0"/>
-                                          </p:stCondLst>
-                                        </p:cTn>
-                                        <p:tgtEl>
-                                          <p:spTgt spid="4"/>
-                                        </p:tgtEl>
-                                        <p:attrNameLst>
-                                          <p:attrName>style.visibility</p:attrName>
-                                        </p:attrNameLst>
-                                      </p:cBhvr>
-                                      <p:to>
-                                        <p:strVal val="visible"/>
-                                      </p:to>
-                                    </p:set>
-                                    <p:animEffect transition="in" filter="fade">
-                                      <p:cBhvr>
-                                        <p:cTn id="31" dur="1000"/>
-                                        <p:tgtEl>
-                                          <p:spTgt spid="4"/>
-                                        </p:tgtEl>
-                                      </p:cBhvr>
-                                    </p:animEffect>
-                                    <p:anim calcmode="lin" valueType="num">
-                                      <p:cBhvr>
-                                        <p:cTn id="32" dur="1000" fill="hold"/>
-                                        <p:tgtEl>
-                                          <p:spTgt spid="4"/>
-                                        </p:tgtEl>
-                                        <p:attrNameLst>
-                                          <p:attrName>ppt_x</p:attrName>
-                                        </p:attrNameLst>
-                                      </p:cBhvr>
-                                      <p:tavLst>
-                                        <p:tav tm="0">
-                                          <p:val>
-                                            <p:strVal val="#ppt_x"/>
-                                          </p:val>
-                                        </p:tav>
-                                        <p:tav tm="100000">
-                                          <p:val>
-                                            <p:strVal val="#ppt_x"/>
-                                          </p:val>
-                                        </p:tav>
-                                      </p:tavLst>
-                                    </p:anim>
-                                    <p:anim calcmode="lin" valueType="num">
-                                      <p:cBhvr>
-                                        <p:cTn id="33" dur="1000" fill="hold"/>
-                                        <p:tgtEl>
-                                          <p:spTgt spid="4"/>
-                                        </p:tgtEl>
-                                        <p:attrNameLst>
-                                          <p:attrName>ppt_y</p:attrName>
-                                        </p:attrNameLst>
-                                      </p:cBhvr>
-                                      <p:tavLst>
-                                        <p:tav tm="0">
-                                          <p:val>
-                                            <p:strVal val="#ppt_y+.1"/>
-                                          </p:val>
-                                        </p:tav>
-                                        <p:tav tm="100000">
-                                          <p:val>
-                                            <p:strVal val="#ppt_y"/>
-                                          </p:val>
-                                        </p:tav>
-                                      </p:tavLst>
-                                    </p:anim>
-                                  </p:childTnLst>
-                                </p:cTn>
-                              </p:par>
-                            </p:childTnLst>
-                          </p:cTn>
-                        </p:par>
-                      </p:childTnLst>
-                    </p:cTn>
-                  </p:par>
-                </p:childTnLst>
-              </p:cTn>
-              <p:prevCondLst>
-                <p:cond evt="onPrev" delay="0">
-                  <p:tgtEl>
-                    <p:sldTgt/>
-                  </p:tgtEl>
-                </p:cond>
-              </p:prevCondLst>
-              <p:nextCondLst>
-                <p:cond evt="onNext" delay="0">
-                  <p:tgtEl>
-                    <p:sldTgt/>
-                  </p:tgtEl>
-                </p:cond>
-              </p:nextCondLst>
-            </p:seq>
-          </p:childTnLst>
-        </p:cTn>
-      </p:par>
-    </p:tnLst>
-    <p:bldLst>
-      <p:bldP spid="3" grpId="0" uiExpand="1" build="p"/>
-      <p:bldP spid="4" grpId="0"/>
-    </p:bldLst>
   </p:timing>
 </p:sld>
 </file>
@@ -17196,21 +16031,6 @@
 </file>
 
 <file path=customXml/item1.xml><?xml version="1.0" encoding="utf-8"?>
-<p:properties xmlns:p="http://schemas.microsoft.com/office/2006/metadata/properties" xmlns:xsi="http://www.w3.org/2001/XMLSchema-instance">
-  <documentManagement/>
-</p:properties>
-</file>
-
-<file path=customXml/item2.xml><?xml version="1.0" encoding="utf-8"?>
-<?mso-contentType ?>
-<FormTemplates xmlns="http://schemas.microsoft.com/sharepoint/v3/contenttype/forms">
-  <Display>DocumentLibraryForm</Display>
-  <Edit>DocumentLibraryForm</Edit>
-  <New>DocumentLibraryForm</New>
-</FormTemplates>
-</file>
-
-<file path=customXml/item3.xml><?xml version="1.0" encoding="utf-8"?>
 <ct:contentTypeSchema xmlns:ct="http://schemas.microsoft.com/office/2006/metadata/contentType" xmlns:ma="http://schemas.microsoft.com/office/2006/metadata/properties/metaAttributes" ct:_="" ma:_="" ma:contentTypeName="Document" ma:contentTypeID="0x010100FB38B0B4E3072D428564024F6E85BC07" ma:contentTypeVersion="0" ma:contentTypeDescription="Create a new document." ma:contentTypeScope="" ma:versionID="a559b02ab7d86624fa1c6ada0e69e3cd">
   <xsd:schema xmlns:xsd="http://www.w3.org/2001/XMLSchema" xmlns:p="http://schemas.microsoft.com/office/2006/metadata/properties" targetNamespace="http://schemas.microsoft.com/office/2006/metadata/properties" ma:root="true" ma:fieldsID="4aeb20c0e3442673af7ee10786458764">
     <xsd:element name="properties">
@@ -17259,16 +16079,32 @@
 </ct:contentTypeSchema>
 </file>
 
+<file path=customXml/item2.xml><?xml version="1.0" encoding="utf-8"?>
+<?mso-contentType ?>
+<FormTemplates xmlns="http://schemas.microsoft.com/sharepoint/v3/contenttype/forms">
+  <Display>DocumentLibraryForm</Display>
+  <Edit>DocumentLibraryForm</Edit>
+  <New>DocumentLibraryForm</New>
+</FormTemplates>
+</file>
+
+<file path=customXml/item3.xml><?xml version="1.0" encoding="utf-8"?>
+<p:properties xmlns:p="http://schemas.microsoft.com/office/2006/metadata/properties" xmlns:xsi="http://www.w3.org/2001/XMLSchema-instance">
+  <documentManagement/>
+</p:properties>
+</file>
+
 <file path=customXml/itemProps1.xml><?xml version="1.0" encoding="utf-8"?>
-<ds:datastoreItem xmlns:ds="http://schemas.openxmlformats.org/officeDocument/2006/customXml" ds:itemID="{DF88E22E-2A4B-4FB1-9848-BF16E7DBE74B}">
+<ds:datastoreItem xmlns:ds="http://schemas.openxmlformats.org/officeDocument/2006/customXml" ds:itemID="{C9F27BF2-F9EF-4D34-87AA-F1894485F5C8}">
   <ds:schemaRefs>
-    <ds:schemaRef ds:uri="http://schemas.microsoft.com/office/2006/documentManagement/types"/>
-    <ds:schemaRef ds:uri="http://purl.org/dc/dcmitype/"/>
+    <ds:schemaRef ds:uri="http://schemas.microsoft.com/office/2006/metadata/contentType"/>
+    <ds:schemaRef ds:uri="http://schemas.microsoft.com/office/2006/metadata/properties/metaAttributes"/>
+    <ds:schemaRef ds:uri="http://www.w3.org/2001/XMLSchema"/>
     <ds:schemaRef ds:uri="http://schemas.microsoft.com/office/2006/metadata/properties"/>
+    <ds:schemaRef ds:uri="http://schemas.openxmlformats.org/package/2006/metadata/core-properties"/>
+    <ds:schemaRef ds:uri="http://purl.org/dc/elements/1.1/"/>
     <ds:schemaRef ds:uri="http://purl.org/dc/terms/"/>
-    <ds:schemaRef ds:uri="http://schemas.openxmlformats.org/package/2006/metadata/core-properties"/>
-    <ds:schemaRef ds:uri="http://www.w3.org/XML/1998/namespace"/>
-    <ds:schemaRef ds:uri="http://purl.org/dc/elements/1.1/"/>
+    <ds:schemaRef ds:uri="http://schemas.microsoft.com/office/internal/2005/internalDocumentation"/>
   </ds:schemaRefs>
 </ds:datastoreItem>
 </file>
@@ -17282,16 +16118,15 @@
 </file>
 
 <file path=customXml/itemProps3.xml><?xml version="1.0" encoding="utf-8"?>
-<ds:datastoreItem xmlns:ds="http://schemas.openxmlformats.org/officeDocument/2006/customXml" ds:itemID="{C9F27BF2-F9EF-4D34-87AA-F1894485F5C8}">
+<ds:datastoreItem xmlns:ds="http://schemas.openxmlformats.org/officeDocument/2006/customXml" ds:itemID="{DF88E22E-2A4B-4FB1-9848-BF16E7DBE74B}">
   <ds:schemaRefs>
-    <ds:schemaRef ds:uri="http://schemas.microsoft.com/office/2006/metadata/contentType"/>
-    <ds:schemaRef ds:uri="http://schemas.microsoft.com/office/2006/metadata/properties/metaAttributes"/>
-    <ds:schemaRef ds:uri="http://www.w3.org/2001/XMLSchema"/>
+    <ds:schemaRef ds:uri="http://schemas.microsoft.com/office/2006/documentManagement/types"/>
+    <ds:schemaRef ds:uri="http://purl.org/dc/dcmitype/"/>
     <ds:schemaRef ds:uri="http://schemas.microsoft.com/office/2006/metadata/properties"/>
+    <ds:schemaRef ds:uri="http://purl.org/dc/terms/"/>
     <ds:schemaRef ds:uri="http://schemas.openxmlformats.org/package/2006/metadata/core-properties"/>
+    <ds:schemaRef ds:uri="http://www.w3.org/XML/1998/namespace"/>
     <ds:schemaRef ds:uri="http://purl.org/dc/elements/1.1/"/>
-    <ds:schemaRef ds:uri="http://purl.org/dc/terms/"/>
-    <ds:schemaRef ds:uri="http://schemas.microsoft.com/office/internal/2005/internalDocumentation"/>
   </ds:schemaRefs>
 </ds:datastoreItem>
 </file>
</xml_diff>

<commit_message>
replace bg image to remove LEADTEC
</commit_message>
<xml_diff>
--- a/doc/cuda_training_day1_pm(20141219Liu).pptx
+++ b/doc/cuda_training_day1_pm(20141219Liu).pptx
@@ -304,7 +304,7 @@
               <a:pPr>
                 <a:defRPr/>
               </a:pPr>
-              <a:t>12/20/2014</a:t>
+              <a:t>12/3/2015</a:t>
             </a:fld>
             <a:endParaRPr lang="en-US" dirty="0"/>
           </a:p>
@@ -2440,7 +2440,7 @@
       </p:sp>
       <p:pic>
         <p:nvPicPr>
-          <p:cNvPr id="2" name="Picture 1" descr="leadtek_nvidia_1200x676.png"/>
+          <p:cNvPr id="2" name="Picture 1"/>
           <p:cNvPicPr>
             <a:picLocks noChangeAspect="1"/>
           </p:cNvPicPr>
@@ -2460,8 +2460,8 @@
         </p:blipFill>
         <p:spPr>
           <a:xfrm>
-            <a:off x="0" y="0"/>
-            <a:ext cx="10972800" cy="6181344"/>
+            <a:off x="0" y="4572"/>
+            <a:ext cx="10972800" cy="6172200"/>
           </a:xfrm>
           <a:prstGeom prst="rect">
             <a:avLst/>
@@ -3240,35 +3240,6 @@
           <a:chExt cx="0" cy="0"/>
         </a:xfrm>
       </p:grpSpPr>
-      <p:pic>
-        <p:nvPicPr>
-          <p:cNvPr id="3" name="Picture 2" descr="image5.jpeg"/>
-          <p:cNvPicPr>
-            <a:picLocks noChangeAspect="1"/>
-          </p:cNvPicPr>
-          <p:nvPr/>
-        </p:nvPicPr>
-        <p:blipFill rotWithShape="1">
-          <a:blip r:embed="rId8">
-            <a:extLst>
-              <a:ext uri="{28A0092B-C50C-407E-A947-70E740481C1C}">
-                <a14:useLocalDpi xmlns:a14="http://schemas.microsoft.com/office/drawing/2010/main" val="0"/>
-              </a:ext>
-            </a:extLst>
-          </a:blip>
-          <a:srcRect r="2690" b="3828"/>
-          <a:stretch/>
-        </p:blipFill>
-        <p:spPr>
-          <a:xfrm>
-            <a:off x="0" y="0"/>
-            <a:ext cx="10984268" cy="6172200"/>
-          </a:xfrm>
-          <a:prstGeom prst="rect">
-            <a:avLst/>
-          </a:prstGeom>
-        </p:spPr>
-      </p:pic>
       <p:sp>
         <p:nvSpPr>
           <p:cNvPr id="1026" name="Rectangle 2"/>
@@ -3548,7 +3519,7 @@
         </a:spcAft>
         <a:buSzPct val="100000"/>
         <a:buBlip>
-          <a:blip r:embed="rId9"/>
+          <a:blip r:embed="rId8"/>
         </a:buBlip>
         <a:defRPr sz="2400" b="0">
           <a:solidFill>
@@ -3568,7 +3539,7 @@
         </a:spcAft>
         <a:buSzPct val="100000"/>
         <a:buBlip>
-          <a:blip r:embed="rId9"/>
+          <a:blip r:embed="rId8"/>
         </a:buBlip>
         <a:defRPr sz="2000" b="0">
           <a:solidFill>
@@ -3586,7 +3557,7 @@
         </a:spcAft>
         <a:buSzPct val="100000"/>
         <a:buBlip>
-          <a:blip r:embed="rId9"/>
+          <a:blip r:embed="rId8"/>
         </a:buBlip>
         <a:defRPr sz="1800" b="0">
           <a:solidFill>
@@ -4699,7 +4670,7 @@
           <p:nvPr>
             <p:extLst>
               <p:ext uri="{D42A27DB-BD31-4B8C-83A1-F6EECF244321}">
-                <p14:modId xmlns:p14="http://schemas.microsoft.com/office/powerpoint/2010/main" val="3431698276"/>
+                <p14:modId xmlns:p14="http://schemas.microsoft.com/office/powerpoint/2010/main" val="3950668506"/>
               </p:ext>
             </p:extLst>
           </p:nvPr>
@@ -4816,20 +4787,34 @@
                     <a:lstStyle/>
                     <a:p>
                       <a:r>
-                        <a:rPr lang="en-US" altLang="zh-CN" sz="1800" kern="1200" dirty="0" smtClean="0">
+                        <a:rPr lang="zh-CN" altLang="en-US" sz="1800" kern="1200" dirty="0" smtClean="0">
                           <a:solidFill>
-                            <a:srgbClr val="A000A0"/>
+                            <a:srgbClr val="880000"/>
                           </a:solidFill>
                           <a:latin typeface="新宋体"/>
                           <a:ea typeface="新宋体"/>
                           <a:cs typeface="+mn-cs"/>
                         </a:rPr>
-                        <a:t>device</a:t>
+                        <a:t>局部变量， </a:t>
                       </a:r>
-                      <a:endParaRPr lang="zh-CN" altLang="en-US" dirty="0">
+                      <a:r>
+                        <a:rPr lang="en-US" altLang="zh-CN" sz="1800" kern="1200" smtClean="0">
+                          <a:solidFill>
+                            <a:srgbClr val="880000"/>
+                          </a:solidFill>
+                          <a:latin typeface="新宋体"/>
+                          <a:ea typeface="新宋体"/>
+                          <a:cs typeface="+mn-cs"/>
+                        </a:rPr>
+                        <a:t>= </a:t>
+                      </a:r>
+                      <a:endParaRPr lang="zh-CN" altLang="en-US" sz="1800" kern="1200" dirty="0">
                         <a:solidFill>
-                          <a:schemeClr val="bg1"/>
+                          <a:srgbClr val="880000"/>
                         </a:solidFill>
+                        <a:latin typeface="新宋体"/>
+                        <a:ea typeface="新宋体"/>
+                        <a:cs typeface="+mn-cs"/>
                       </a:endParaRPr>
                     </a:p>
                   </a:txBody>
@@ -16031,6 +16016,21 @@
 </file>
 
 <file path=customXml/item1.xml><?xml version="1.0" encoding="utf-8"?>
+<p:properties xmlns:p="http://schemas.microsoft.com/office/2006/metadata/properties" xmlns:xsi="http://www.w3.org/2001/XMLSchema-instance">
+  <documentManagement/>
+</p:properties>
+</file>
+
+<file path=customXml/item2.xml><?xml version="1.0" encoding="utf-8"?>
+<?mso-contentType ?>
+<FormTemplates xmlns="http://schemas.microsoft.com/sharepoint/v3/contenttype/forms">
+  <Display>DocumentLibraryForm</Display>
+  <Edit>DocumentLibraryForm</Edit>
+  <New>DocumentLibraryForm</New>
+</FormTemplates>
+</file>
+
+<file path=customXml/item3.xml><?xml version="1.0" encoding="utf-8"?>
 <ct:contentTypeSchema xmlns:ct="http://schemas.microsoft.com/office/2006/metadata/contentType" xmlns:ma="http://schemas.microsoft.com/office/2006/metadata/properties/metaAttributes" ct:_="" ma:_="" ma:contentTypeName="Document" ma:contentTypeID="0x010100FB38B0B4E3072D428564024F6E85BC07" ma:contentTypeVersion="0" ma:contentTypeDescription="Create a new document." ma:contentTypeScope="" ma:versionID="a559b02ab7d86624fa1c6ada0e69e3cd">
   <xsd:schema xmlns:xsd="http://www.w3.org/2001/XMLSchema" xmlns:p="http://schemas.microsoft.com/office/2006/metadata/properties" targetNamespace="http://schemas.microsoft.com/office/2006/metadata/properties" ma:root="true" ma:fieldsID="4aeb20c0e3442673af7ee10786458764">
     <xsd:element name="properties">
@@ -16079,32 +16079,16 @@
 </ct:contentTypeSchema>
 </file>
 
-<file path=customXml/item2.xml><?xml version="1.0" encoding="utf-8"?>
-<?mso-contentType ?>
-<FormTemplates xmlns="http://schemas.microsoft.com/sharepoint/v3/contenttype/forms">
-  <Display>DocumentLibraryForm</Display>
-  <Edit>DocumentLibraryForm</Edit>
-  <New>DocumentLibraryForm</New>
-</FormTemplates>
-</file>
-
-<file path=customXml/item3.xml><?xml version="1.0" encoding="utf-8"?>
-<p:properties xmlns:p="http://schemas.microsoft.com/office/2006/metadata/properties" xmlns:xsi="http://www.w3.org/2001/XMLSchema-instance">
-  <documentManagement/>
-</p:properties>
-</file>
-
 <file path=customXml/itemProps1.xml><?xml version="1.0" encoding="utf-8"?>
-<ds:datastoreItem xmlns:ds="http://schemas.openxmlformats.org/officeDocument/2006/customXml" ds:itemID="{C9F27BF2-F9EF-4D34-87AA-F1894485F5C8}">
+<ds:datastoreItem xmlns:ds="http://schemas.openxmlformats.org/officeDocument/2006/customXml" ds:itemID="{DF88E22E-2A4B-4FB1-9848-BF16E7DBE74B}">
   <ds:schemaRefs>
-    <ds:schemaRef ds:uri="http://schemas.microsoft.com/office/2006/metadata/contentType"/>
-    <ds:schemaRef ds:uri="http://schemas.microsoft.com/office/2006/metadata/properties/metaAttributes"/>
-    <ds:schemaRef ds:uri="http://www.w3.org/2001/XMLSchema"/>
+    <ds:schemaRef ds:uri="http://schemas.microsoft.com/office/2006/documentManagement/types"/>
+    <ds:schemaRef ds:uri="http://purl.org/dc/dcmitype/"/>
     <ds:schemaRef ds:uri="http://schemas.microsoft.com/office/2006/metadata/properties"/>
+    <ds:schemaRef ds:uri="http://purl.org/dc/terms/"/>
     <ds:schemaRef ds:uri="http://schemas.openxmlformats.org/package/2006/metadata/core-properties"/>
+    <ds:schemaRef ds:uri="http://www.w3.org/XML/1998/namespace"/>
     <ds:schemaRef ds:uri="http://purl.org/dc/elements/1.1/"/>
-    <ds:schemaRef ds:uri="http://purl.org/dc/terms/"/>
-    <ds:schemaRef ds:uri="http://schemas.microsoft.com/office/internal/2005/internalDocumentation"/>
   </ds:schemaRefs>
 </ds:datastoreItem>
 </file>
@@ -16118,15 +16102,16 @@
 </file>
 
 <file path=customXml/itemProps3.xml><?xml version="1.0" encoding="utf-8"?>
-<ds:datastoreItem xmlns:ds="http://schemas.openxmlformats.org/officeDocument/2006/customXml" ds:itemID="{DF88E22E-2A4B-4FB1-9848-BF16E7DBE74B}">
+<ds:datastoreItem xmlns:ds="http://schemas.openxmlformats.org/officeDocument/2006/customXml" ds:itemID="{C9F27BF2-F9EF-4D34-87AA-F1894485F5C8}">
   <ds:schemaRefs>
-    <ds:schemaRef ds:uri="http://schemas.microsoft.com/office/2006/documentManagement/types"/>
-    <ds:schemaRef ds:uri="http://purl.org/dc/dcmitype/"/>
+    <ds:schemaRef ds:uri="http://schemas.microsoft.com/office/2006/metadata/contentType"/>
+    <ds:schemaRef ds:uri="http://schemas.microsoft.com/office/2006/metadata/properties/metaAttributes"/>
+    <ds:schemaRef ds:uri="http://www.w3.org/2001/XMLSchema"/>
     <ds:schemaRef ds:uri="http://schemas.microsoft.com/office/2006/metadata/properties"/>
+    <ds:schemaRef ds:uri="http://schemas.openxmlformats.org/package/2006/metadata/core-properties"/>
+    <ds:schemaRef ds:uri="http://purl.org/dc/elements/1.1/"/>
     <ds:schemaRef ds:uri="http://purl.org/dc/terms/"/>
-    <ds:schemaRef ds:uri="http://schemas.openxmlformats.org/package/2006/metadata/core-properties"/>
-    <ds:schemaRef ds:uri="http://www.w3.org/XML/1998/namespace"/>
-    <ds:schemaRef ds:uri="http://purl.org/dc/elements/1.1/"/>
+    <ds:schemaRef ds:uri="http://schemas.microsoft.com/office/internal/2005/internalDocumentation"/>
   </ds:schemaRefs>
 </ds:datastoreItem>
 </file>
</xml_diff>